<commit_message>
Fixes to the manual.
git-svn-id: file:///p/wpis/people/students/kidd/svnwali/branches/burtona@760 dfa36f5b-b2fa-0310-9605-e5aca7e64462
</commit_message>
<xml_diff>
--- a/Doc/NWA_tex/Examples.pptx
+++ b/Doc/NWA_tex/Examples.pptx
@@ -215,7 +215,7 @@
             <a:fld id="{FFE90CD3-0D2C-4CB7-931F-D1FD92D430F5}" type="datetimeFigureOut">
               <a:rPr lang="en-US" smtClean="0"/>
               <a:pPr/>
-              <a:t>7/1/2010</a:t>
+              <a:t>7/2/2010</a:t>
             </a:fld>
             <a:endParaRPr lang="en-US"/>
           </a:p>
@@ -2721,7 +2721,7 @@
             <a:fld id="{50089AFF-3D09-4087-97CB-5A8328D4F8E9}" type="datetimeFigureOut">
               <a:rPr lang="en-US" smtClean="0"/>
               <a:pPr/>
-              <a:t>7/1/2010</a:t>
+              <a:t>7/2/2010</a:t>
             </a:fld>
             <a:endParaRPr lang="en-US"/>
           </a:p>
@@ -2888,7 +2888,7 @@
             <a:fld id="{50089AFF-3D09-4087-97CB-5A8328D4F8E9}" type="datetimeFigureOut">
               <a:rPr lang="en-US" smtClean="0"/>
               <a:pPr/>
-              <a:t>7/1/2010</a:t>
+              <a:t>7/2/2010</a:t>
             </a:fld>
             <a:endParaRPr lang="en-US"/>
           </a:p>
@@ -3065,7 +3065,7 @@
             <a:fld id="{50089AFF-3D09-4087-97CB-5A8328D4F8E9}" type="datetimeFigureOut">
               <a:rPr lang="en-US" smtClean="0"/>
               <a:pPr/>
-              <a:t>7/1/2010</a:t>
+              <a:t>7/2/2010</a:t>
             </a:fld>
             <a:endParaRPr lang="en-US"/>
           </a:p>
@@ -3232,7 +3232,7 @@
             <a:fld id="{50089AFF-3D09-4087-97CB-5A8328D4F8E9}" type="datetimeFigureOut">
               <a:rPr lang="en-US" smtClean="0"/>
               <a:pPr/>
-              <a:t>7/1/2010</a:t>
+              <a:t>7/2/2010</a:t>
             </a:fld>
             <a:endParaRPr lang="en-US"/>
           </a:p>
@@ -3475,7 +3475,7 @@
             <a:fld id="{50089AFF-3D09-4087-97CB-5A8328D4F8E9}" type="datetimeFigureOut">
               <a:rPr lang="en-US" smtClean="0"/>
               <a:pPr/>
-              <a:t>7/1/2010</a:t>
+              <a:t>7/2/2010</a:t>
             </a:fld>
             <a:endParaRPr lang="en-US"/>
           </a:p>
@@ -3760,7 +3760,7 @@
             <a:fld id="{50089AFF-3D09-4087-97CB-5A8328D4F8E9}" type="datetimeFigureOut">
               <a:rPr lang="en-US" smtClean="0"/>
               <a:pPr/>
-              <a:t>7/1/2010</a:t>
+              <a:t>7/2/2010</a:t>
             </a:fld>
             <a:endParaRPr lang="en-US"/>
           </a:p>
@@ -4179,7 +4179,7 @@
             <a:fld id="{50089AFF-3D09-4087-97CB-5A8328D4F8E9}" type="datetimeFigureOut">
               <a:rPr lang="en-US" smtClean="0"/>
               <a:pPr/>
-              <a:t>7/1/2010</a:t>
+              <a:t>7/2/2010</a:t>
             </a:fld>
             <a:endParaRPr lang="en-US"/>
           </a:p>
@@ -4294,7 +4294,7 @@
             <a:fld id="{50089AFF-3D09-4087-97CB-5A8328D4F8E9}" type="datetimeFigureOut">
               <a:rPr lang="en-US" smtClean="0"/>
               <a:pPr/>
-              <a:t>7/1/2010</a:t>
+              <a:t>7/2/2010</a:t>
             </a:fld>
             <a:endParaRPr lang="en-US"/>
           </a:p>
@@ -4386,7 +4386,7 @@
             <a:fld id="{50089AFF-3D09-4087-97CB-5A8328D4F8E9}" type="datetimeFigureOut">
               <a:rPr lang="en-US" smtClean="0"/>
               <a:pPr/>
-              <a:t>7/1/2010</a:t>
+              <a:t>7/2/2010</a:t>
             </a:fld>
             <a:endParaRPr lang="en-US"/>
           </a:p>
@@ -4660,7 +4660,7 @@
             <a:fld id="{50089AFF-3D09-4087-97CB-5A8328D4F8E9}" type="datetimeFigureOut">
               <a:rPr lang="en-US" smtClean="0"/>
               <a:pPr/>
-              <a:t>7/1/2010</a:t>
+              <a:t>7/2/2010</a:t>
             </a:fld>
             <a:endParaRPr lang="en-US"/>
           </a:p>
@@ -4910,7 +4910,7 @@
             <a:fld id="{50089AFF-3D09-4087-97CB-5A8328D4F8E9}" type="datetimeFigureOut">
               <a:rPr lang="en-US" smtClean="0"/>
               <a:pPr/>
-              <a:t>7/1/2010</a:t>
+              <a:t>7/2/2010</a:t>
             </a:fld>
             <a:endParaRPr lang="en-US"/>
           </a:p>
@@ -5120,7 +5120,7 @@
             <a:fld id="{50089AFF-3D09-4087-97CB-5A8328D4F8E9}" type="datetimeFigureOut">
               <a:rPr lang="en-US" smtClean="0"/>
               <a:pPr/>
-              <a:t>7/1/2010</a:t>
+              <a:t>7/2/2010</a:t>
             </a:fld>
             <a:endParaRPr lang="en-US"/>
           </a:p>
@@ -9566,2019 +9566,1479 @@
           <a:chExt cx="0" cy="0"/>
         </a:xfrm>
       </p:grpSpPr>
-      <p:grpSp>
-        <p:nvGrpSpPr>
-          <p:cNvPr id="33" name="Group 32"/>
-          <p:cNvGrpSpPr/>
+      <p:sp>
+        <p:nvSpPr>
+          <p:cNvPr id="2" name="Flowchart: Connector 1"/>
+          <p:cNvSpPr/>
           <p:nvPr/>
-        </p:nvGrpSpPr>
-        <p:grpSpPr>
+        </p:nvSpPr>
+        <p:spPr>
           <a:xfrm>
-            <a:off x="0" y="0"/>
-            <a:ext cx="6800850" cy="6858000"/>
-            <a:chOff x="857250" y="666750"/>
-            <a:chExt cx="6800850" cy="6858000"/>
+            <a:off x="0" y="3143250"/>
+            <a:ext cx="914400" cy="914400"/>
           </a:xfrm>
-        </p:grpSpPr>
-        <p:sp>
-          <p:nvSpPr>
-            <p:cNvPr id="2" name="Flowchart: Connector 1"/>
-            <p:cNvSpPr/>
-            <p:nvPr/>
-          </p:nvSpPr>
-          <p:spPr>
-            <a:xfrm>
-              <a:off x="857250" y="3810000"/>
-              <a:ext cx="914400" cy="914400"/>
-            </a:xfrm>
-            <a:prstGeom prst="flowChartConnector">
-              <a:avLst/>
-            </a:prstGeom>
-            <a:ln/>
-          </p:spPr>
-          <p:style>
-            <a:lnRef idx="2">
-              <a:schemeClr val="dk1"/>
-            </a:lnRef>
-            <a:fillRef idx="1">
-              <a:schemeClr val="lt1"/>
-            </a:fillRef>
-            <a:effectRef idx="0">
-              <a:schemeClr val="dk1"/>
-            </a:effectRef>
-            <a:fontRef idx="minor">
-              <a:schemeClr val="dk1"/>
-            </a:fontRef>
-          </p:style>
-          <p:txBody>
-            <a:bodyPr rtlCol="0" anchor="ctr"/>
-            <a:lstStyle/>
-            <a:p>
-              <a:pPr algn="ctr"/>
-              <a:r>
-                <a:rPr lang="en-US" sz="1300" dirty="0" smtClean="0"/>
-                <a:t>Begin</a:t>
-              </a:r>
-              <a:endParaRPr lang="en-US" sz="1300" dirty="0"/>
-            </a:p>
-          </p:txBody>
-        </p:sp>
-        <p:sp>
-          <p:nvSpPr>
-            <p:cNvPr id="3" name="Flowchart: Connector 2"/>
-            <p:cNvSpPr/>
-            <p:nvPr/>
-          </p:nvSpPr>
-          <p:spPr>
-            <a:xfrm>
-              <a:off x="5257800" y="3086100"/>
-              <a:ext cx="914400" cy="914400"/>
-            </a:xfrm>
-            <a:prstGeom prst="flowChartConnector">
-              <a:avLst/>
-            </a:prstGeom>
+          <a:prstGeom prst="flowChartConnector">
+            <a:avLst/>
+          </a:prstGeom>
+          <a:ln/>
+        </p:spPr>
+        <p:style>
+          <a:lnRef idx="2">
+            <a:schemeClr val="dk1"/>
+          </a:lnRef>
+          <a:fillRef idx="1">
+            <a:schemeClr val="lt1"/>
+          </a:fillRef>
+          <a:effectRef idx="0">
+            <a:schemeClr val="dk1"/>
+          </a:effectRef>
+          <a:fontRef idx="minor">
+            <a:schemeClr val="dk1"/>
+          </a:fontRef>
+        </p:style>
+        <p:txBody>
+          <a:bodyPr rtlCol="0" anchor="ctr"/>
+          <a:lstStyle/>
+          <a:p>
+            <a:pPr algn="ctr"/>
+            <a:r>
+              <a:rPr lang="en-US" sz="1300" dirty="0" smtClean="0"/>
+              <a:t>Begin</a:t>
+            </a:r>
+            <a:endParaRPr lang="en-US" sz="1300" dirty="0"/>
+          </a:p>
+        </p:txBody>
+      </p:sp>
+      <p:sp>
+        <p:nvSpPr>
+          <p:cNvPr id="3" name="Flowchart: Connector 2"/>
+          <p:cNvSpPr/>
+          <p:nvPr/>
+        </p:nvSpPr>
+        <p:spPr>
+          <a:xfrm>
+            <a:off x="4400550" y="2419350"/>
+            <a:ext cx="914400" cy="914400"/>
+          </a:xfrm>
+          <a:prstGeom prst="flowChartConnector">
+            <a:avLst/>
+          </a:prstGeom>
+          <a:solidFill>
+            <a:schemeClr val="bg1"/>
+          </a:solidFill>
+          <a:ln>
             <a:solidFill>
-              <a:schemeClr val="bg1"/>
+              <a:schemeClr val="tx1"/>
             </a:solidFill>
-            <a:ln>
+          </a:ln>
+        </p:spPr>
+        <p:style>
+          <a:lnRef idx="2">
+            <a:schemeClr val="accent1">
+              <a:shade val="50000"/>
+            </a:schemeClr>
+          </a:lnRef>
+          <a:fillRef idx="1">
+            <a:schemeClr val="accent1"/>
+          </a:fillRef>
+          <a:effectRef idx="0">
+            <a:schemeClr val="accent1"/>
+          </a:effectRef>
+          <a:fontRef idx="minor">
+            <a:schemeClr val="lt1"/>
+          </a:fontRef>
+        </p:style>
+        <p:txBody>
+          <a:bodyPr rtlCol="0" anchor="ctr"/>
+          <a:lstStyle/>
+          <a:p>
+            <a:pPr algn="ctr"/>
+            <a:r>
+              <a:rPr lang="en-US" sz="1300" dirty="0" smtClean="0">
+                <a:solidFill>
+                  <a:schemeClr val="tx1"/>
+                </a:solidFill>
+              </a:rPr>
+              <a:t>Exit</a:t>
+            </a:r>
+            <a:endParaRPr lang="en-US" sz="1300" dirty="0">
               <a:solidFill>
                 <a:schemeClr val="tx1"/>
               </a:solidFill>
-            </a:ln>
-          </p:spPr>
-          <p:style>
-            <a:lnRef idx="2">
-              <a:schemeClr val="accent1">
-                <a:shade val="50000"/>
-              </a:schemeClr>
-            </a:lnRef>
-            <a:fillRef idx="1">
-              <a:schemeClr val="accent1"/>
-            </a:fillRef>
-            <a:effectRef idx="0">
-              <a:schemeClr val="accent1"/>
-            </a:effectRef>
-            <a:fontRef idx="minor">
-              <a:schemeClr val="lt1"/>
-            </a:fontRef>
-          </p:style>
-          <p:txBody>
-            <a:bodyPr rtlCol="0" anchor="ctr"/>
-            <a:lstStyle/>
-            <a:p>
-              <a:pPr algn="ctr"/>
-              <a:r>
-                <a:rPr lang="en-US" sz="1300" dirty="0" smtClean="0">
-                  <a:solidFill>
-                    <a:schemeClr val="tx1"/>
-                  </a:solidFill>
-                </a:rPr>
-                <a:t>Exit</a:t>
-              </a:r>
-              <a:endParaRPr lang="en-US" sz="1300" dirty="0">
+            </a:endParaRPr>
+          </a:p>
+        </p:txBody>
+      </p:sp>
+      <p:cxnSp>
+        <p:nvCxnSpPr>
+          <p:cNvPr id="4" name="Straight Arrow Connector 3"/>
+          <p:cNvCxnSpPr>
+            <a:endCxn id="30" idx="2"/>
+          </p:cNvCxnSpPr>
+          <p:nvPr/>
+        </p:nvCxnSpPr>
+        <p:spPr>
+          <a:xfrm>
+            <a:off x="2686050" y="1447800"/>
+            <a:ext cx="285750" cy="1588"/>
+          </a:xfrm>
+          <a:prstGeom prst="straightConnector1">
+            <a:avLst/>
+          </a:prstGeom>
+          <a:ln>
+            <a:solidFill>
+              <a:schemeClr val="tx1"/>
+            </a:solidFill>
+            <a:tailEnd type="arrow"/>
+          </a:ln>
+        </p:spPr>
+        <p:style>
+          <a:lnRef idx="1">
+            <a:schemeClr val="accent1"/>
+          </a:lnRef>
+          <a:fillRef idx="0">
+            <a:schemeClr val="accent1"/>
+          </a:fillRef>
+          <a:effectRef idx="0">
+            <a:schemeClr val="accent1"/>
+          </a:effectRef>
+          <a:fontRef idx="minor">
+            <a:schemeClr val="tx1"/>
+          </a:fontRef>
+        </p:style>
+      </p:cxnSp>
+      <p:cxnSp>
+        <p:nvCxnSpPr>
+          <p:cNvPr id="5" name="Straight Arrow Connector 4"/>
+          <p:cNvCxnSpPr>
+            <a:stCxn id="2" idx="6"/>
+            <a:endCxn id="12" idx="2"/>
+          </p:cNvCxnSpPr>
+          <p:nvPr/>
+        </p:nvCxnSpPr>
+        <p:spPr>
+          <a:xfrm flipV="1">
+            <a:off x="914400" y="2876550"/>
+            <a:ext cx="1028700" cy="723900"/>
+          </a:xfrm>
+          <a:prstGeom prst="straightConnector1">
+            <a:avLst/>
+          </a:prstGeom>
+          <a:ln>
+            <a:solidFill>
+              <a:schemeClr val="tx1"/>
+            </a:solidFill>
+            <a:tailEnd type="arrow"/>
+          </a:ln>
+        </p:spPr>
+        <p:style>
+          <a:lnRef idx="1">
+            <a:schemeClr val="accent1"/>
+          </a:lnRef>
+          <a:fillRef idx="0">
+            <a:schemeClr val="accent1"/>
+          </a:fillRef>
+          <a:effectRef idx="0">
+            <a:schemeClr val="accent1"/>
+          </a:effectRef>
+          <a:fontRef idx="minor">
+            <a:schemeClr val="tx1"/>
+          </a:fontRef>
+        </p:style>
+      </p:cxnSp>
+      <p:cxnSp>
+        <p:nvCxnSpPr>
+          <p:cNvPr id="7" name="Straight Connector 6"/>
+          <p:cNvCxnSpPr/>
+          <p:nvPr/>
+        </p:nvCxnSpPr>
+        <p:spPr>
+          <a:xfrm rot="5400000">
+            <a:off x="2571750" y="1447800"/>
+            <a:ext cx="228600" cy="0"/>
+          </a:xfrm>
+          <a:prstGeom prst="line">
+            <a:avLst/>
+          </a:prstGeom>
+          <a:ln>
+            <a:solidFill>
+              <a:schemeClr val="tx1"/>
+            </a:solidFill>
+          </a:ln>
+        </p:spPr>
+        <p:style>
+          <a:lnRef idx="1">
+            <a:schemeClr val="accent1"/>
+          </a:lnRef>
+          <a:fillRef idx="0">
+            <a:schemeClr val="accent1"/>
+          </a:fillRef>
+          <a:effectRef idx="0">
+            <a:schemeClr val="accent1"/>
+          </a:effectRef>
+          <a:fontRef idx="minor">
+            <a:schemeClr val="tx1"/>
+          </a:fontRef>
+        </p:style>
+      </p:cxnSp>
+      <p:sp>
+        <p:nvSpPr>
+          <p:cNvPr id="8" name="TextBox 7"/>
+          <p:cNvSpPr txBox="1"/>
+          <p:nvPr/>
+        </p:nvSpPr>
+        <p:spPr>
+          <a:xfrm>
+            <a:off x="1428750" y="3200400"/>
+            <a:ext cx="410882" cy="292388"/>
+          </a:xfrm>
+          <a:prstGeom prst="rect">
+            <a:avLst/>
+          </a:prstGeom>
+          <a:noFill/>
+        </p:spPr>
+        <p:txBody>
+          <a:bodyPr wrap="none" rtlCol="0">
+            <a:spAutoFit/>
+          </a:bodyPr>
+          <a:lstStyle/>
+          <a:p>
+            <a:r>
+              <a:rPr lang="en-US" sz="1300" dirty="0" smtClean="0">
+                <a:solidFill>
+                  <a:schemeClr val="accent1"/>
+                </a:solidFill>
+              </a:rPr>
+              <a:t>call</a:t>
+            </a:r>
+            <a:endParaRPr lang="en-US" sz="1300" dirty="0">
+              <a:solidFill>
+                <a:schemeClr val="accent1"/>
+              </a:solidFill>
+            </a:endParaRPr>
+          </a:p>
+        </p:txBody>
+      </p:sp>
+      <p:sp>
+        <p:nvSpPr>
+          <p:cNvPr id="9" name="TextBox 8"/>
+          <p:cNvSpPr txBox="1"/>
+          <p:nvPr/>
+        </p:nvSpPr>
+        <p:spPr>
+          <a:xfrm>
+            <a:off x="3429000" y="2876550"/>
+            <a:ext cx="272832" cy="292388"/>
+          </a:xfrm>
+          <a:prstGeom prst="rect">
+            <a:avLst/>
+          </a:prstGeom>
+          <a:noFill/>
+        </p:spPr>
+        <p:txBody>
+          <a:bodyPr wrap="none" rtlCol="0">
+            <a:spAutoFit/>
+          </a:bodyPr>
+          <a:lstStyle/>
+          <a:p>
+            <a:r>
+              <a:rPr lang="en-US" sz="1300" dirty="0" smtClean="0"/>
+              <a:t>a</a:t>
+            </a:r>
+            <a:endParaRPr lang="en-US" sz="1300" dirty="0"/>
+          </a:p>
+        </p:txBody>
+      </p:sp>
+      <p:sp>
+        <p:nvSpPr>
+          <p:cNvPr id="10" name="Flowchart: Connector 9"/>
+          <p:cNvSpPr/>
+          <p:nvPr/>
+        </p:nvSpPr>
+        <p:spPr>
+          <a:xfrm>
+            <a:off x="3086100" y="5943600"/>
+            <a:ext cx="914400" cy="914400"/>
+          </a:xfrm>
+          <a:prstGeom prst="flowChartConnector">
+            <a:avLst/>
+          </a:prstGeom>
+          <a:ln/>
+        </p:spPr>
+        <p:style>
+          <a:lnRef idx="2">
+            <a:schemeClr val="dk1"/>
+          </a:lnRef>
+          <a:fillRef idx="1">
+            <a:schemeClr val="lt1"/>
+          </a:fillRef>
+          <a:effectRef idx="0">
+            <a:schemeClr val="dk1"/>
+          </a:effectRef>
+          <a:fontRef idx="minor">
+            <a:schemeClr val="dk1"/>
+          </a:fontRef>
+        </p:style>
+        <p:txBody>
+          <a:bodyPr rtlCol="0" anchor="ctr"/>
+          <a:lstStyle/>
+          <a:p>
+            <a:pPr algn="ctr"/>
+            <a:r>
+              <a:rPr lang="en-US" sz="1300" dirty="0" smtClean="0"/>
+              <a:t>Stuck</a:t>
+            </a:r>
+          </a:p>
+        </p:txBody>
+      </p:sp>
+      <p:cxnSp>
+        <p:nvCxnSpPr>
+          <p:cNvPr id="11" name="Straight Arrow Connector 10"/>
+          <p:cNvCxnSpPr>
+            <a:stCxn id="3" idx="6"/>
+            <a:endCxn id="31" idx="2"/>
+          </p:cNvCxnSpPr>
+          <p:nvPr/>
+        </p:nvCxnSpPr>
+        <p:spPr>
+          <a:xfrm>
+            <a:off x="5314950" y="2876550"/>
+            <a:ext cx="571500" cy="781050"/>
+          </a:xfrm>
+          <a:prstGeom prst="straightConnector1">
+            <a:avLst/>
+          </a:prstGeom>
+          <a:ln>
+            <a:solidFill>
+              <a:schemeClr val="tx1"/>
+            </a:solidFill>
+            <a:tailEnd type="arrow"/>
+          </a:ln>
+        </p:spPr>
+        <p:style>
+          <a:lnRef idx="1">
+            <a:schemeClr val="accent1"/>
+          </a:lnRef>
+          <a:fillRef idx="0">
+            <a:schemeClr val="accent1"/>
+          </a:fillRef>
+          <a:effectRef idx="0">
+            <a:schemeClr val="accent1"/>
+          </a:effectRef>
+          <a:fontRef idx="minor">
+            <a:schemeClr val="tx1"/>
+          </a:fontRef>
+        </p:style>
+      </p:cxnSp>
+      <p:sp>
+        <p:nvSpPr>
+          <p:cNvPr id="12" name="Flowchart: Connector 11"/>
+          <p:cNvSpPr/>
+          <p:nvPr/>
+        </p:nvSpPr>
+        <p:spPr>
+          <a:xfrm>
+            <a:off x="1943100" y="2419350"/>
+            <a:ext cx="914400" cy="914400"/>
+          </a:xfrm>
+          <a:prstGeom prst="flowChartConnector">
+            <a:avLst/>
+          </a:prstGeom>
+          <a:solidFill>
+            <a:schemeClr val="bg1"/>
+          </a:solidFill>
+          <a:ln>
+            <a:solidFill>
+              <a:schemeClr val="tx1"/>
+            </a:solidFill>
+          </a:ln>
+        </p:spPr>
+        <p:style>
+          <a:lnRef idx="2">
+            <a:schemeClr val="accent1">
+              <a:shade val="50000"/>
+            </a:schemeClr>
+          </a:lnRef>
+          <a:fillRef idx="1">
+            <a:schemeClr val="accent1"/>
+          </a:fillRef>
+          <a:effectRef idx="0">
+            <a:schemeClr val="accent1"/>
+          </a:effectRef>
+          <a:fontRef idx="minor">
+            <a:schemeClr val="lt1"/>
+          </a:fontRef>
+        </p:style>
+        <p:txBody>
+          <a:bodyPr rtlCol="0" anchor="ctr"/>
+          <a:lstStyle/>
+          <a:p>
+            <a:pPr algn="ctr"/>
+            <a:r>
+              <a:rPr lang="en-US" sz="1300" dirty="0" smtClean="0">
                 <a:solidFill>
                   <a:schemeClr val="tx1"/>
                 </a:solidFill>
-              </a:endParaRPr>
-            </a:p>
-          </p:txBody>
-        </p:sp>
-        <p:cxnSp>
-          <p:nvCxnSpPr>
-            <p:cNvPr id="4" name="Straight Arrow Connector 3"/>
-            <p:cNvCxnSpPr>
-              <a:endCxn id="30" idx="2"/>
-            </p:cNvCxnSpPr>
-            <p:nvPr/>
-          </p:nvCxnSpPr>
-          <p:spPr>
-            <a:xfrm>
-              <a:off x="3543300" y="2114550"/>
-              <a:ext cx="285750" cy="1588"/>
-            </a:xfrm>
-            <a:prstGeom prst="straightConnector1">
-              <a:avLst/>
-            </a:prstGeom>
-            <a:ln>
+              </a:rPr>
+              <a:t>Entry</a:t>
+            </a:r>
+            <a:endParaRPr lang="en-US" sz="1300" dirty="0">
               <a:solidFill>
                 <a:schemeClr val="tx1"/>
               </a:solidFill>
-              <a:tailEnd type="arrow"/>
-            </a:ln>
-          </p:spPr>
-          <p:style>
-            <a:lnRef idx="1">
-              <a:schemeClr val="accent1"/>
-            </a:lnRef>
-            <a:fillRef idx="0">
-              <a:schemeClr val="accent1"/>
-            </a:fillRef>
-            <a:effectRef idx="0">
-              <a:schemeClr val="accent1"/>
-            </a:effectRef>
-            <a:fontRef idx="minor">
+            </a:endParaRPr>
+          </a:p>
+        </p:txBody>
+      </p:sp>
+      <p:cxnSp>
+        <p:nvCxnSpPr>
+          <p:cNvPr id="13" name="Straight Arrow Connector 12"/>
+          <p:cNvCxnSpPr>
+            <a:stCxn id="12" idx="6"/>
+            <a:endCxn id="3" idx="2"/>
+          </p:cNvCxnSpPr>
+          <p:nvPr/>
+        </p:nvCxnSpPr>
+        <p:spPr>
+          <a:xfrm>
+            <a:off x="2857500" y="2876550"/>
+            <a:ext cx="1543050" cy="1588"/>
+          </a:xfrm>
+          <a:prstGeom prst="straightConnector1">
+            <a:avLst/>
+          </a:prstGeom>
+          <a:ln>
+            <a:solidFill>
               <a:schemeClr val="tx1"/>
-            </a:fontRef>
-          </p:style>
-        </p:cxnSp>
-        <p:cxnSp>
-          <p:nvCxnSpPr>
-            <p:cNvPr id="5" name="Straight Arrow Connector 4"/>
-            <p:cNvCxnSpPr>
-              <a:stCxn id="2" idx="6"/>
-              <a:endCxn id="12" idx="2"/>
-            </p:cNvCxnSpPr>
-            <p:nvPr/>
-          </p:nvCxnSpPr>
-          <p:spPr>
-            <a:xfrm flipV="1">
-              <a:off x="1771650" y="3543300"/>
-              <a:ext cx="1028700" cy="723900"/>
-            </a:xfrm>
-            <a:prstGeom prst="straightConnector1">
-              <a:avLst/>
-            </a:prstGeom>
-            <a:ln>
+            </a:solidFill>
+            <a:tailEnd type="arrow"/>
+          </a:ln>
+        </p:spPr>
+        <p:style>
+          <a:lnRef idx="1">
+            <a:schemeClr val="accent1"/>
+          </a:lnRef>
+          <a:fillRef idx="0">
+            <a:schemeClr val="accent1"/>
+          </a:fillRef>
+          <a:effectRef idx="0">
+            <a:schemeClr val="accent1"/>
+          </a:effectRef>
+          <a:fontRef idx="minor">
+            <a:schemeClr val="tx1"/>
+          </a:fontRef>
+        </p:style>
+      </p:cxnSp>
+      <p:sp>
+        <p:nvSpPr>
+          <p:cNvPr id="14" name="TextBox 13"/>
+          <p:cNvSpPr txBox="1"/>
+          <p:nvPr/>
+        </p:nvSpPr>
+        <p:spPr>
+          <a:xfrm>
+            <a:off x="5543550" y="2857500"/>
+            <a:ext cx="378758" cy="292388"/>
+          </a:xfrm>
+          <a:prstGeom prst="rect">
+            <a:avLst/>
+          </a:prstGeom>
+          <a:noFill/>
+        </p:spPr>
+        <p:txBody>
+          <a:bodyPr wrap="none" rtlCol="0">
+            <a:spAutoFit/>
+          </a:bodyPr>
+          <a:lstStyle/>
+          <a:p>
+            <a:r>
+              <a:rPr lang="en-US" sz="1300" dirty="0" smtClean="0">
+                <a:solidFill>
+                  <a:schemeClr val="accent4"/>
+                </a:solidFill>
+              </a:rPr>
+              <a:t>ret</a:t>
+            </a:r>
+            <a:endParaRPr lang="en-US" sz="1300" dirty="0">
+              <a:solidFill>
+                <a:schemeClr val="accent4"/>
+              </a:solidFill>
+            </a:endParaRPr>
+          </a:p>
+        </p:txBody>
+      </p:sp>
+      <p:sp>
+        <p:nvSpPr>
+          <p:cNvPr id="30" name="Flowchart: Connector 29"/>
+          <p:cNvSpPr/>
+          <p:nvPr/>
+        </p:nvSpPr>
+        <p:spPr>
+          <a:xfrm>
+            <a:off x="2971800" y="990600"/>
+            <a:ext cx="914400" cy="914400"/>
+          </a:xfrm>
+          <a:prstGeom prst="flowChartConnector">
+            <a:avLst/>
+          </a:prstGeom>
+          <a:solidFill>
+            <a:schemeClr val="bg1"/>
+          </a:solidFill>
+          <a:ln w="88900" cmpd="dbl">
+            <a:solidFill>
+              <a:schemeClr val="tx1"/>
+            </a:solidFill>
+          </a:ln>
+        </p:spPr>
+        <p:style>
+          <a:lnRef idx="2">
+            <a:schemeClr val="accent1">
+              <a:shade val="50000"/>
+            </a:schemeClr>
+          </a:lnRef>
+          <a:fillRef idx="1">
+            <a:schemeClr val="accent1"/>
+          </a:fillRef>
+          <a:effectRef idx="0">
+            <a:schemeClr val="accent1"/>
+          </a:effectRef>
+          <a:fontRef idx="minor">
+            <a:schemeClr val="lt1"/>
+          </a:fontRef>
+        </p:style>
+        <p:txBody>
+          <a:bodyPr rtlCol="0" anchor="ctr"/>
+          <a:lstStyle/>
+          <a:p>
+            <a:pPr algn="ctr"/>
+            <a:r>
+              <a:rPr lang="en-US" sz="1300" dirty="0" smtClean="0">
+                <a:solidFill>
+                  <a:schemeClr val="tx1"/>
+                </a:solidFill>
+              </a:rPr>
+              <a:t>Begin’</a:t>
+            </a:r>
+            <a:endParaRPr lang="en-US" sz="1300" dirty="0">
               <a:solidFill>
                 <a:schemeClr val="tx1"/>
               </a:solidFill>
-              <a:tailEnd type="arrow"/>
-            </a:ln>
-          </p:spPr>
-          <p:style>
-            <a:lnRef idx="1">
-              <a:schemeClr val="accent1"/>
-            </a:lnRef>
-            <a:fillRef idx="0">
-              <a:schemeClr val="accent1"/>
-            </a:fillRef>
-            <a:effectRef idx="0">
-              <a:schemeClr val="accent1"/>
-            </a:effectRef>
-            <a:fontRef idx="minor">
+            </a:endParaRPr>
+          </a:p>
+        </p:txBody>
+      </p:sp>
+      <p:sp>
+        <p:nvSpPr>
+          <p:cNvPr id="31" name="Flowchart: Connector 30"/>
+          <p:cNvSpPr/>
+          <p:nvPr/>
+        </p:nvSpPr>
+        <p:spPr>
+          <a:xfrm>
+            <a:off x="5886450" y="3200400"/>
+            <a:ext cx="914400" cy="914400"/>
+          </a:xfrm>
+          <a:prstGeom prst="flowChartConnector">
+            <a:avLst/>
+          </a:prstGeom>
+          <a:ln/>
+        </p:spPr>
+        <p:style>
+          <a:lnRef idx="2">
+            <a:schemeClr val="dk1"/>
+          </a:lnRef>
+          <a:fillRef idx="1">
+            <a:schemeClr val="lt1"/>
+          </a:fillRef>
+          <a:effectRef idx="0">
+            <a:schemeClr val="dk1"/>
+          </a:effectRef>
+          <a:fontRef idx="minor">
+            <a:schemeClr val="dk1"/>
+          </a:fontRef>
+        </p:style>
+        <p:txBody>
+          <a:bodyPr rtlCol="0" anchor="ctr"/>
+          <a:lstStyle/>
+          <a:p>
+            <a:pPr algn="ctr"/>
+            <a:r>
+              <a:rPr lang="en-US" sz="1300" dirty="0" smtClean="0"/>
+              <a:t>End</a:t>
+            </a:r>
+            <a:endParaRPr lang="en-US" sz="1300" dirty="0"/>
+          </a:p>
+        </p:txBody>
+      </p:sp>
+      <p:sp>
+        <p:nvSpPr>
+          <p:cNvPr id="42" name="Flowchart: Connector 41"/>
+          <p:cNvSpPr/>
+          <p:nvPr/>
+        </p:nvSpPr>
+        <p:spPr>
+          <a:xfrm>
+            <a:off x="2286000" y="4743450"/>
+            <a:ext cx="914400" cy="914400"/>
+          </a:xfrm>
+          <a:prstGeom prst="flowChartConnector">
+            <a:avLst/>
+          </a:prstGeom>
+          <a:ln/>
+        </p:spPr>
+        <p:style>
+          <a:lnRef idx="2">
+            <a:schemeClr val="dk1"/>
+          </a:lnRef>
+          <a:fillRef idx="1">
+            <a:schemeClr val="lt1"/>
+          </a:fillRef>
+          <a:effectRef idx="0">
+            <a:schemeClr val="dk1"/>
+          </a:effectRef>
+          <a:fontRef idx="minor">
+            <a:schemeClr val="dk1"/>
+          </a:fontRef>
+        </p:style>
+        <p:txBody>
+          <a:bodyPr rtlCol="0" anchor="ctr"/>
+          <a:lstStyle/>
+          <a:p>
+            <a:pPr algn="ctr"/>
+            <a:r>
+              <a:rPr lang="en-US" sz="1300" dirty="0" smtClean="0"/>
+              <a:t>Entry’</a:t>
+            </a:r>
+            <a:endParaRPr lang="en-US" sz="1300" dirty="0"/>
+          </a:p>
+        </p:txBody>
+      </p:sp>
+      <p:sp>
+        <p:nvSpPr>
+          <p:cNvPr id="43" name="Flowchart: Connector 42"/>
+          <p:cNvSpPr/>
+          <p:nvPr/>
+        </p:nvSpPr>
+        <p:spPr>
+          <a:xfrm>
+            <a:off x="3886200" y="4743450"/>
+            <a:ext cx="914400" cy="914400"/>
+          </a:xfrm>
+          <a:prstGeom prst="flowChartConnector">
+            <a:avLst/>
+          </a:prstGeom>
+          <a:ln/>
+        </p:spPr>
+        <p:style>
+          <a:lnRef idx="2">
+            <a:schemeClr val="dk1"/>
+          </a:lnRef>
+          <a:fillRef idx="1">
+            <a:schemeClr val="lt1"/>
+          </a:fillRef>
+          <a:effectRef idx="0">
+            <a:schemeClr val="dk1"/>
+          </a:effectRef>
+          <a:fontRef idx="minor">
+            <a:schemeClr val="dk1"/>
+          </a:fontRef>
+        </p:style>
+        <p:txBody>
+          <a:bodyPr rtlCol="0" anchor="ctr"/>
+          <a:lstStyle/>
+          <a:p>
+            <a:pPr algn="ctr"/>
+            <a:r>
+              <a:rPr lang="en-US" sz="1300" dirty="0" smtClean="0"/>
+              <a:t>Exit’</a:t>
+            </a:r>
+            <a:endParaRPr lang="en-US" sz="1300" dirty="0"/>
+          </a:p>
+        </p:txBody>
+      </p:sp>
+      <p:sp>
+        <p:nvSpPr>
+          <p:cNvPr id="44" name="Flowchart: Connector 43"/>
+          <p:cNvSpPr/>
+          <p:nvPr/>
+        </p:nvSpPr>
+        <p:spPr>
+          <a:xfrm>
+            <a:off x="3086100" y="3276600"/>
+            <a:ext cx="914400" cy="914400"/>
+          </a:xfrm>
+          <a:prstGeom prst="flowChartConnector">
+            <a:avLst/>
+          </a:prstGeom>
+          <a:ln/>
+        </p:spPr>
+        <p:style>
+          <a:lnRef idx="2">
+            <a:schemeClr val="dk1"/>
+          </a:lnRef>
+          <a:fillRef idx="1">
+            <a:schemeClr val="lt1"/>
+          </a:fillRef>
+          <a:effectRef idx="0">
+            <a:schemeClr val="dk1"/>
+          </a:effectRef>
+          <a:fontRef idx="minor">
+            <a:schemeClr val="dk1"/>
+          </a:fontRef>
+        </p:style>
+        <p:txBody>
+          <a:bodyPr rtlCol="0" anchor="ctr"/>
+          <a:lstStyle/>
+          <a:p>
+            <a:pPr algn="ctr"/>
+            <a:r>
+              <a:rPr lang="en-US" sz="1300" dirty="0" smtClean="0"/>
+              <a:t>End’</a:t>
+            </a:r>
+            <a:endParaRPr lang="en-US" sz="1300" dirty="0"/>
+          </a:p>
+        </p:txBody>
+      </p:sp>
+      <p:cxnSp>
+        <p:nvCxnSpPr>
+          <p:cNvPr id="45" name="Straight Arrow Connector 44"/>
+          <p:cNvCxnSpPr>
+            <a:stCxn id="30" idx="3"/>
+            <a:endCxn id="12" idx="0"/>
+          </p:cNvCxnSpPr>
+          <p:nvPr/>
+        </p:nvCxnSpPr>
+        <p:spPr>
+          <a:xfrm rot="5400000">
+            <a:off x="2428876" y="1742514"/>
+            <a:ext cx="648261" cy="705411"/>
+          </a:xfrm>
+          <a:prstGeom prst="straightConnector1">
+            <a:avLst/>
+          </a:prstGeom>
+          <a:ln>
+            <a:solidFill>
               <a:schemeClr val="tx1"/>
-            </a:fontRef>
-          </p:style>
-        </p:cxnSp>
-        <p:cxnSp>
-          <p:nvCxnSpPr>
-            <p:cNvPr id="7" name="Straight Connector 6"/>
-            <p:cNvCxnSpPr/>
-            <p:nvPr/>
-          </p:nvCxnSpPr>
-          <p:spPr>
-            <a:xfrm rot="5400000">
-              <a:off x="3429000" y="2114550"/>
-              <a:ext cx="228600" cy="0"/>
-            </a:xfrm>
-            <a:prstGeom prst="line">
-              <a:avLst/>
-            </a:prstGeom>
-            <a:ln>
-              <a:solidFill>
-                <a:schemeClr val="tx1"/>
-              </a:solidFill>
-            </a:ln>
-          </p:spPr>
-          <p:style>
-            <a:lnRef idx="1">
-              <a:schemeClr val="accent1"/>
-            </a:lnRef>
-            <a:fillRef idx="0">
-              <a:schemeClr val="accent1"/>
-            </a:fillRef>
-            <a:effectRef idx="0">
-              <a:schemeClr val="accent1"/>
-            </a:effectRef>
-            <a:fontRef idx="minor">
-              <a:schemeClr val="tx1"/>
-            </a:fontRef>
-          </p:style>
-        </p:cxnSp>
-        <p:sp>
-          <p:nvSpPr>
-            <p:cNvPr id="8" name="TextBox 7"/>
-            <p:cNvSpPr txBox="1"/>
-            <p:nvPr/>
-          </p:nvSpPr>
-          <p:spPr>
-            <a:xfrm>
-              <a:off x="2286000" y="3867150"/>
-              <a:ext cx="410882" cy="292388"/>
-            </a:xfrm>
-            <a:prstGeom prst="rect">
-              <a:avLst/>
-            </a:prstGeom>
-            <a:noFill/>
-          </p:spPr>
-          <p:txBody>
-            <a:bodyPr wrap="none" rtlCol="0">
-              <a:spAutoFit/>
-            </a:bodyPr>
-            <a:lstStyle/>
-            <a:p>
-              <a:r>
-                <a:rPr lang="en-US" sz="1300" dirty="0" smtClean="0">
-                  <a:solidFill>
-                    <a:schemeClr val="accent1"/>
-                  </a:solidFill>
-                </a:rPr>
-                <a:t>call</a:t>
-              </a:r>
-              <a:endParaRPr lang="en-US" sz="1300" dirty="0">
+            </a:solidFill>
+            <a:tailEnd type="arrow"/>
+          </a:ln>
+        </p:spPr>
+        <p:style>
+          <a:lnRef idx="1">
+            <a:schemeClr val="accent1"/>
+          </a:lnRef>
+          <a:fillRef idx="0">
+            <a:schemeClr val="accent1"/>
+          </a:fillRef>
+          <a:effectRef idx="0">
+            <a:schemeClr val="accent1"/>
+          </a:effectRef>
+          <a:fontRef idx="minor">
+            <a:schemeClr val="tx1"/>
+          </a:fontRef>
+        </p:style>
+      </p:cxnSp>
+      <p:sp>
+        <p:nvSpPr>
+          <p:cNvPr id="48" name="TextBox 47"/>
+          <p:cNvSpPr txBox="1"/>
+          <p:nvPr/>
+        </p:nvSpPr>
+        <p:spPr>
+          <a:xfrm>
+            <a:off x="2343150" y="1847850"/>
+            <a:ext cx="410882" cy="292388"/>
+          </a:xfrm>
+          <a:prstGeom prst="rect">
+            <a:avLst/>
+          </a:prstGeom>
+          <a:noFill/>
+        </p:spPr>
+        <p:txBody>
+          <a:bodyPr wrap="none" rtlCol="0">
+            <a:spAutoFit/>
+          </a:bodyPr>
+          <a:lstStyle/>
+          <a:p>
+            <a:r>
+              <a:rPr lang="en-US" sz="1300" dirty="0" smtClean="0">
                 <a:solidFill>
                   <a:schemeClr val="accent1"/>
                 </a:solidFill>
-              </a:endParaRPr>
-            </a:p>
-          </p:txBody>
-        </p:sp>
-        <p:sp>
-          <p:nvSpPr>
-            <p:cNvPr id="9" name="TextBox 8"/>
-            <p:cNvSpPr txBox="1"/>
-            <p:nvPr/>
-          </p:nvSpPr>
-          <p:spPr>
-            <a:xfrm>
-              <a:off x="4286250" y="3543300"/>
-              <a:ext cx="272832" cy="292388"/>
-            </a:xfrm>
-            <a:prstGeom prst="rect">
-              <a:avLst/>
-            </a:prstGeom>
-            <a:noFill/>
-          </p:spPr>
-          <p:txBody>
-            <a:bodyPr wrap="none" rtlCol="0">
-              <a:spAutoFit/>
-            </a:bodyPr>
-            <a:lstStyle/>
-            <a:p>
-              <a:r>
-                <a:rPr lang="en-US" sz="1300" dirty="0" smtClean="0"/>
-                <a:t>a</a:t>
-              </a:r>
-              <a:endParaRPr lang="en-US" sz="1300" dirty="0"/>
-            </a:p>
-          </p:txBody>
-        </p:sp>
-        <p:sp>
-          <p:nvSpPr>
-            <p:cNvPr id="10" name="Flowchart: Connector 9"/>
-            <p:cNvSpPr/>
-            <p:nvPr/>
-          </p:nvSpPr>
-          <p:spPr>
-            <a:xfrm>
-              <a:off x="3943350" y="6610350"/>
-              <a:ext cx="914400" cy="914400"/>
-            </a:xfrm>
-            <a:prstGeom prst="flowChartConnector">
-              <a:avLst/>
-            </a:prstGeom>
-            <a:ln/>
-          </p:spPr>
-          <p:style>
-            <a:lnRef idx="2">
-              <a:schemeClr val="dk1"/>
-            </a:lnRef>
-            <a:fillRef idx="1">
-              <a:schemeClr val="lt1"/>
-            </a:fillRef>
-            <a:effectRef idx="0">
-              <a:schemeClr val="dk1"/>
-            </a:effectRef>
-            <a:fontRef idx="minor">
-              <a:schemeClr val="dk1"/>
-            </a:fontRef>
-          </p:style>
-          <p:txBody>
-            <a:bodyPr rtlCol="0" anchor="ctr"/>
-            <a:lstStyle/>
-            <a:p>
-              <a:pPr algn="ctr"/>
-              <a:r>
-                <a:rPr lang="en-US" sz="1300" dirty="0" smtClean="0"/>
-                <a:t>Stuck</a:t>
-              </a:r>
-            </a:p>
-          </p:txBody>
-        </p:sp>
-        <p:cxnSp>
-          <p:nvCxnSpPr>
-            <p:cNvPr id="11" name="Straight Arrow Connector 10"/>
-            <p:cNvCxnSpPr>
-              <a:stCxn id="3" idx="6"/>
-              <a:endCxn id="31" idx="2"/>
-            </p:cNvCxnSpPr>
-            <p:nvPr/>
-          </p:nvCxnSpPr>
-          <p:spPr>
-            <a:xfrm>
-              <a:off x="6172200" y="3543300"/>
-              <a:ext cx="571500" cy="781050"/>
-            </a:xfrm>
-            <a:prstGeom prst="straightConnector1">
-              <a:avLst/>
-            </a:prstGeom>
-            <a:ln>
+              </a:rPr>
+              <a:t>call</a:t>
+            </a:r>
+            <a:endParaRPr lang="en-US" sz="1300" dirty="0">
               <a:solidFill>
-                <a:schemeClr val="tx1"/>
+                <a:schemeClr val="accent1"/>
               </a:solidFill>
-              <a:tailEnd type="arrow"/>
-            </a:ln>
-          </p:spPr>
-          <p:style>
-            <a:lnRef idx="1">
-              <a:schemeClr val="accent1"/>
-            </a:lnRef>
-            <a:fillRef idx="0">
-              <a:schemeClr val="accent1"/>
-            </a:fillRef>
-            <a:effectRef idx="0">
-              <a:schemeClr val="accent1"/>
-            </a:effectRef>
-            <a:fontRef idx="minor">
+            </a:endParaRPr>
+          </a:p>
+        </p:txBody>
+      </p:sp>
+      <p:cxnSp>
+        <p:nvCxnSpPr>
+          <p:cNvPr id="49" name="Straight Arrow Connector 48"/>
+          <p:cNvCxnSpPr>
+            <a:stCxn id="42" idx="6"/>
+            <a:endCxn id="43" idx="2"/>
+          </p:cNvCxnSpPr>
+          <p:nvPr/>
+        </p:nvCxnSpPr>
+        <p:spPr>
+          <a:xfrm>
+            <a:off x="3200400" y="5200650"/>
+            <a:ext cx="685800" cy="1588"/>
+          </a:xfrm>
+          <a:prstGeom prst="straightConnector1">
+            <a:avLst/>
+          </a:prstGeom>
+          <a:ln>
+            <a:solidFill>
               <a:schemeClr val="tx1"/>
-            </a:fontRef>
-          </p:style>
-        </p:cxnSp>
-        <p:sp>
-          <p:nvSpPr>
-            <p:cNvPr id="12" name="Flowchart: Connector 11"/>
-            <p:cNvSpPr/>
-            <p:nvPr/>
-          </p:nvSpPr>
-          <p:spPr>
-            <a:xfrm>
-              <a:off x="2800350" y="3086100"/>
-              <a:ext cx="914400" cy="914400"/>
-            </a:xfrm>
-            <a:prstGeom prst="flowChartConnector">
-              <a:avLst/>
-            </a:prstGeom>
+            </a:solidFill>
+            <a:tailEnd type="arrow"/>
+          </a:ln>
+        </p:spPr>
+        <p:style>
+          <a:lnRef idx="1">
+            <a:schemeClr val="accent1"/>
+          </a:lnRef>
+          <a:fillRef idx="0">
+            <a:schemeClr val="accent1"/>
+          </a:fillRef>
+          <a:effectRef idx="0">
+            <a:schemeClr val="accent1"/>
+          </a:effectRef>
+          <a:fontRef idx="minor">
+            <a:schemeClr val="tx1"/>
+          </a:fontRef>
+        </p:style>
+      </p:cxnSp>
+      <p:sp>
+        <p:nvSpPr>
+          <p:cNvPr id="53" name="TextBox 52"/>
+          <p:cNvSpPr txBox="1"/>
+          <p:nvPr/>
+        </p:nvSpPr>
+        <p:spPr>
+          <a:xfrm>
+            <a:off x="3371850" y="5200650"/>
+            <a:ext cx="272832" cy="292388"/>
+          </a:xfrm>
+          <a:prstGeom prst="rect">
+            <a:avLst/>
+          </a:prstGeom>
+          <a:noFill/>
+        </p:spPr>
+        <p:txBody>
+          <a:bodyPr wrap="none" rtlCol="0">
+            <a:spAutoFit/>
+          </a:bodyPr>
+          <a:lstStyle/>
+          <a:p>
+            <a:r>
+              <a:rPr lang="en-US" sz="1300" dirty="0" smtClean="0"/>
+              <a:t>a</a:t>
+            </a:r>
+            <a:endParaRPr lang="en-US" sz="1300" dirty="0"/>
+          </a:p>
+        </p:txBody>
+      </p:sp>
+      <p:cxnSp>
+        <p:nvCxnSpPr>
+          <p:cNvPr id="56" name="Straight Arrow Connector 55"/>
+          <p:cNvCxnSpPr>
+            <a:stCxn id="3" idx="4"/>
+            <a:endCxn id="44" idx="6"/>
+          </p:cNvCxnSpPr>
+          <p:nvPr/>
+        </p:nvCxnSpPr>
+        <p:spPr>
+          <a:xfrm rot="5400000">
+            <a:off x="4229100" y="3105150"/>
+            <a:ext cx="400050" cy="857250"/>
+          </a:xfrm>
+          <a:prstGeom prst="straightConnector1">
+            <a:avLst/>
+          </a:prstGeom>
+          <a:ln>
             <a:solidFill>
-              <a:schemeClr val="bg1"/>
+              <a:schemeClr val="tx1"/>
             </a:solidFill>
-            <a:ln>
-              <a:solidFill>
-                <a:schemeClr val="tx1"/>
-              </a:solidFill>
-            </a:ln>
-          </p:spPr>
-          <p:style>
-            <a:lnRef idx="2">
-              <a:schemeClr val="accent1">
-                <a:shade val="50000"/>
-              </a:schemeClr>
-            </a:lnRef>
-            <a:fillRef idx="1">
-              <a:schemeClr val="accent1"/>
-            </a:fillRef>
-            <a:effectRef idx="0">
-              <a:schemeClr val="accent1"/>
-            </a:effectRef>
-            <a:fontRef idx="minor">
-              <a:schemeClr val="lt1"/>
-            </a:fontRef>
-          </p:style>
-          <p:txBody>
-            <a:bodyPr rtlCol="0" anchor="ctr"/>
-            <a:lstStyle/>
-            <a:p>
-              <a:pPr algn="ctr"/>
-              <a:r>
-                <a:rPr lang="en-US" sz="1300" dirty="0" smtClean="0">
-                  <a:solidFill>
-                    <a:schemeClr val="tx1"/>
-                  </a:solidFill>
-                </a:rPr>
-                <a:t>Entry</a:t>
-              </a:r>
-              <a:endParaRPr lang="en-US" sz="1300" dirty="0">
-                <a:solidFill>
-                  <a:schemeClr val="tx1"/>
-                </a:solidFill>
-              </a:endParaRPr>
-            </a:p>
-          </p:txBody>
-        </p:sp>
-        <p:cxnSp>
-          <p:nvCxnSpPr>
-            <p:cNvPr id="13" name="Straight Arrow Connector 12"/>
-            <p:cNvCxnSpPr>
-              <a:stCxn id="12" idx="6"/>
-              <a:endCxn id="3" idx="2"/>
-            </p:cNvCxnSpPr>
-            <p:nvPr/>
-          </p:nvCxnSpPr>
-          <p:spPr>
-            <a:xfrm>
-              <a:off x="3714750" y="3543300"/>
-              <a:ext cx="1543050" cy="1588"/>
-            </a:xfrm>
-            <a:prstGeom prst="straightConnector1">
-              <a:avLst/>
-            </a:prstGeom>
-            <a:ln>
-              <a:solidFill>
-                <a:schemeClr val="tx1"/>
-              </a:solidFill>
-              <a:tailEnd type="arrow"/>
-            </a:ln>
-          </p:spPr>
-          <p:style>
-            <a:lnRef idx="1">
-              <a:schemeClr val="accent1"/>
-            </a:lnRef>
-            <a:fillRef idx="0">
-              <a:schemeClr val="accent1"/>
-            </a:fillRef>
-            <a:effectRef idx="0">
-              <a:schemeClr val="accent1"/>
-            </a:effectRef>
-            <a:fontRef idx="minor">
-              <a:schemeClr val="tx1"/>
-            </a:fontRef>
-          </p:style>
-        </p:cxnSp>
-        <p:sp>
-          <p:nvSpPr>
-            <p:cNvPr id="14" name="TextBox 13"/>
-            <p:cNvSpPr txBox="1"/>
-            <p:nvPr/>
-          </p:nvSpPr>
-          <p:spPr>
-            <a:xfrm>
-              <a:off x="6400800" y="3524250"/>
-              <a:ext cx="378758" cy="292388"/>
-            </a:xfrm>
-            <a:prstGeom prst="rect">
-              <a:avLst/>
-            </a:prstGeom>
-            <a:noFill/>
-          </p:spPr>
-          <p:txBody>
-            <a:bodyPr wrap="none" rtlCol="0">
-              <a:spAutoFit/>
-            </a:bodyPr>
-            <a:lstStyle/>
-            <a:p>
-              <a:r>
-                <a:rPr lang="en-US" sz="1300" dirty="0" smtClean="0">
-                  <a:solidFill>
-                    <a:schemeClr val="accent4"/>
-                  </a:solidFill>
-                </a:rPr>
-                <a:t>ret</a:t>
-              </a:r>
-              <a:endParaRPr lang="en-US" sz="1300" dirty="0">
+            <a:tailEnd type="arrow"/>
+          </a:ln>
+        </p:spPr>
+        <p:style>
+          <a:lnRef idx="1">
+            <a:schemeClr val="accent1"/>
+          </a:lnRef>
+          <a:fillRef idx="0">
+            <a:schemeClr val="accent1"/>
+          </a:fillRef>
+          <a:effectRef idx="0">
+            <a:schemeClr val="accent1"/>
+          </a:effectRef>
+          <a:fontRef idx="minor">
+            <a:schemeClr val="tx1"/>
+          </a:fontRef>
+        </p:style>
+      </p:cxnSp>
+      <p:sp>
+        <p:nvSpPr>
+          <p:cNvPr id="59" name="TextBox 58"/>
+          <p:cNvSpPr txBox="1"/>
+          <p:nvPr/>
+        </p:nvSpPr>
+        <p:spPr>
+          <a:xfrm>
+            <a:off x="4400550" y="3505200"/>
+            <a:ext cx="378758" cy="292388"/>
+          </a:xfrm>
+          <a:prstGeom prst="rect">
+            <a:avLst/>
+          </a:prstGeom>
+          <a:noFill/>
+        </p:spPr>
+        <p:txBody>
+          <a:bodyPr wrap="none" rtlCol="0">
+            <a:spAutoFit/>
+          </a:bodyPr>
+          <a:lstStyle/>
+          <a:p>
+            <a:r>
+              <a:rPr lang="en-US" sz="1300" dirty="0" smtClean="0">
                 <a:solidFill>
                   <a:schemeClr val="accent4"/>
                 </a:solidFill>
-              </a:endParaRPr>
-            </a:p>
-          </p:txBody>
-        </p:sp>
-        <p:sp>
-          <p:nvSpPr>
-            <p:cNvPr id="15" name="Freeform 14"/>
-            <p:cNvSpPr/>
-            <p:nvPr/>
-          </p:nvSpPr>
-          <p:spPr>
-            <a:xfrm flipV="1">
-              <a:off x="1771650" y="4267200"/>
-              <a:ext cx="4914900" cy="876300"/>
-            </a:xfrm>
-            <a:custGeom>
-              <a:avLst/>
-              <a:gdLst>
-                <a:gd name="connsiteX0" fmla="*/ 0 w 3154017"/>
-                <a:gd name="connsiteY0" fmla="*/ 1577009 h 1577009"/>
-                <a:gd name="connsiteX1" fmla="*/ 1510748 w 3154017"/>
-                <a:gd name="connsiteY1" fmla="*/ 0 h 1577009"/>
-                <a:gd name="connsiteX2" fmla="*/ 3154017 w 3154017"/>
-                <a:gd name="connsiteY2" fmla="*/ 1577009 h 1577009"/>
-                <a:gd name="connsiteX0" fmla="*/ 0 w 3154017"/>
-                <a:gd name="connsiteY0" fmla="*/ 1259785 h 1259785"/>
-                <a:gd name="connsiteX1" fmla="*/ 1524000 w 3154017"/>
-                <a:gd name="connsiteY1" fmla="*/ 0 h 1259785"/>
-                <a:gd name="connsiteX2" fmla="*/ 3154017 w 3154017"/>
-                <a:gd name="connsiteY2" fmla="*/ 1259785 h 1259785"/>
-                <a:gd name="connsiteX0" fmla="*/ 86415 w 3240432"/>
-                <a:gd name="connsiteY0" fmla="*/ 1481759 h 1481759"/>
-                <a:gd name="connsiteX1" fmla="*/ 1610415 w 3240432"/>
-                <a:gd name="connsiteY1" fmla="*/ 221974 h 1481759"/>
-                <a:gd name="connsiteX2" fmla="*/ 3240432 w 3240432"/>
-                <a:gd name="connsiteY2" fmla="*/ 1481759 h 1481759"/>
-                <a:gd name="connsiteX0" fmla="*/ 86415 w 3534465"/>
-                <a:gd name="connsiteY0" fmla="*/ 1481759 h 1481759"/>
-                <a:gd name="connsiteX1" fmla="*/ 1610415 w 3534465"/>
-                <a:gd name="connsiteY1" fmla="*/ 221974 h 1481759"/>
-                <a:gd name="connsiteX2" fmla="*/ 3240432 w 3534465"/>
-                <a:gd name="connsiteY2" fmla="*/ 1481759 h 1481759"/>
-                <a:gd name="connsiteX0" fmla="*/ 86415 w 3534465"/>
-                <a:gd name="connsiteY0" fmla="*/ 1596059 h 1596059"/>
-                <a:gd name="connsiteX1" fmla="*/ 1610415 w 3534465"/>
-                <a:gd name="connsiteY1" fmla="*/ 221974 h 1596059"/>
-                <a:gd name="connsiteX2" fmla="*/ 3240432 w 3534465"/>
-                <a:gd name="connsiteY2" fmla="*/ 1596059 h 1596059"/>
-                <a:gd name="connsiteX0" fmla="*/ 86415 w 3406913"/>
-                <a:gd name="connsiteY0" fmla="*/ 1596059 h 1596059"/>
-                <a:gd name="connsiteX1" fmla="*/ 1610415 w 3406913"/>
-                <a:gd name="connsiteY1" fmla="*/ 221974 h 1596059"/>
-                <a:gd name="connsiteX2" fmla="*/ 3240432 w 3406913"/>
-                <a:gd name="connsiteY2" fmla="*/ 1596059 h 1596059"/>
-                <a:gd name="connsiteX0" fmla="*/ 0 w 3320498"/>
-                <a:gd name="connsiteY0" fmla="*/ 1530626 h 1530626"/>
-                <a:gd name="connsiteX1" fmla="*/ 1524000 w 3320498"/>
-                <a:gd name="connsiteY1" fmla="*/ 156541 h 1530626"/>
-                <a:gd name="connsiteX2" fmla="*/ 3154017 w 3320498"/>
-                <a:gd name="connsiteY2" fmla="*/ 1530626 h 1530626"/>
-                <a:gd name="connsiteX0" fmla="*/ 0 w 3154017"/>
-                <a:gd name="connsiteY0" fmla="*/ 1530626 h 1530626"/>
-                <a:gd name="connsiteX1" fmla="*/ 1524000 w 3154017"/>
-                <a:gd name="connsiteY1" fmla="*/ 156541 h 1530626"/>
-                <a:gd name="connsiteX2" fmla="*/ 3154017 w 3154017"/>
-                <a:gd name="connsiteY2" fmla="*/ 1530626 h 1530626"/>
-                <a:gd name="connsiteX0" fmla="*/ 0 w 3154017"/>
-                <a:gd name="connsiteY0" fmla="*/ 1359177 h 1359177"/>
-                <a:gd name="connsiteX1" fmla="*/ 1524000 w 3154017"/>
-                <a:gd name="connsiteY1" fmla="*/ 156541 h 1359177"/>
-                <a:gd name="connsiteX2" fmla="*/ 3154017 w 3154017"/>
-                <a:gd name="connsiteY2" fmla="*/ 1359177 h 1359177"/>
-                <a:gd name="connsiteX0" fmla="*/ 0 w 3154017"/>
-                <a:gd name="connsiteY0" fmla="*/ 1359177 h 1359177"/>
-                <a:gd name="connsiteX1" fmla="*/ 1524000 w 3154017"/>
-                <a:gd name="connsiteY1" fmla="*/ 156541 h 1359177"/>
-                <a:gd name="connsiteX2" fmla="*/ 3154017 w 3154017"/>
-                <a:gd name="connsiteY2" fmla="*/ 1359177 h 1359177"/>
-                <a:gd name="connsiteX0" fmla="*/ 0 w 3154017"/>
-                <a:gd name="connsiteY0" fmla="*/ 1202636 h 1202636"/>
-                <a:gd name="connsiteX1" fmla="*/ 1524000 w 3154017"/>
-                <a:gd name="connsiteY1" fmla="*/ 0 h 1202636"/>
-                <a:gd name="connsiteX2" fmla="*/ 3154017 w 3154017"/>
-                <a:gd name="connsiteY2" fmla="*/ 1202636 h 1202636"/>
-                <a:gd name="connsiteX0" fmla="*/ 0 w 3154017"/>
-                <a:gd name="connsiteY0" fmla="*/ 1333500 h 1333500"/>
-                <a:gd name="connsiteX1" fmla="*/ 1524000 w 3154017"/>
-                <a:gd name="connsiteY1" fmla="*/ 130864 h 1333500"/>
-                <a:gd name="connsiteX2" fmla="*/ 3154017 w 3154017"/>
-                <a:gd name="connsiteY2" fmla="*/ 1333500 h 1333500"/>
-                <a:gd name="connsiteX0" fmla="*/ 0 w 3154017"/>
-                <a:gd name="connsiteY0" fmla="*/ 1333500 h 1333500"/>
-                <a:gd name="connsiteX1" fmla="*/ 1524000 w 3154017"/>
-                <a:gd name="connsiteY1" fmla="*/ 130864 h 1333500"/>
-                <a:gd name="connsiteX2" fmla="*/ 3154017 w 3154017"/>
-                <a:gd name="connsiteY2" fmla="*/ 1333500 h 1333500"/>
-                <a:gd name="connsiteX0" fmla="*/ 0 w 3154017"/>
-                <a:gd name="connsiteY0" fmla="*/ 1202636 h 1202636"/>
-                <a:gd name="connsiteX1" fmla="*/ 1524000 w 3154017"/>
-                <a:gd name="connsiteY1" fmla="*/ 0 h 1202636"/>
-                <a:gd name="connsiteX2" fmla="*/ 3154017 w 3154017"/>
-                <a:gd name="connsiteY2" fmla="*/ 1202636 h 1202636"/>
-                <a:gd name="connsiteX0" fmla="*/ 0 w 3154017"/>
-                <a:gd name="connsiteY0" fmla="*/ 1202636 h 1202636"/>
-                <a:gd name="connsiteX1" fmla="*/ 1524000 w 3154017"/>
-                <a:gd name="connsiteY1" fmla="*/ 0 h 1202636"/>
-                <a:gd name="connsiteX2" fmla="*/ 3154017 w 3154017"/>
-                <a:gd name="connsiteY2" fmla="*/ 1202636 h 1202636"/>
-                <a:gd name="connsiteX0" fmla="*/ 0 w 3154017"/>
-                <a:gd name="connsiteY0" fmla="*/ 1236596 h 1236596"/>
-                <a:gd name="connsiteX1" fmla="*/ 1524000 w 3154017"/>
-                <a:gd name="connsiteY1" fmla="*/ 33960 h 1236596"/>
-                <a:gd name="connsiteX2" fmla="*/ 3154017 w 3154017"/>
-                <a:gd name="connsiteY2" fmla="*/ 1236596 h 1236596"/>
-                <a:gd name="connsiteX0" fmla="*/ 0 w 3154017"/>
-                <a:gd name="connsiteY0" fmla="*/ 1202636 h 1202636"/>
-                <a:gd name="connsiteX1" fmla="*/ 1524000 w 3154017"/>
-                <a:gd name="connsiteY1" fmla="*/ 0 h 1202636"/>
-                <a:gd name="connsiteX2" fmla="*/ 3154017 w 3154017"/>
-                <a:gd name="connsiteY2" fmla="*/ 1202636 h 1202636"/>
-              </a:gdLst>
-              <a:ahLst/>
-              <a:cxnLst>
-                <a:cxn ang="0">
-                  <a:pos x="connsiteX0" y="connsiteY0"/>
-                </a:cxn>
-                <a:cxn ang="0">
-                  <a:pos x="connsiteX1" y="connsiteY1"/>
-                </a:cxn>
-                <a:cxn ang="0">
-                  <a:pos x="connsiteX2" y="connsiteY2"/>
-                </a:cxn>
-              </a:cxnLst>
-              <a:rect l="l" t="t" r="r" b="b"/>
-              <a:pathLst>
-                <a:path w="3154017" h="1202636">
-                  <a:moveTo>
-                    <a:pt x="0" y="1202636"/>
-                  </a:moveTo>
-                  <a:cubicBezTo>
-                    <a:pt x="508000" y="782708"/>
-                    <a:pt x="515178" y="10769"/>
-                    <a:pt x="1524000" y="0"/>
-                  </a:cubicBezTo>
-                  <a:cubicBezTo>
-                    <a:pt x="2520398" y="19877"/>
-                    <a:pt x="2610678" y="782708"/>
-                    <a:pt x="3154017" y="1202636"/>
-                  </a:cubicBezTo>
-                </a:path>
-              </a:pathLst>
-            </a:custGeom>
-            <a:ln>
+              </a:rPr>
+              <a:t>ret</a:t>
+            </a:r>
+            <a:endParaRPr lang="en-US" sz="1300" dirty="0">
               <a:solidFill>
-                <a:schemeClr val="tx1"/>
+                <a:schemeClr val="accent4"/>
               </a:solidFill>
-            </a:ln>
-          </p:spPr>
-          <p:style>
-            <a:lnRef idx="1">
-              <a:schemeClr val="accent1"/>
-            </a:lnRef>
-            <a:fillRef idx="0">
-              <a:schemeClr val="accent1"/>
-            </a:fillRef>
-            <a:effectRef idx="0">
-              <a:schemeClr val="accent1"/>
-            </a:effectRef>
-            <a:fontRef idx="minor">
-              <a:schemeClr val="tx1"/>
-            </a:fontRef>
-          </p:style>
-          <p:txBody>
-            <a:bodyPr rtlCol="0" anchor="ctr"/>
-            <a:lstStyle/>
-            <a:p>
-              <a:pPr algn="ctr"/>
-              <a:endParaRPr lang="en-US"/>
-            </a:p>
-          </p:txBody>
-        </p:sp>
-        <p:sp>
-          <p:nvSpPr>
-            <p:cNvPr id="30" name="Flowchart: Connector 29"/>
-            <p:cNvSpPr/>
-            <p:nvPr/>
-          </p:nvSpPr>
-          <p:spPr>
-            <a:xfrm>
-              <a:off x="3829050" y="1657350"/>
-              <a:ext cx="914400" cy="914400"/>
-            </a:xfrm>
-            <a:prstGeom prst="flowChartConnector">
-              <a:avLst/>
-            </a:prstGeom>
-            <a:solidFill>
-              <a:schemeClr val="bg1"/>
-            </a:solidFill>
-            <a:ln w="88900" cmpd="dbl">
-              <a:solidFill>
-                <a:schemeClr val="tx1"/>
-              </a:solidFill>
-            </a:ln>
-          </p:spPr>
-          <p:style>
-            <a:lnRef idx="2">
-              <a:schemeClr val="accent1">
-                <a:shade val="50000"/>
-              </a:schemeClr>
-            </a:lnRef>
-            <a:fillRef idx="1">
-              <a:schemeClr val="accent1"/>
-            </a:fillRef>
-            <a:effectRef idx="0">
-              <a:schemeClr val="accent1"/>
-            </a:effectRef>
-            <a:fontRef idx="minor">
-              <a:schemeClr val="lt1"/>
-            </a:fontRef>
-          </p:style>
-          <p:txBody>
-            <a:bodyPr rtlCol="0" anchor="ctr"/>
-            <a:lstStyle/>
-            <a:p>
-              <a:pPr algn="ctr"/>
-              <a:r>
-                <a:rPr lang="en-US" sz="1300" dirty="0" smtClean="0">
-                  <a:solidFill>
-                    <a:schemeClr val="tx1"/>
-                  </a:solidFill>
-                </a:rPr>
-                <a:t>Begin’</a:t>
-              </a:r>
-              <a:endParaRPr lang="en-US" sz="1300" dirty="0">
-                <a:solidFill>
-                  <a:schemeClr val="tx1"/>
-                </a:solidFill>
-              </a:endParaRPr>
-            </a:p>
-          </p:txBody>
-        </p:sp>
-        <p:sp>
-          <p:nvSpPr>
-            <p:cNvPr id="31" name="Flowchart: Connector 30"/>
-            <p:cNvSpPr/>
-            <p:nvPr/>
-          </p:nvSpPr>
-          <p:spPr>
-            <a:xfrm>
-              <a:off x="6743700" y="3867150"/>
-              <a:ext cx="914400" cy="914400"/>
-            </a:xfrm>
-            <a:prstGeom prst="flowChartConnector">
-              <a:avLst/>
-            </a:prstGeom>
-            <a:ln/>
-          </p:spPr>
-          <p:style>
-            <a:lnRef idx="2">
-              <a:schemeClr val="dk1"/>
-            </a:lnRef>
-            <a:fillRef idx="1">
-              <a:schemeClr val="lt1"/>
-            </a:fillRef>
-            <a:effectRef idx="0">
-              <a:schemeClr val="dk1"/>
-            </a:effectRef>
-            <a:fontRef idx="minor">
-              <a:schemeClr val="dk1"/>
-            </a:fontRef>
-          </p:style>
-          <p:txBody>
-            <a:bodyPr rtlCol="0" anchor="ctr"/>
-            <a:lstStyle/>
-            <a:p>
-              <a:pPr algn="ctr"/>
-              <a:r>
-                <a:rPr lang="en-US" sz="1300" dirty="0" smtClean="0"/>
-                <a:t>End</a:t>
-              </a:r>
-              <a:endParaRPr lang="en-US" sz="1300" dirty="0"/>
-            </a:p>
-          </p:txBody>
-        </p:sp>
-        <p:sp>
-          <p:nvSpPr>
-            <p:cNvPr id="42" name="Flowchart: Connector 41"/>
-            <p:cNvSpPr/>
-            <p:nvPr/>
-          </p:nvSpPr>
-          <p:spPr>
-            <a:xfrm>
-              <a:off x="3143250" y="5410200"/>
-              <a:ext cx="914400" cy="914400"/>
-            </a:xfrm>
-            <a:prstGeom prst="flowChartConnector">
-              <a:avLst/>
-            </a:prstGeom>
-            <a:ln/>
-          </p:spPr>
-          <p:style>
-            <a:lnRef idx="2">
-              <a:schemeClr val="dk1"/>
-            </a:lnRef>
-            <a:fillRef idx="1">
-              <a:schemeClr val="lt1"/>
-            </a:fillRef>
-            <a:effectRef idx="0">
-              <a:schemeClr val="dk1"/>
-            </a:effectRef>
-            <a:fontRef idx="minor">
-              <a:schemeClr val="dk1"/>
-            </a:fontRef>
-          </p:style>
-          <p:txBody>
-            <a:bodyPr rtlCol="0" anchor="ctr"/>
-            <a:lstStyle/>
-            <a:p>
-              <a:pPr algn="ctr"/>
-              <a:r>
-                <a:rPr lang="en-US" sz="1300" dirty="0" smtClean="0"/>
-                <a:t>Entry’</a:t>
-              </a:r>
-              <a:endParaRPr lang="en-US" sz="1300" dirty="0"/>
-            </a:p>
-          </p:txBody>
-        </p:sp>
-        <p:sp>
-          <p:nvSpPr>
-            <p:cNvPr id="43" name="Flowchart: Connector 42"/>
-            <p:cNvSpPr/>
-            <p:nvPr/>
-          </p:nvSpPr>
-          <p:spPr>
-            <a:xfrm>
-              <a:off x="4743450" y="5410200"/>
-              <a:ext cx="914400" cy="914400"/>
-            </a:xfrm>
-            <a:prstGeom prst="flowChartConnector">
-              <a:avLst/>
-            </a:prstGeom>
-            <a:ln/>
-          </p:spPr>
-          <p:style>
-            <a:lnRef idx="2">
-              <a:schemeClr val="dk1"/>
-            </a:lnRef>
-            <a:fillRef idx="1">
-              <a:schemeClr val="lt1"/>
-            </a:fillRef>
-            <a:effectRef idx="0">
-              <a:schemeClr val="dk1"/>
-            </a:effectRef>
-            <a:fontRef idx="minor">
-              <a:schemeClr val="dk1"/>
-            </a:fontRef>
-          </p:style>
-          <p:txBody>
-            <a:bodyPr rtlCol="0" anchor="ctr"/>
-            <a:lstStyle/>
-            <a:p>
-              <a:pPr algn="ctr"/>
-              <a:r>
-                <a:rPr lang="en-US" sz="1300" dirty="0" smtClean="0"/>
-                <a:t>Exit’</a:t>
-              </a:r>
-              <a:endParaRPr lang="en-US" sz="1300" dirty="0"/>
-            </a:p>
-          </p:txBody>
-        </p:sp>
-        <p:sp>
-          <p:nvSpPr>
-            <p:cNvPr id="44" name="Flowchart: Connector 43"/>
-            <p:cNvSpPr/>
-            <p:nvPr/>
-          </p:nvSpPr>
-          <p:spPr>
-            <a:xfrm>
-              <a:off x="3943350" y="3943350"/>
-              <a:ext cx="914400" cy="914400"/>
-            </a:xfrm>
-            <a:prstGeom prst="flowChartConnector">
-              <a:avLst/>
-            </a:prstGeom>
-            <a:ln/>
-          </p:spPr>
-          <p:style>
-            <a:lnRef idx="2">
-              <a:schemeClr val="dk1"/>
-            </a:lnRef>
-            <a:fillRef idx="1">
-              <a:schemeClr val="lt1"/>
-            </a:fillRef>
-            <a:effectRef idx="0">
-              <a:schemeClr val="dk1"/>
-            </a:effectRef>
-            <a:fontRef idx="minor">
-              <a:schemeClr val="dk1"/>
-            </a:fontRef>
-          </p:style>
-          <p:txBody>
-            <a:bodyPr rtlCol="0" anchor="ctr"/>
-            <a:lstStyle/>
-            <a:p>
-              <a:pPr algn="ctr"/>
-              <a:r>
-                <a:rPr lang="en-US" sz="1300" dirty="0" smtClean="0"/>
-                <a:t>End’</a:t>
-              </a:r>
-              <a:endParaRPr lang="en-US" sz="1300" dirty="0"/>
-            </a:p>
-          </p:txBody>
-        </p:sp>
-        <p:cxnSp>
-          <p:nvCxnSpPr>
-            <p:cNvPr id="45" name="Straight Arrow Connector 44"/>
-            <p:cNvCxnSpPr>
-              <a:stCxn id="30" idx="3"/>
-              <a:endCxn id="12" idx="1"/>
-            </p:cNvCxnSpPr>
-            <p:nvPr/>
-          </p:nvCxnSpPr>
-          <p:spPr>
-            <a:xfrm rot="5400000">
-              <a:off x="3057525" y="2314575"/>
-              <a:ext cx="782172" cy="1028700"/>
-            </a:xfrm>
-            <a:prstGeom prst="straightConnector1">
-              <a:avLst/>
-            </a:prstGeom>
-            <a:ln>
-              <a:solidFill>
-                <a:schemeClr val="tx1"/>
-              </a:solidFill>
-              <a:tailEnd type="arrow"/>
-            </a:ln>
-          </p:spPr>
-          <p:style>
-            <a:lnRef idx="1">
-              <a:schemeClr val="accent1"/>
-            </a:lnRef>
-            <a:fillRef idx="0">
-              <a:schemeClr val="accent1"/>
-            </a:fillRef>
-            <a:effectRef idx="0">
-              <a:schemeClr val="accent1"/>
-            </a:effectRef>
-            <a:fontRef idx="minor">
-              <a:schemeClr val="tx1"/>
-            </a:fontRef>
-          </p:style>
-        </p:cxnSp>
-        <p:sp>
-          <p:nvSpPr>
-            <p:cNvPr id="48" name="TextBox 47"/>
-            <p:cNvSpPr txBox="1"/>
-            <p:nvPr/>
-          </p:nvSpPr>
-          <p:spPr>
-            <a:xfrm>
-              <a:off x="3200400" y="2514600"/>
-              <a:ext cx="410882" cy="292388"/>
-            </a:xfrm>
-            <a:prstGeom prst="rect">
-              <a:avLst/>
-            </a:prstGeom>
-            <a:noFill/>
-          </p:spPr>
-          <p:txBody>
-            <a:bodyPr wrap="none" rtlCol="0">
-              <a:spAutoFit/>
-            </a:bodyPr>
-            <a:lstStyle/>
-            <a:p>
-              <a:r>
-                <a:rPr lang="en-US" sz="1300" dirty="0" smtClean="0">
-                  <a:solidFill>
-                    <a:schemeClr val="accent1"/>
-                  </a:solidFill>
-                </a:rPr>
-                <a:t>call</a:t>
-              </a:r>
-              <a:endParaRPr lang="en-US" sz="1300" dirty="0">
-                <a:solidFill>
-                  <a:schemeClr val="accent1"/>
-                </a:solidFill>
-              </a:endParaRPr>
-            </a:p>
-          </p:txBody>
-        </p:sp>
-        <p:cxnSp>
-          <p:nvCxnSpPr>
-            <p:cNvPr id="49" name="Straight Arrow Connector 48"/>
-            <p:cNvCxnSpPr>
-              <a:stCxn id="42" idx="6"/>
-              <a:endCxn id="43" idx="2"/>
-            </p:cNvCxnSpPr>
-            <p:nvPr/>
-          </p:nvCxnSpPr>
-          <p:spPr>
-            <a:xfrm>
-              <a:off x="4057650" y="5867400"/>
-              <a:ext cx="685800" cy="1588"/>
-            </a:xfrm>
-            <a:prstGeom prst="straightConnector1">
-              <a:avLst/>
-            </a:prstGeom>
-            <a:ln>
-              <a:solidFill>
-                <a:schemeClr val="tx1"/>
-              </a:solidFill>
-              <a:tailEnd type="arrow"/>
-            </a:ln>
-          </p:spPr>
-          <p:style>
-            <a:lnRef idx="1">
-              <a:schemeClr val="accent1"/>
-            </a:lnRef>
-            <a:fillRef idx="0">
-              <a:schemeClr val="accent1"/>
-            </a:fillRef>
-            <a:effectRef idx="0">
-              <a:schemeClr val="accent1"/>
-            </a:effectRef>
-            <a:fontRef idx="minor">
-              <a:schemeClr val="tx1"/>
-            </a:fontRef>
-          </p:style>
-        </p:cxnSp>
-        <p:sp>
-          <p:nvSpPr>
-            <p:cNvPr id="53" name="TextBox 52"/>
-            <p:cNvSpPr txBox="1"/>
-            <p:nvPr/>
-          </p:nvSpPr>
-          <p:spPr>
-            <a:xfrm>
-              <a:off x="4229100" y="5867400"/>
-              <a:ext cx="272832" cy="292388"/>
-            </a:xfrm>
-            <a:prstGeom prst="rect">
-              <a:avLst/>
-            </a:prstGeom>
-            <a:noFill/>
-          </p:spPr>
-          <p:txBody>
-            <a:bodyPr wrap="none" rtlCol="0">
-              <a:spAutoFit/>
-            </a:bodyPr>
-            <a:lstStyle/>
-            <a:p>
-              <a:r>
-                <a:rPr lang="en-US" sz="1300" dirty="0" smtClean="0"/>
-                <a:t>a</a:t>
-              </a:r>
-              <a:endParaRPr lang="en-US" sz="1300" dirty="0"/>
-            </a:p>
-          </p:txBody>
-        </p:sp>
-        <p:cxnSp>
-          <p:nvCxnSpPr>
-            <p:cNvPr id="56" name="Straight Arrow Connector 55"/>
-            <p:cNvCxnSpPr>
-              <a:stCxn id="3" idx="4"/>
-              <a:endCxn id="44" idx="6"/>
-            </p:cNvCxnSpPr>
-            <p:nvPr/>
-          </p:nvCxnSpPr>
-          <p:spPr>
-            <a:xfrm rot="5400000">
-              <a:off x="5086350" y="3771900"/>
-              <a:ext cx="400050" cy="857250"/>
-            </a:xfrm>
-            <a:prstGeom prst="straightConnector1">
-              <a:avLst/>
-            </a:prstGeom>
-            <a:ln>
-              <a:solidFill>
-                <a:schemeClr val="tx1"/>
-              </a:solidFill>
-              <a:tailEnd type="arrow"/>
-            </a:ln>
-          </p:spPr>
-          <p:style>
-            <a:lnRef idx="1">
-              <a:schemeClr val="accent1"/>
-            </a:lnRef>
-            <a:fillRef idx="0">
-              <a:schemeClr val="accent1"/>
-            </a:fillRef>
-            <a:effectRef idx="0">
-              <a:schemeClr val="accent1"/>
-            </a:effectRef>
-            <a:fontRef idx="minor">
-              <a:schemeClr val="tx1"/>
-            </a:fontRef>
-          </p:style>
-        </p:cxnSp>
-        <p:sp>
-          <p:nvSpPr>
-            <p:cNvPr id="59" name="TextBox 58"/>
-            <p:cNvSpPr txBox="1"/>
-            <p:nvPr/>
-          </p:nvSpPr>
-          <p:spPr>
-            <a:xfrm>
-              <a:off x="5257800" y="4171950"/>
-              <a:ext cx="378758" cy="292388"/>
-            </a:xfrm>
-            <a:prstGeom prst="rect">
-              <a:avLst/>
-            </a:prstGeom>
-            <a:noFill/>
-          </p:spPr>
-          <p:txBody>
-            <a:bodyPr wrap="none" rtlCol="0">
-              <a:spAutoFit/>
-            </a:bodyPr>
-            <a:lstStyle/>
-            <a:p>
-              <a:r>
-                <a:rPr lang="en-US" sz="1300" dirty="0" smtClean="0">
-                  <a:solidFill>
-                    <a:schemeClr val="accent4"/>
-                  </a:solidFill>
-                </a:rPr>
-                <a:t>ret</a:t>
-              </a:r>
-              <a:endParaRPr lang="en-US" sz="1300" dirty="0">
+            </a:endParaRPr>
+          </a:p>
+        </p:txBody>
+      </p:sp>
+      <p:sp>
+        <p:nvSpPr>
+          <p:cNvPr id="65" name="TextBox 64"/>
+          <p:cNvSpPr txBox="1"/>
+          <p:nvPr/>
+        </p:nvSpPr>
+        <p:spPr>
+          <a:xfrm>
+            <a:off x="3829050" y="2190750"/>
+            <a:ext cx="378758" cy="292388"/>
+          </a:xfrm>
+          <a:prstGeom prst="rect">
+            <a:avLst/>
+          </a:prstGeom>
+          <a:noFill/>
+        </p:spPr>
+        <p:txBody>
+          <a:bodyPr wrap="none" rtlCol="0">
+            <a:spAutoFit/>
+          </a:bodyPr>
+          <a:lstStyle/>
+          <a:p>
+            <a:r>
+              <a:rPr lang="en-US" sz="1300" dirty="0" smtClean="0">
                 <a:solidFill>
                   <a:schemeClr val="accent4"/>
                 </a:solidFill>
-              </a:endParaRPr>
-            </a:p>
-          </p:txBody>
-        </p:sp>
-        <p:cxnSp>
-          <p:nvCxnSpPr>
-            <p:cNvPr id="60" name="Straight Arrow Connector 59"/>
-            <p:cNvCxnSpPr>
-              <a:stCxn id="3" idx="1"/>
-              <a:endCxn id="30" idx="5"/>
-            </p:cNvCxnSpPr>
-            <p:nvPr/>
-          </p:nvCxnSpPr>
-          <p:spPr>
-            <a:xfrm rot="16200000" flipV="1">
-              <a:off x="4609539" y="2437839"/>
-              <a:ext cx="782172" cy="782172"/>
-            </a:xfrm>
-            <a:prstGeom prst="straightConnector1">
-              <a:avLst/>
-            </a:prstGeom>
-            <a:ln>
+              </a:rPr>
+              <a:t>ret</a:t>
+            </a:r>
+            <a:endParaRPr lang="en-US" sz="1300" dirty="0">
               <a:solidFill>
-                <a:schemeClr val="tx1"/>
+                <a:schemeClr val="accent4"/>
               </a:solidFill>
-              <a:tailEnd type="arrow"/>
-            </a:ln>
-          </p:spPr>
-          <p:style>
-            <a:lnRef idx="1">
-              <a:schemeClr val="accent1"/>
-            </a:lnRef>
-            <a:fillRef idx="0">
-              <a:schemeClr val="accent1"/>
-            </a:fillRef>
-            <a:effectRef idx="0">
-              <a:schemeClr val="accent1"/>
-            </a:effectRef>
-            <a:fontRef idx="minor">
-              <a:schemeClr val="tx1"/>
-            </a:fontRef>
-          </p:style>
-        </p:cxnSp>
-        <p:sp>
-          <p:nvSpPr>
-            <p:cNvPr id="65" name="TextBox 64"/>
-            <p:cNvSpPr txBox="1"/>
-            <p:nvPr/>
-          </p:nvSpPr>
-          <p:spPr>
-            <a:xfrm>
-              <a:off x="4686300" y="2857500"/>
-              <a:ext cx="378758" cy="292388"/>
-            </a:xfrm>
-            <a:prstGeom prst="rect">
-              <a:avLst/>
-            </a:prstGeom>
-            <a:noFill/>
-          </p:spPr>
-          <p:txBody>
-            <a:bodyPr wrap="none" rtlCol="0">
-              <a:spAutoFit/>
-            </a:bodyPr>
-            <a:lstStyle/>
-            <a:p>
-              <a:r>
-                <a:rPr lang="en-US" sz="1300" dirty="0" smtClean="0">
-                  <a:solidFill>
-                    <a:schemeClr val="accent4"/>
-                  </a:solidFill>
-                </a:rPr>
-                <a:t>ret</a:t>
-              </a:r>
-              <a:endParaRPr lang="en-US" sz="1300" dirty="0">
+            </a:endParaRPr>
+          </a:p>
+        </p:txBody>
+      </p:sp>
+      <p:sp>
+        <p:nvSpPr>
+          <p:cNvPr id="87" name="TextBox 86"/>
+          <p:cNvSpPr txBox="1"/>
+          <p:nvPr/>
+        </p:nvSpPr>
+        <p:spPr>
+          <a:xfrm>
+            <a:off x="4400550" y="1790700"/>
+            <a:ext cx="400050" cy="292388"/>
+          </a:xfrm>
+          <a:prstGeom prst="rect">
+            <a:avLst/>
+          </a:prstGeom>
+          <a:noFill/>
+        </p:spPr>
+        <p:txBody>
+          <a:bodyPr wrap="square" rtlCol="0">
+            <a:spAutoFit/>
+          </a:bodyPr>
+          <a:lstStyle/>
+          <a:p>
+            <a:r>
+              <a:rPr lang="en-US" sz="1300" dirty="0" smtClean="0">
                 <a:solidFill>
                   <a:schemeClr val="accent4"/>
                 </a:solidFill>
-              </a:endParaRPr>
-            </a:p>
-          </p:txBody>
-        </p:sp>
-        <p:cxnSp>
-          <p:nvCxnSpPr>
-            <p:cNvPr id="83" name="Straight Arrow Connector 82"/>
-            <p:cNvCxnSpPr>
-              <a:stCxn id="3" idx="0"/>
-              <a:endCxn id="30" idx="6"/>
-            </p:cNvCxnSpPr>
-            <p:nvPr/>
-          </p:nvCxnSpPr>
-          <p:spPr>
-            <a:xfrm rot="16200000" flipV="1">
-              <a:off x="4743450" y="2114550"/>
-              <a:ext cx="971550" cy="971550"/>
-            </a:xfrm>
-            <a:prstGeom prst="straightConnector1">
-              <a:avLst/>
-            </a:prstGeom>
-            <a:ln>
+              </a:rPr>
+              <a:t>ret</a:t>
+            </a:r>
+            <a:endParaRPr lang="en-US" sz="1300" dirty="0">
               <a:solidFill>
-                <a:schemeClr val="tx1"/>
+                <a:schemeClr val="accent4"/>
               </a:solidFill>
-              <a:tailEnd type="arrow"/>
-            </a:ln>
-          </p:spPr>
-          <p:style>
-            <a:lnRef idx="1">
-              <a:schemeClr val="accent1"/>
-            </a:lnRef>
-            <a:fillRef idx="0">
-              <a:schemeClr val="accent1"/>
-            </a:fillRef>
-            <a:effectRef idx="0">
-              <a:schemeClr val="accent1"/>
-            </a:effectRef>
-            <a:fontRef idx="minor">
+            </a:endParaRPr>
+          </a:p>
+        </p:txBody>
+      </p:sp>
+      <p:sp>
+        <p:nvSpPr>
+          <p:cNvPr id="51" name="Freeform 50"/>
+          <p:cNvSpPr/>
+          <p:nvPr/>
+        </p:nvSpPr>
+        <p:spPr>
+          <a:xfrm>
+            <a:off x="3095469" y="1813810"/>
+            <a:ext cx="836951" cy="364760"/>
+          </a:xfrm>
+          <a:custGeom>
+            <a:avLst/>
+            <a:gdLst>
+              <a:gd name="connsiteX0" fmla="*/ 0 w 836951"/>
+              <a:gd name="connsiteY0" fmla="*/ 0 h 364760"/>
+              <a:gd name="connsiteX1" fmla="*/ 479685 w 836951"/>
+              <a:gd name="connsiteY1" fmla="*/ 329783 h 364760"/>
+              <a:gd name="connsiteX2" fmla="*/ 794479 w 836951"/>
+              <a:gd name="connsiteY2" fmla="*/ 209862 h 364760"/>
+              <a:gd name="connsiteX3" fmla="*/ 734518 w 836951"/>
+              <a:gd name="connsiteY3" fmla="*/ 29980 h 364760"/>
+            </a:gdLst>
+            <a:ahLst/>
+            <a:cxnLst>
+              <a:cxn ang="0">
+                <a:pos x="connsiteX0" y="connsiteY0"/>
+              </a:cxn>
+              <a:cxn ang="0">
+                <a:pos x="connsiteX1" y="connsiteY1"/>
+              </a:cxn>
+              <a:cxn ang="0">
+                <a:pos x="connsiteX2" y="connsiteY2"/>
+              </a:cxn>
+              <a:cxn ang="0">
+                <a:pos x="connsiteX3" y="connsiteY3"/>
+              </a:cxn>
+            </a:cxnLst>
+            <a:rect l="l" t="t" r="r" b="b"/>
+            <a:pathLst>
+              <a:path w="836951" h="364760">
+                <a:moveTo>
+                  <a:pt x="0" y="0"/>
+                </a:moveTo>
+                <a:cubicBezTo>
+                  <a:pt x="173636" y="147403"/>
+                  <a:pt x="347272" y="294806"/>
+                  <a:pt x="479685" y="329783"/>
+                </a:cubicBezTo>
+                <a:cubicBezTo>
+                  <a:pt x="612098" y="364760"/>
+                  <a:pt x="752007" y="259829"/>
+                  <a:pt x="794479" y="209862"/>
+                </a:cubicBezTo>
+                <a:cubicBezTo>
+                  <a:pt x="836951" y="159895"/>
+                  <a:pt x="785734" y="94937"/>
+                  <a:pt x="734518" y="29980"/>
+                </a:cubicBezTo>
+              </a:path>
+            </a:pathLst>
+          </a:custGeom>
+          <a:ln>
+            <a:solidFill>
               <a:schemeClr val="tx1"/>
-            </a:fontRef>
-          </p:style>
-        </p:cxnSp>
-        <p:sp>
-          <p:nvSpPr>
-            <p:cNvPr id="87" name="TextBox 86"/>
-            <p:cNvSpPr txBox="1"/>
-            <p:nvPr/>
-          </p:nvSpPr>
-          <p:spPr>
-            <a:xfrm>
-              <a:off x="5257800" y="2457450"/>
-              <a:ext cx="400050" cy="292388"/>
-            </a:xfrm>
-            <a:prstGeom prst="rect">
-              <a:avLst/>
-            </a:prstGeom>
-            <a:noFill/>
-          </p:spPr>
-          <p:txBody>
-            <a:bodyPr wrap="square" rtlCol="0">
-              <a:spAutoFit/>
-            </a:bodyPr>
-            <a:lstStyle/>
-            <a:p>
-              <a:r>
-                <a:rPr lang="en-US" sz="1300" dirty="0" smtClean="0">
-                  <a:solidFill>
-                    <a:schemeClr val="accent4"/>
-                  </a:solidFill>
-                </a:rPr>
-                <a:t>ret</a:t>
-              </a:r>
-              <a:endParaRPr lang="en-US" sz="1300" dirty="0">
-                <a:solidFill>
-                  <a:schemeClr val="accent4"/>
-                </a:solidFill>
-              </a:endParaRPr>
-            </a:p>
-          </p:txBody>
-        </p:sp>
-        <p:sp>
-          <p:nvSpPr>
-            <p:cNvPr id="88" name="Freeform 87"/>
-            <p:cNvSpPr/>
-            <p:nvPr/>
-          </p:nvSpPr>
-          <p:spPr>
-            <a:xfrm flipV="1">
-              <a:off x="3943350" y="2457450"/>
-              <a:ext cx="685800" cy="514350"/>
-            </a:xfrm>
-            <a:custGeom>
-              <a:avLst/>
-              <a:gdLst>
-                <a:gd name="connsiteX0" fmla="*/ 0 w 3154017"/>
-                <a:gd name="connsiteY0" fmla="*/ 1577009 h 1577009"/>
-                <a:gd name="connsiteX1" fmla="*/ 1510748 w 3154017"/>
-                <a:gd name="connsiteY1" fmla="*/ 0 h 1577009"/>
-                <a:gd name="connsiteX2" fmla="*/ 3154017 w 3154017"/>
-                <a:gd name="connsiteY2" fmla="*/ 1577009 h 1577009"/>
-                <a:gd name="connsiteX0" fmla="*/ 0 w 3154017"/>
-                <a:gd name="connsiteY0" fmla="*/ 1259785 h 1259785"/>
-                <a:gd name="connsiteX1" fmla="*/ 1524000 w 3154017"/>
-                <a:gd name="connsiteY1" fmla="*/ 0 h 1259785"/>
-                <a:gd name="connsiteX2" fmla="*/ 3154017 w 3154017"/>
-                <a:gd name="connsiteY2" fmla="*/ 1259785 h 1259785"/>
-                <a:gd name="connsiteX0" fmla="*/ 86415 w 3240432"/>
-                <a:gd name="connsiteY0" fmla="*/ 1481759 h 1481759"/>
-                <a:gd name="connsiteX1" fmla="*/ 1610415 w 3240432"/>
-                <a:gd name="connsiteY1" fmla="*/ 221974 h 1481759"/>
-                <a:gd name="connsiteX2" fmla="*/ 3240432 w 3240432"/>
-                <a:gd name="connsiteY2" fmla="*/ 1481759 h 1481759"/>
-                <a:gd name="connsiteX0" fmla="*/ 86415 w 3534465"/>
-                <a:gd name="connsiteY0" fmla="*/ 1481759 h 1481759"/>
-                <a:gd name="connsiteX1" fmla="*/ 1610415 w 3534465"/>
-                <a:gd name="connsiteY1" fmla="*/ 221974 h 1481759"/>
-                <a:gd name="connsiteX2" fmla="*/ 3240432 w 3534465"/>
-                <a:gd name="connsiteY2" fmla="*/ 1481759 h 1481759"/>
-                <a:gd name="connsiteX0" fmla="*/ 86415 w 3534465"/>
-                <a:gd name="connsiteY0" fmla="*/ 1596059 h 1596059"/>
-                <a:gd name="connsiteX1" fmla="*/ 1610415 w 3534465"/>
-                <a:gd name="connsiteY1" fmla="*/ 221974 h 1596059"/>
-                <a:gd name="connsiteX2" fmla="*/ 3240432 w 3534465"/>
-                <a:gd name="connsiteY2" fmla="*/ 1596059 h 1596059"/>
-                <a:gd name="connsiteX0" fmla="*/ 86415 w 3406913"/>
-                <a:gd name="connsiteY0" fmla="*/ 1596059 h 1596059"/>
-                <a:gd name="connsiteX1" fmla="*/ 1610415 w 3406913"/>
-                <a:gd name="connsiteY1" fmla="*/ 221974 h 1596059"/>
-                <a:gd name="connsiteX2" fmla="*/ 3240432 w 3406913"/>
-                <a:gd name="connsiteY2" fmla="*/ 1596059 h 1596059"/>
-                <a:gd name="connsiteX0" fmla="*/ 0 w 3320498"/>
-                <a:gd name="connsiteY0" fmla="*/ 1530626 h 1530626"/>
-                <a:gd name="connsiteX1" fmla="*/ 1524000 w 3320498"/>
-                <a:gd name="connsiteY1" fmla="*/ 156541 h 1530626"/>
-                <a:gd name="connsiteX2" fmla="*/ 3154017 w 3320498"/>
-                <a:gd name="connsiteY2" fmla="*/ 1530626 h 1530626"/>
-                <a:gd name="connsiteX0" fmla="*/ 0 w 3154017"/>
-                <a:gd name="connsiteY0" fmla="*/ 1530626 h 1530626"/>
-                <a:gd name="connsiteX1" fmla="*/ 1524000 w 3154017"/>
-                <a:gd name="connsiteY1" fmla="*/ 156541 h 1530626"/>
-                <a:gd name="connsiteX2" fmla="*/ 3154017 w 3154017"/>
-                <a:gd name="connsiteY2" fmla="*/ 1530626 h 1530626"/>
-                <a:gd name="connsiteX0" fmla="*/ 0 w 3154017"/>
-                <a:gd name="connsiteY0" fmla="*/ 1359177 h 1359177"/>
-                <a:gd name="connsiteX1" fmla="*/ 1524000 w 3154017"/>
-                <a:gd name="connsiteY1" fmla="*/ 156541 h 1359177"/>
-                <a:gd name="connsiteX2" fmla="*/ 3154017 w 3154017"/>
-                <a:gd name="connsiteY2" fmla="*/ 1359177 h 1359177"/>
-                <a:gd name="connsiteX0" fmla="*/ 0 w 3154017"/>
-                <a:gd name="connsiteY0" fmla="*/ 1359177 h 1359177"/>
-                <a:gd name="connsiteX1" fmla="*/ 1524000 w 3154017"/>
-                <a:gd name="connsiteY1" fmla="*/ 156541 h 1359177"/>
-                <a:gd name="connsiteX2" fmla="*/ 3154017 w 3154017"/>
-                <a:gd name="connsiteY2" fmla="*/ 1359177 h 1359177"/>
-                <a:gd name="connsiteX0" fmla="*/ 0 w 3154017"/>
-                <a:gd name="connsiteY0" fmla="*/ 1202636 h 1202636"/>
-                <a:gd name="connsiteX1" fmla="*/ 1524000 w 3154017"/>
-                <a:gd name="connsiteY1" fmla="*/ 0 h 1202636"/>
-                <a:gd name="connsiteX2" fmla="*/ 3154017 w 3154017"/>
-                <a:gd name="connsiteY2" fmla="*/ 1202636 h 1202636"/>
-                <a:gd name="connsiteX0" fmla="*/ 0 w 3154017"/>
-                <a:gd name="connsiteY0" fmla="*/ 1333500 h 1333500"/>
-                <a:gd name="connsiteX1" fmla="*/ 1524000 w 3154017"/>
-                <a:gd name="connsiteY1" fmla="*/ 130864 h 1333500"/>
-                <a:gd name="connsiteX2" fmla="*/ 3154017 w 3154017"/>
-                <a:gd name="connsiteY2" fmla="*/ 1333500 h 1333500"/>
-                <a:gd name="connsiteX0" fmla="*/ 0 w 3154017"/>
-                <a:gd name="connsiteY0" fmla="*/ 1333500 h 1333500"/>
-                <a:gd name="connsiteX1" fmla="*/ 1524000 w 3154017"/>
-                <a:gd name="connsiteY1" fmla="*/ 130864 h 1333500"/>
-                <a:gd name="connsiteX2" fmla="*/ 3154017 w 3154017"/>
-                <a:gd name="connsiteY2" fmla="*/ 1333500 h 1333500"/>
-                <a:gd name="connsiteX0" fmla="*/ 0 w 3154017"/>
-                <a:gd name="connsiteY0" fmla="*/ 1202636 h 1202636"/>
-                <a:gd name="connsiteX1" fmla="*/ 1524000 w 3154017"/>
-                <a:gd name="connsiteY1" fmla="*/ 0 h 1202636"/>
-                <a:gd name="connsiteX2" fmla="*/ 3154017 w 3154017"/>
-                <a:gd name="connsiteY2" fmla="*/ 1202636 h 1202636"/>
-                <a:gd name="connsiteX0" fmla="*/ 0 w 3154017"/>
-                <a:gd name="connsiteY0" fmla="*/ 1202636 h 1202636"/>
-                <a:gd name="connsiteX1" fmla="*/ 1524000 w 3154017"/>
-                <a:gd name="connsiteY1" fmla="*/ 0 h 1202636"/>
-                <a:gd name="connsiteX2" fmla="*/ 3154017 w 3154017"/>
-                <a:gd name="connsiteY2" fmla="*/ 1202636 h 1202636"/>
-                <a:gd name="connsiteX0" fmla="*/ 0 w 3154017"/>
-                <a:gd name="connsiteY0" fmla="*/ 1236596 h 1236596"/>
-                <a:gd name="connsiteX1" fmla="*/ 1524000 w 3154017"/>
-                <a:gd name="connsiteY1" fmla="*/ 33960 h 1236596"/>
-                <a:gd name="connsiteX2" fmla="*/ 3154017 w 3154017"/>
-                <a:gd name="connsiteY2" fmla="*/ 1236596 h 1236596"/>
-                <a:gd name="connsiteX0" fmla="*/ 0 w 3154017"/>
-                <a:gd name="connsiteY0" fmla="*/ 1202636 h 1202636"/>
-                <a:gd name="connsiteX1" fmla="*/ 1524000 w 3154017"/>
-                <a:gd name="connsiteY1" fmla="*/ 0 h 1202636"/>
-                <a:gd name="connsiteX2" fmla="*/ 3154017 w 3154017"/>
-                <a:gd name="connsiteY2" fmla="*/ 1202636 h 1202636"/>
-              </a:gdLst>
-              <a:ahLst/>
-              <a:cxnLst>
-                <a:cxn ang="0">
-                  <a:pos x="connsiteX0" y="connsiteY0"/>
-                </a:cxn>
-                <a:cxn ang="0">
-                  <a:pos x="connsiteX1" y="connsiteY1"/>
-                </a:cxn>
-                <a:cxn ang="0">
-                  <a:pos x="connsiteX2" y="connsiteY2"/>
-                </a:cxn>
-              </a:cxnLst>
-              <a:rect l="l" t="t" r="r" b="b"/>
-              <a:pathLst>
-                <a:path w="3154017" h="1202636">
-                  <a:moveTo>
-                    <a:pt x="0" y="1202636"/>
-                  </a:moveTo>
-                  <a:cubicBezTo>
-                    <a:pt x="508000" y="782708"/>
-                    <a:pt x="515178" y="10769"/>
-                    <a:pt x="1524000" y="0"/>
-                  </a:cubicBezTo>
-                  <a:cubicBezTo>
-                    <a:pt x="2520398" y="19877"/>
-                    <a:pt x="2610678" y="782708"/>
-                    <a:pt x="3154017" y="1202636"/>
-                  </a:cubicBezTo>
-                </a:path>
-              </a:pathLst>
-            </a:custGeom>
-            <a:ln>
-              <a:solidFill>
-                <a:schemeClr val="tx1"/>
-              </a:solidFill>
-            </a:ln>
-          </p:spPr>
-          <p:style>
-            <a:lnRef idx="1">
-              <a:schemeClr val="accent1"/>
-            </a:lnRef>
-            <a:fillRef idx="0">
-              <a:schemeClr val="accent1"/>
-            </a:fillRef>
-            <a:effectRef idx="0">
-              <a:schemeClr val="accent1"/>
-            </a:effectRef>
-            <a:fontRef idx="minor">
+            </a:solidFill>
+          </a:ln>
+        </p:spPr>
+        <p:style>
+          <a:lnRef idx="1">
+            <a:schemeClr val="accent1"/>
+          </a:lnRef>
+          <a:fillRef idx="0">
+            <a:schemeClr val="accent1"/>
+          </a:fillRef>
+          <a:effectRef idx="0">
+            <a:schemeClr val="accent1"/>
+          </a:effectRef>
+          <a:fontRef idx="minor">
+            <a:schemeClr val="tx1"/>
+          </a:fontRef>
+        </p:style>
+        <p:txBody>
+          <a:bodyPr rtlCol="0" anchor="ctr"/>
+          <a:lstStyle/>
+          <a:p>
+            <a:pPr algn="ctr"/>
+            <a:endParaRPr lang="en-US"/>
+          </a:p>
+        </p:txBody>
+      </p:sp>
+      <p:cxnSp>
+        <p:nvCxnSpPr>
+          <p:cNvPr id="52" name="Straight Arrow Connector 51"/>
+          <p:cNvCxnSpPr>
+            <a:stCxn id="3" idx="0"/>
+          </p:cNvCxnSpPr>
+          <p:nvPr/>
+        </p:nvCxnSpPr>
+        <p:spPr>
+          <a:xfrm rot="16200000" flipV="1">
+            <a:off x="3928673" y="1490272"/>
+            <a:ext cx="927828" cy="930327"/>
+          </a:xfrm>
+          <a:prstGeom prst="straightConnector1">
+            <a:avLst/>
+          </a:prstGeom>
+          <a:ln>
+            <a:solidFill>
               <a:schemeClr val="tx1"/>
-            </a:fontRef>
-          </p:style>
-          <p:txBody>
-            <a:bodyPr rtlCol="0" anchor="ctr"/>
-            <a:lstStyle/>
-            <a:p>
-              <a:pPr algn="ctr"/>
-              <a:endParaRPr lang="en-US"/>
-            </a:p>
-          </p:txBody>
-        </p:sp>
-        <p:sp>
-          <p:nvSpPr>
-            <p:cNvPr id="142" name="Freeform 141"/>
-            <p:cNvSpPr/>
-            <p:nvPr/>
-          </p:nvSpPr>
-          <p:spPr>
-            <a:xfrm>
-              <a:off x="1771650" y="666750"/>
-              <a:ext cx="3384550" cy="3600450"/>
-            </a:xfrm>
-            <a:custGeom>
-              <a:avLst/>
-              <a:gdLst>
-                <a:gd name="connsiteX0" fmla="*/ 0 w 4429125"/>
-                <a:gd name="connsiteY0" fmla="*/ 3533775 h 3533775"/>
-                <a:gd name="connsiteX1" fmla="*/ 2886075 w 4429125"/>
-                <a:gd name="connsiteY1" fmla="*/ 0 h 3533775"/>
-                <a:gd name="connsiteX2" fmla="*/ 4429125 w 4429125"/>
-                <a:gd name="connsiteY2" fmla="*/ 514350 h 3533775"/>
-                <a:gd name="connsiteX3" fmla="*/ 3457575 w 4429125"/>
-                <a:gd name="connsiteY3" fmla="*/ 1400175 h 3533775"/>
-                <a:gd name="connsiteX0" fmla="*/ 0 w 4429125"/>
-                <a:gd name="connsiteY0" fmla="*/ 3257550 h 3257550"/>
-                <a:gd name="connsiteX1" fmla="*/ 2390775 w 4429125"/>
-                <a:gd name="connsiteY1" fmla="*/ 0 h 3257550"/>
-                <a:gd name="connsiteX2" fmla="*/ 4429125 w 4429125"/>
-                <a:gd name="connsiteY2" fmla="*/ 238125 h 3257550"/>
-                <a:gd name="connsiteX3" fmla="*/ 3457575 w 4429125"/>
-                <a:gd name="connsiteY3" fmla="*/ 1123950 h 3257550"/>
-                <a:gd name="connsiteX0" fmla="*/ 0 w 3762375"/>
-                <a:gd name="connsiteY0" fmla="*/ 3257550 h 3257550"/>
-                <a:gd name="connsiteX1" fmla="*/ 2390775 w 3762375"/>
-                <a:gd name="connsiteY1" fmla="*/ 0 h 3257550"/>
-                <a:gd name="connsiteX2" fmla="*/ 3762375 w 3762375"/>
-                <a:gd name="connsiteY2" fmla="*/ 342899 h 3257550"/>
-                <a:gd name="connsiteX3" fmla="*/ 3457575 w 3762375"/>
-                <a:gd name="connsiteY3" fmla="*/ 1123950 h 3257550"/>
-                <a:gd name="connsiteX0" fmla="*/ 0 w 3762375"/>
-                <a:gd name="connsiteY0" fmla="*/ 3143251 h 3143251"/>
-                <a:gd name="connsiteX1" fmla="*/ 2390775 w 3762375"/>
-                <a:gd name="connsiteY1" fmla="*/ 0 h 3143251"/>
-                <a:gd name="connsiteX2" fmla="*/ 3762375 w 3762375"/>
-                <a:gd name="connsiteY2" fmla="*/ 228600 h 3143251"/>
-                <a:gd name="connsiteX3" fmla="*/ 3457575 w 3762375"/>
-                <a:gd name="connsiteY3" fmla="*/ 1009651 h 3143251"/>
-                <a:gd name="connsiteX0" fmla="*/ 0 w 3762375"/>
-                <a:gd name="connsiteY0" fmla="*/ 2971801 h 2971801"/>
-                <a:gd name="connsiteX1" fmla="*/ 2390775 w 3762375"/>
-                <a:gd name="connsiteY1" fmla="*/ 0 h 2971801"/>
-                <a:gd name="connsiteX2" fmla="*/ 3762375 w 3762375"/>
-                <a:gd name="connsiteY2" fmla="*/ 57150 h 2971801"/>
-                <a:gd name="connsiteX3" fmla="*/ 3457575 w 3762375"/>
-                <a:gd name="connsiteY3" fmla="*/ 838201 h 2971801"/>
-                <a:gd name="connsiteX0" fmla="*/ 0 w 3762375"/>
-                <a:gd name="connsiteY0" fmla="*/ 2971801 h 2971801"/>
-                <a:gd name="connsiteX1" fmla="*/ 2390775 w 3762375"/>
-                <a:gd name="connsiteY1" fmla="*/ 0 h 2971801"/>
-                <a:gd name="connsiteX2" fmla="*/ 3762375 w 3762375"/>
-                <a:gd name="connsiteY2" fmla="*/ 57150 h 2971801"/>
-                <a:gd name="connsiteX3" fmla="*/ 3457575 w 3762375"/>
-                <a:gd name="connsiteY3" fmla="*/ 838201 h 2971801"/>
-                <a:gd name="connsiteX0" fmla="*/ 0 w 4022725"/>
-                <a:gd name="connsiteY0" fmla="*/ 2971801 h 2971801"/>
-                <a:gd name="connsiteX1" fmla="*/ 2390775 w 4022725"/>
-                <a:gd name="connsiteY1" fmla="*/ 0 h 2971801"/>
-                <a:gd name="connsiteX2" fmla="*/ 3762375 w 4022725"/>
-                <a:gd name="connsiteY2" fmla="*/ 57150 h 2971801"/>
-                <a:gd name="connsiteX3" fmla="*/ 3457575 w 4022725"/>
-                <a:gd name="connsiteY3" fmla="*/ 838201 h 2971801"/>
-                <a:gd name="connsiteX0" fmla="*/ 0 w 4022725"/>
-                <a:gd name="connsiteY0" fmla="*/ 3362326 h 3362326"/>
-                <a:gd name="connsiteX1" fmla="*/ 2390775 w 4022725"/>
-                <a:gd name="connsiteY1" fmla="*/ 390525 h 3362326"/>
-                <a:gd name="connsiteX2" fmla="*/ 3762375 w 4022725"/>
-                <a:gd name="connsiteY2" fmla="*/ 447675 h 3362326"/>
-                <a:gd name="connsiteX3" fmla="*/ 3457575 w 4022725"/>
-                <a:gd name="connsiteY3" fmla="*/ 1228726 h 3362326"/>
-                <a:gd name="connsiteX0" fmla="*/ 0 w 4022725"/>
-                <a:gd name="connsiteY0" fmla="*/ 3362326 h 3362326"/>
-                <a:gd name="connsiteX1" fmla="*/ 2390775 w 4022725"/>
-                <a:gd name="connsiteY1" fmla="*/ 390525 h 3362326"/>
-                <a:gd name="connsiteX2" fmla="*/ 3762375 w 4022725"/>
-                <a:gd name="connsiteY2" fmla="*/ 447675 h 3362326"/>
-                <a:gd name="connsiteX3" fmla="*/ 3457575 w 4022725"/>
-                <a:gd name="connsiteY3" fmla="*/ 1228726 h 3362326"/>
-                <a:gd name="connsiteX0" fmla="*/ 0 w 4022725"/>
-                <a:gd name="connsiteY0" fmla="*/ 3362326 h 3362326"/>
-                <a:gd name="connsiteX1" fmla="*/ 2390775 w 4022725"/>
-                <a:gd name="connsiteY1" fmla="*/ 390525 h 3362326"/>
-                <a:gd name="connsiteX2" fmla="*/ 3762375 w 4022725"/>
-                <a:gd name="connsiteY2" fmla="*/ 447675 h 3362326"/>
-                <a:gd name="connsiteX3" fmla="*/ 3457575 w 4022725"/>
-                <a:gd name="connsiteY3" fmla="*/ 1228726 h 3362326"/>
-                <a:gd name="connsiteX0" fmla="*/ 0 w 3765550"/>
-                <a:gd name="connsiteY0" fmla="*/ 3362326 h 3362326"/>
-                <a:gd name="connsiteX1" fmla="*/ 2390775 w 3765550"/>
-                <a:gd name="connsiteY1" fmla="*/ 390525 h 3362326"/>
-                <a:gd name="connsiteX2" fmla="*/ 3762375 w 3765550"/>
-                <a:gd name="connsiteY2" fmla="*/ 447675 h 3362326"/>
-                <a:gd name="connsiteX3" fmla="*/ 3457575 w 3765550"/>
-                <a:gd name="connsiteY3" fmla="*/ 1228726 h 3362326"/>
-                <a:gd name="connsiteX0" fmla="*/ 0 w 3765550"/>
-                <a:gd name="connsiteY0" fmla="*/ 3276601 h 3276601"/>
-                <a:gd name="connsiteX1" fmla="*/ 2390775 w 3765550"/>
-                <a:gd name="connsiteY1" fmla="*/ 304800 h 3276601"/>
-                <a:gd name="connsiteX2" fmla="*/ 3762375 w 3765550"/>
-                <a:gd name="connsiteY2" fmla="*/ 361950 h 3276601"/>
-                <a:gd name="connsiteX3" fmla="*/ 3457575 w 3765550"/>
-                <a:gd name="connsiteY3" fmla="*/ 1143001 h 3276601"/>
-                <a:gd name="connsiteX0" fmla="*/ 0 w 3984625"/>
-                <a:gd name="connsiteY0" fmla="*/ 3276601 h 3276601"/>
-                <a:gd name="connsiteX1" fmla="*/ 2390775 w 3984625"/>
-                <a:gd name="connsiteY1" fmla="*/ 304800 h 3276601"/>
-                <a:gd name="connsiteX2" fmla="*/ 3762375 w 3984625"/>
-                <a:gd name="connsiteY2" fmla="*/ 361950 h 3276601"/>
-                <a:gd name="connsiteX3" fmla="*/ 3457575 w 3984625"/>
-                <a:gd name="connsiteY3" fmla="*/ 1143001 h 3276601"/>
-                <a:gd name="connsiteX0" fmla="*/ 0 w 3756025"/>
-                <a:gd name="connsiteY0" fmla="*/ 3390901 h 3390901"/>
-                <a:gd name="connsiteX1" fmla="*/ 2390775 w 3756025"/>
-                <a:gd name="connsiteY1" fmla="*/ 419100 h 3390901"/>
-                <a:gd name="connsiteX2" fmla="*/ 3533775 w 3756025"/>
-                <a:gd name="connsiteY2" fmla="*/ 361950 h 3390901"/>
-                <a:gd name="connsiteX3" fmla="*/ 3457575 w 3756025"/>
-                <a:gd name="connsiteY3" fmla="*/ 1257301 h 3390901"/>
-                <a:gd name="connsiteX0" fmla="*/ 0 w 3756025"/>
-                <a:gd name="connsiteY0" fmla="*/ 3343276 h 3343276"/>
-                <a:gd name="connsiteX1" fmla="*/ 2390775 w 3756025"/>
-                <a:gd name="connsiteY1" fmla="*/ 371475 h 3343276"/>
-                <a:gd name="connsiteX2" fmla="*/ 3533775 w 3756025"/>
-                <a:gd name="connsiteY2" fmla="*/ 314325 h 3343276"/>
-                <a:gd name="connsiteX3" fmla="*/ 3457575 w 3756025"/>
-                <a:gd name="connsiteY3" fmla="*/ 1209676 h 3343276"/>
-                <a:gd name="connsiteX0" fmla="*/ 0 w 3660775"/>
-                <a:gd name="connsiteY0" fmla="*/ 3343276 h 3343276"/>
-                <a:gd name="connsiteX1" fmla="*/ 2390775 w 3660775"/>
-                <a:gd name="connsiteY1" fmla="*/ 371475 h 3343276"/>
-                <a:gd name="connsiteX2" fmla="*/ 3533775 w 3660775"/>
-                <a:gd name="connsiteY2" fmla="*/ 314325 h 3343276"/>
-                <a:gd name="connsiteX3" fmla="*/ 3457575 w 3660775"/>
-                <a:gd name="connsiteY3" fmla="*/ 1209676 h 3343276"/>
-                <a:gd name="connsiteX0" fmla="*/ 0 w 3717925"/>
-                <a:gd name="connsiteY0" fmla="*/ 3286127 h 3286127"/>
-                <a:gd name="connsiteX1" fmla="*/ 2390775 w 3717925"/>
-                <a:gd name="connsiteY1" fmla="*/ 314326 h 3286127"/>
-                <a:gd name="connsiteX2" fmla="*/ 3590925 w 3717925"/>
-                <a:gd name="connsiteY2" fmla="*/ 314325 h 3286127"/>
-                <a:gd name="connsiteX3" fmla="*/ 3457575 w 3717925"/>
-                <a:gd name="connsiteY3" fmla="*/ 1152527 h 3286127"/>
-                <a:gd name="connsiteX0" fmla="*/ 0 w 3775075"/>
-                <a:gd name="connsiteY0" fmla="*/ 3286127 h 3286127"/>
-                <a:gd name="connsiteX1" fmla="*/ 2390775 w 3775075"/>
-                <a:gd name="connsiteY1" fmla="*/ 314326 h 3286127"/>
-                <a:gd name="connsiteX2" fmla="*/ 3648075 w 3775075"/>
-                <a:gd name="connsiteY2" fmla="*/ 314325 h 3286127"/>
-                <a:gd name="connsiteX3" fmla="*/ 3457575 w 3775075"/>
-                <a:gd name="connsiteY3" fmla="*/ 1152527 h 3286127"/>
-                <a:gd name="connsiteX0" fmla="*/ 0 w 3775075"/>
-                <a:gd name="connsiteY0" fmla="*/ 3409952 h 3409952"/>
-                <a:gd name="connsiteX1" fmla="*/ 2390775 w 3775075"/>
-                <a:gd name="connsiteY1" fmla="*/ 438151 h 3409952"/>
-                <a:gd name="connsiteX2" fmla="*/ 3648075 w 3775075"/>
-                <a:gd name="connsiteY2" fmla="*/ 438150 h 3409952"/>
-                <a:gd name="connsiteX3" fmla="*/ 3457575 w 3775075"/>
-                <a:gd name="connsiteY3" fmla="*/ 1276352 h 3409952"/>
-                <a:gd name="connsiteX0" fmla="*/ 0 w 3775075"/>
-                <a:gd name="connsiteY0" fmla="*/ 3562352 h 3562352"/>
-                <a:gd name="connsiteX1" fmla="*/ 2390775 w 3775075"/>
-                <a:gd name="connsiteY1" fmla="*/ 590551 h 3562352"/>
-                <a:gd name="connsiteX2" fmla="*/ 3648075 w 3775075"/>
-                <a:gd name="connsiteY2" fmla="*/ 590550 h 3562352"/>
-                <a:gd name="connsiteX3" fmla="*/ 3457575 w 3775075"/>
-                <a:gd name="connsiteY3" fmla="*/ 1428752 h 3562352"/>
-                <a:gd name="connsiteX0" fmla="*/ 0 w 3832225"/>
-                <a:gd name="connsiteY0" fmla="*/ 3619502 h 3619502"/>
-                <a:gd name="connsiteX1" fmla="*/ 2390775 w 3832225"/>
-                <a:gd name="connsiteY1" fmla="*/ 647701 h 3619502"/>
-                <a:gd name="connsiteX2" fmla="*/ 3705225 w 3832225"/>
-                <a:gd name="connsiteY2" fmla="*/ 590550 h 3619502"/>
-                <a:gd name="connsiteX3" fmla="*/ 3457575 w 3832225"/>
-                <a:gd name="connsiteY3" fmla="*/ 1485902 h 3619502"/>
-              </a:gdLst>
-              <a:ahLst/>
-              <a:cxnLst>
-                <a:cxn ang="0">
-                  <a:pos x="connsiteX0" y="connsiteY0"/>
-                </a:cxn>
-                <a:cxn ang="0">
-                  <a:pos x="connsiteX1" y="connsiteY1"/>
-                </a:cxn>
-                <a:cxn ang="0">
-                  <a:pos x="connsiteX2" y="connsiteY2"/>
-                </a:cxn>
-                <a:cxn ang="0">
-                  <a:pos x="connsiteX3" y="connsiteY3"/>
-                </a:cxn>
-              </a:cxnLst>
-              <a:rect l="l" t="t" r="r" b="b"/>
-              <a:pathLst>
-                <a:path w="3832225" h="3619502">
-                  <a:moveTo>
-                    <a:pt x="0" y="3619502"/>
-                  </a:moveTo>
-                  <a:cubicBezTo>
-                    <a:pt x="796925" y="2628902"/>
-                    <a:pt x="1584325" y="1419226"/>
-                    <a:pt x="2390775" y="647701"/>
-                  </a:cubicBezTo>
-                  <a:cubicBezTo>
-                    <a:pt x="2676525" y="438151"/>
-                    <a:pt x="3238500" y="0"/>
-                    <a:pt x="3705225" y="590550"/>
-                  </a:cubicBezTo>
-                  <a:cubicBezTo>
-                    <a:pt x="3832225" y="850900"/>
-                    <a:pt x="3559175" y="1225552"/>
-                    <a:pt x="3457575" y="1485902"/>
-                  </a:cubicBezTo>
-                </a:path>
-              </a:pathLst>
-            </a:custGeom>
-            <a:ln>
-              <a:solidFill>
-                <a:schemeClr val="tx1"/>
-              </a:solidFill>
-            </a:ln>
-          </p:spPr>
-          <p:style>
-            <a:lnRef idx="1">
-              <a:schemeClr val="accent1"/>
-            </a:lnRef>
-            <a:fillRef idx="0">
-              <a:schemeClr val="accent1"/>
-            </a:fillRef>
-            <a:effectRef idx="0">
-              <a:schemeClr val="accent1"/>
-            </a:effectRef>
-            <a:fontRef idx="minor">
+            </a:solidFill>
+            <a:tailEnd type="arrow"/>
+          </a:ln>
+        </p:spPr>
+        <p:style>
+          <a:lnRef idx="1">
+            <a:schemeClr val="accent1"/>
+          </a:lnRef>
+          <a:fillRef idx="0">
+            <a:schemeClr val="accent1"/>
+          </a:fillRef>
+          <a:effectRef idx="0">
+            <a:schemeClr val="accent1"/>
+          </a:effectRef>
+          <a:fontRef idx="minor">
+            <a:schemeClr val="tx1"/>
+          </a:fontRef>
+        </p:style>
+      </p:cxnSp>
+      <p:cxnSp>
+        <p:nvCxnSpPr>
+          <p:cNvPr id="57" name="Straight Arrow Connector 56"/>
+          <p:cNvCxnSpPr>
+            <a:stCxn id="3" idx="1"/>
+            <a:endCxn id="30" idx="5"/>
+          </p:cNvCxnSpPr>
+          <p:nvPr/>
+        </p:nvCxnSpPr>
+        <p:spPr>
+          <a:xfrm rot="16200000" flipV="1">
+            <a:off x="3752289" y="1771089"/>
+            <a:ext cx="782172" cy="782172"/>
+          </a:xfrm>
+          <a:prstGeom prst="straightConnector1">
+            <a:avLst/>
+          </a:prstGeom>
+          <a:ln>
+            <a:solidFill>
               <a:schemeClr val="tx1"/>
-            </a:fontRef>
-          </p:style>
-          <p:txBody>
-            <a:bodyPr rtlCol="0" anchor="ctr"/>
-            <a:lstStyle/>
-            <a:p>
-              <a:pPr algn="ctr"/>
-              <a:endParaRPr lang="en-US"/>
-            </a:p>
-          </p:txBody>
-        </p:sp>
-        <p:sp>
-          <p:nvSpPr>
-            <p:cNvPr id="148" name="Freeform 147"/>
-            <p:cNvSpPr/>
-            <p:nvPr/>
-          </p:nvSpPr>
-          <p:spPr>
-            <a:xfrm>
-              <a:off x="3870267" y="2466975"/>
-              <a:ext cx="1114779" cy="1905000"/>
-            </a:xfrm>
-            <a:custGeom>
-              <a:avLst/>
-              <a:gdLst>
-                <a:gd name="connsiteX0" fmla="*/ 9525 w 1019175"/>
-                <a:gd name="connsiteY0" fmla="*/ 0 h 1905000"/>
-                <a:gd name="connsiteX1" fmla="*/ 0 w 1019175"/>
-                <a:gd name="connsiteY1" fmla="*/ 971550 h 1905000"/>
-                <a:gd name="connsiteX2" fmla="*/ 1019175 w 1019175"/>
-                <a:gd name="connsiteY2" fmla="*/ 971550 h 1905000"/>
-                <a:gd name="connsiteX3" fmla="*/ 971550 w 1019175"/>
-                <a:gd name="connsiteY3" fmla="*/ 1905000 h 1905000"/>
-                <a:gd name="connsiteX0" fmla="*/ 9525 w 971550"/>
-                <a:gd name="connsiteY0" fmla="*/ 0 h 1905000"/>
-                <a:gd name="connsiteX1" fmla="*/ 0 w 971550"/>
-                <a:gd name="connsiteY1" fmla="*/ 971550 h 1905000"/>
-                <a:gd name="connsiteX2" fmla="*/ 960936 w 971550"/>
-                <a:gd name="connsiteY2" fmla="*/ 962025 h 1905000"/>
-                <a:gd name="connsiteX3" fmla="*/ 971550 w 971550"/>
-                <a:gd name="connsiteY3" fmla="*/ 1905000 h 1905000"/>
-                <a:gd name="connsiteX0" fmla="*/ 9525 w 1061538"/>
-                <a:gd name="connsiteY0" fmla="*/ 0 h 1905000"/>
-                <a:gd name="connsiteX1" fmla="*/ 0 w 1061538"/>
-                <a:gd name="connsiteY1" fmla="*/ 971550 h 1905000"/>
-                <a:gd name="connsiteX2" fmla="*/ 960936 w 1061538"/>
-                <a:gd name="connsiteY2" fmla="*/ 962025 h 1905000"/>
-                <a:gd name="connsiteX3" fmla="*/ 971550 w 1061538"/>
-                <a:gd name="connsiteY3" fmla="*/ 1905000 h 1905000"/>
-                <a:gd name="connsiteX0" fmla="*/ 9525 w 1061538"/>
-                <a:gd name="connsiteY0" fmla="*/ 0 h 1905000"/>
-                <a:gd name="connsiteX1" fmla="*/ 0 w 1061538"/>
-                <a:gd name="connsiteY1" fmla="*/ 971550 h 1905000"/>
-                <a:gd name="connsiteX2" fmla="*/ 960936 w 1061538"/>
-                <a:gd name="connsiteY2" fmla="*/ 962025 h 1905000"/>
-                <a:gd name="connsiteX3" fmla="*/ 971550 w 1061538"/>
-                <a:gd name="connsiteY3" fmla="*/ 1905000 h 1905000"/>
-                <a:gd name="connsiteX0" fmla="*/ 9525 w 1061538"/>
-                <a:gd name="connsiteY0" fmla="*/ 0 h 1905000"/>
-                <a:gd name="connsiteX1" fmla="*/ 0 w 1061538"/>
-                <a:gd name="connsiteY1" fmla="*/ 971550 h 1905000"/>
-                <a:gd name="connsiteX2" fmla="*/ 960936 w 1061538"/>
-                <a:gd name="connsiteY2" fmla="*/ 962025 h 1905000"/>
-                <a:gd name="connsiteX3" fmla="*/ 971550 w 1061538"/>
-                <a:gd name="connsiteY3" fmla="*/ 1905000 h 1905000"/>
-                <a:gd name="connsiteX0" fmla="*/ 113120 w 1165133"/>
-                <a:gd name="connsiteY0" fmla="*/ 0 h 1905000"/>
-                <a:gd name="connsiteX1" fmla="*/ 103595 w 1165133"/>
-                <a:gd name="connsiteY1" fmla="*/ 971550 h 1905000"/>
-                <a:gd name="connsiteX2" fmla="*/ 1064531 w 1165133"/>
-                <a:gd name="connsiteY2" fmla="*/ 962025 h 1905000"/>
-                <a:gd name="connsiteX3" fmla="*/ 1075145 w 1165133"/>
-                <a:gd name="connsiteY3" fmla="*/ 1905000 h 1905000"/>
-                <a:gd name="connsiteX0" fmla="*/ 3175 w 1055188"/>
-                <a:gd name="connsiteY0" fmla="*/ 0 h 1905000"/>
-                <a:gd name="connsiteX1" fmla="*/ 139248 w 1055188"/>
-                <a:gd name="connsiteY1" fmla="*/ 962025 h 1905000"/>
-                <a:gd name="connsiteX2" fmla="*/ 954586 w 1055188"/>
-                <a:gd name="connsiteY2" fmla="*/ 962025 h 1905000"/>
-                <a:gd name="connsiteX3" fmla="*/ 965200 w 1055188"/>
-                <a:gd name="connsiteY3" fmla="*/ 1905000 h 1905000"/>
-                <a:gd name="connsiteX0" fmla="*/ 3175 w 965200"/>
-                <a:gd name="connsiteY0" fmla="*/ 0 h 1905000"/>
-                <a:gd name="connsiteX1" fmla="*/ 139248 w 965200"/>
-                <a:gd name="connsiteY1" fmla="*/ 962025 h 1905000"/>
-                <a:gd name="connsiteX2" fmla="*/ 838111 w 965200"/>
-                <a:gd name="connsiteY2" fmla="*/ 1133475 h 1905000"/>
-                <a:gd name="connsiteX3" fmla="*/ 965200 w 965200"/>
-                <a:gd name="connsiteY3" fmla="*/ 1905000 h 1905000"/>
-                <a:gd name="connsiteX0" fmla="*/ 93705 w 1055730"/>
-                <a:gd name="connsiteY0" fmla="*/ 0 h 1905000"/>
-                <a:gd name="connsiteX1" fmla="*/ 229778 w 1055730"/>
-                <a:gd name="connsiteY1" fmla="*/ 962025 h 1905000"/>
-                <a:gd name="connsiteX2" fmla="*/ 928641 w 1055730"/>
-                <a:gd name="connsiteY2" fmla="*/ 1133475 h 1905000"/>
-                <a:gd name="connsiteX3" fmla="*/ 1055730 w 1055730"/>
-                <a:gd name="connsiteY3" fmla="*/ 1905000 h 1905000"/>
-                <a:gd name="connsiteX0" fmla="*/ 93705 w 1055730"/>
-                <a:gd name="connsiteY0" fmla="*/ 0 h 1905000"/>
-                <a:gd name="connsiteX1" fmla="*/ 229778 w 1055730"/>
-                <a:gd name="connsiteY1" fmla="*/ 962025 h 1905000"/>
-                <a:gd name="connsiteX2" fmla="*/ 928641 w 1055730"/>
-                <a:gd name="connsiteY2" fmla="*/ 1133475 h 1905000"/>
-                <a:gd name="connsiteX3" fmla="*/ 1055730 w 1055730"/>
-                <a:gd name="connsiteY3" fmla="*/ 1905000 h 1905000"/>
-                <a:gd name="connsiteX0" fmla="*/ 35466 w 997491"/>
-                <a:gd name="connsiteY0" fmla="*/ 0 h 1905000"/>
-                <a:gd name="connsiteX1" fmla="*/ 171539 w 997491"/>
-                <a:gd name="connsiteY1" fmla="*/ 962025 h 1905000"/>
-                <a:gd name="connsiteX2" fmla="*/ 870402 w 997491"/>
-                <a:gd name="connsiteY2" fmla="*/ 1133475 h 1905000"/>
-                <a:gd name="connsiteX3" fmla="*/ 997491 w 997491"/>
-                <a:gd name="connsiteY3" fmla="*/ 1905000 h 1905000"/>
-                <a:gd name="connsiteX0" fmla="*/ 35466 w 997491"/>
-                <a:gd name="connsiteY0" fmla="*/ 0 h 1905000"/>
-                <a:gd name="connsiteX1" fmla="*/ 171539 w 997491"/>
-                <a:gd name="connsiteY1" fmla="*/ 962025 h 1905000"/>
-                <a:gd name="connsiteX2" fmla="*/ 870402 w 997491"/>
-                <a:gd name="connsiteY2" fmla="*/ 1133475 h 1905000"/>
-                <a:gd name="connsiteX3" fmla="*/ 997491 w 997491"/>
-                <a:gd name="connsiteY3" fmla="*/ 1905000 h 1905000"/>
-                <a:gd name="connsiteX0" fmla="*/ 35466 w 1068068"/>
-                <a:gd name="connsiteY0" fmla="*/ 0 h 1905000"/>
-                <a:gd name="connsiteX1" fmla="*/ 171539 w 1068068"/>
-                <a:gd name="connsiteY1" fmla="*/ 962025 h 1905000"/>
-                <a:gd name="connsiteX2" fmla="*/ 870402 w 1068068"/>
-                <a:gd name="connsiteY2" fmla="*/ 1133475 h 1905000"/>
-                <a:gd name="connsiteX3" fmla="*/ 997491 w 1068068"/>
-                <a:gd name="connsiteY3" fmla="*/ 1905000 h 1905000"/>
-                <a:gd name="connsiteX0" fmla="*/ 3175 w 1035777"/>
-                <a:gd name="connsiteY0" fmla="*/ 0 h 1905000"/>
-                <a:gd name="connsiteX1" fmla="*/ 313964 w 1035777"/>
-                <a:gd name="connsiteY1" fmla="*/ 904875 h 1905000"/>
-                <a:gd name="connsiteX2" fmla="*/ 838111 w 1035777"/>
-                <a:gd name="connsiteY2" fmla="*/ 1133475 h 1905000"/>
-                <a:gd name="connsiteX3" fmla="*/ 965200 w 1035777"/>
-                <a:gd name="connsiteY3" fmla="*/ 1905000 h 1905000"/>
-                <a:gd name="connsiteX0" fmla="*/ 3175 w 965200"/>
-                <a:gd name="connsiteY0" fmla="*/ 0 h 1905000"/>
-                <a:gd name="connsiteX1" fmla="*/ 313964 w 965200"/>
-                <a:gd name="connsiteY1" fmla="*/ 904875 h 1905000"/>
-                <a:gd name="connsiteX2" fmla="*/ 721633 w 965200"/>
-                <a:gd name="connsiteY2" fmla="*/ 1133475 h 1905000"/>
-                <a:gd name="connsiteX3" fmla="*/ 965200 w 965200"/>
-                <a:gd name="connsiteY3" fmla="*/ 1905000 h 1905000"/>
-                <a:gd name="connsiteX0" fmla="*/ 3175 w 1035776"/>
-                <a:gd name="connsiteY0" fmla="*/ 0 h 1905000"/>
-                <a:gd name="connsiteX1" fmla="*/ 313964 w 1035776"/>
-                <a:gd name="connsiteY1" fmla="*/ 904875 h 1905000"/>
-                <a:gd name="connsiteX2" fmla="*/ 838110 w 1035776"/>
-                <a:gd name="connsiteY2" fmla="*/ 1133475 h 1905000"/>
-                <a:gd name="connsiteX3" fmla="*/ 965200 w 1035776"/>
-                <a:gd name="connsiteY3" fmla="*/ 1905000 h 1905000"/>
-                <a:gd name="connsiteX0" fmla="*/ 3175 w 965200"/>
-                <a:gd name="connsiteY0" fmla="*/ 0 h 1905000"/>
-                <a:gd name="connsiteX1" fmla="*/ 313964 w 965200"/>
-                <a:gd name="connsiteY1" fmla="*/ 904875 h 1905000"/>
-                <a:gd name="connsiteX2" fmla="*/ 838110 w 965200"/>
-                <a:gd name="connsiteY2" fmla="*/ 1133475 h 1905000"/>
-                <a:gd name="connsiteX3" fmla="*/ 965200 w 965200"/>
-                <a:gd name="connsiteY3" fmla="*/ 1905000 h 1905000"/>
-                <a:gd name="connsiteX0" fmla="*/ 3175 w 965200"/>
-                <a:gd name="connsiteY0" fmla="*/ 0 h 1905000"/>
-                <a:gd name="connsiteX1" fmla="*/ 313964 w 965200"/>
-                <a:gd name="connsiteY1" fmla="*/ 904875 h 1905000"/>
-                <a:gd name="connsiteX2" fmla="*/ 838110 w 965200"/>
-                <a:gd name="connsiteY2" fmla="*/ 1133475 h 1905000"/>
-                <a:gd name="connsiteX3" fmla="*/ 965200 w 965200"/>
-                <a:gd name="connsiteY3" fmla="*/ 1905000 h 1905000"/>
-                <a:gd name="connsiteX0" fmla="*/ 3175 w 965200"/>
-                <a:gd name="connsiteY0" fmla="*/ 0 h 1905000"/>
-                <a:gd name="connsiteX1" fmla="*/ 313964 w 965200"/>
-                <a:gd name="connsiteY1" fmla="*/ 904875 h 1905000"/>
-                <a:gd name="connsiteX2" fmla="*/ 779871 w 965200"/>
-                <a:gd name="connsiteY2" fmla="*/ 1019175 h 1905000"/>
-                <a:gd name="connsiteX3" fmla="*/ 965200 w 965200"/>
-                <a:gd name="connsiteY3" fmla="*/ 1905000 h 1905000"/>
-                <a:gd name="connsiteX0" fmla="*/ 3175 w 965200"/>
-                <a:gd name="connsiteY0" fmla="*/ 0 h 1905000"/>
-                <a:gd name="connsiteX1" fmla="*/ 313964 w 965200"/>
-                <a:gd name="connsiteY1" fmla="*/ 904875 h 1905000"/>
-                <a:gd name="connsiteX2" fmla="*/ 779871 w 965200"/>
-                <a:gd name="connsiteY2" fmla="*/ 1019175 h 1905000"/>
-                <a:gd name="connsiteX3" fmla="*/ 965200 w 965200"/>
-                <a:gd name="connsiteY3" fmla="*/ 1905000 h 1905000"/>
-                <a:gd name="connsiteX0" fmla="*/ 3175 w 965200"/>
-                <a:gd name="connsiteY0" fmla="*/ 0 h 1905000"/>
-                <a:gd name="connsiteX1" fmla="*/ 313964 w 965200"/>
-                <a:gd name="connsiteY1" fmla="*/ 904875 h 1905000"/>
-                <a:gd name="connsiteX2" fmla="*/ 779871 w 965200"/>
-                <a:gd name="connsiteY2" fmla="*/ 1019175 h 1905000"/>
-                <a:gd name="connsiteX3" fmla="*/ 965200 w 965200"/>
-                <a:gd name="connsiteY3" fmla="*/ 1905000 h 1905000"/>
-                <a:gd name="connsiteX0" fmla="*/ 3175 w 965200"/>
-                <a:gd name="connsiteY0" fmla="*/ 0 h 1905000"/>
-                <a:gd name="connsiteX1" fmla="*/ 313964 w 965200"/>
-                <a:gd name="connsiteY1" fmla="*/ 904875 h 1905000"/>
-                <a:gd name="connsiteX2" fmla="*/ 779871 w 965200"/>
-                <a:gd name="connsiteY2" fmla="*/ 1019175 h 1905000"/>
-                <a:gd name="connsiteX3" fmla="*/ 965200 w 965200"/>
-                <a:gd name="connsiteY3" fmla="*/ 1905000 h 1905000"/>
-                <a:gd name="connsiteX0" fmla="*/ 3175 w 1084308"/>
-                <a:gd name="connsiteY0" fmla="*/ 0 h 1905000"/>
-                <a:gd name="connsiteX1" fmla="*/ 313964 w 1084308"/>
-                <a:gd name="connsiteY1" fmla="*/ 904875 h 1905000"/>
-                <a:gd name="connsiteX2" fmla="*/ 779871 w 1084308"/>
-                <a:gd name="connsiteY2" fmla="*/ 1019175 h 1905000"/>
-                <a:gd name="connsiteX3" fmla="*/ 965200 w 1084308"/>
-                <a:gd name="connsiteY3" fmla="*/ 1905000 h 1905000"/>
-                <a:gd name="connsiteX0" fmla="*/ 35466 w 1116599"/>
-                <a:gd name="connsiteY0" fmla="*/ 0 h 1905000"/>
-                <a:gd name="connsiteX1" fmla="*/ 346255 w 1116599"/>
-                <a:gd name="connsiteY1" fmla="*/ 904875 h 1905000"/>
-                <a:gd name="connsiteX2" fmla="*/ 812162 w 1116599"/>
-                <a:gd name="connsiteY2" fmla="*/ 1019175 h 1905000"/>
-                <a:gd name="connsiteX3" fmla="*/ 997491 w 1116599"/>
-                <a:gd name="connsiteY3" fmla="*/ 1905000 h 1905000"/>
-                <a:gd name="connsiteX0" fmla="*/ 54879 w 1136012"/>
-                <a:gd name="connsiteY0" fmla="*/ 0 h 1905000"/>
-                <a:gd name="connsiteX1" fmla="*/ 365668 w 1136012"/>
-                <a:gd name="connsiteY1" fmla="*/ 904875 h 1905000"/>
-                <a:gd name="connsiteX2" fmla="*/ 831575 w 1136012"/>
-                <a:gd name="connsiteY2" fmla="*/ 1019175 h 1905000"/>
-                <a:gd name="connsiteX3" fmla="*/ 1016904 w 1136012"/>
-                <a:gd name="connsiteY3" fmla="*/ 1905000 h 1905000"/>
-              </a:gdLst>
-              <a:ahLst/>
-              <a:cxnLst>
-                <a:cxn ang="0">
-                  <a:pos x="connsiteX0" y="connsiteY0"/>
-                </a:cxn>
-                <a:cxn ang="0">
-                  <a:pos x="connsiteX1" y="connsiteY1"/>
-                </a:cxn>
-                <a:cxn ang="0">
-                  <a:pos x="connsiteX2" y="connsiteY2"/>
-                </a:cxn>
-                <a:cxn ang="0">
-                  <a:pos x="connsiteX3" y="connsiteY3"/>
-                </a:cxn>
-              </a:cxnLst>
-              <a:rect l="l" t="t" r="r" b="b"/>
-              <a:pathLst>
-                <a:path w="1136012" h="1905000">
-                  <a:moveTo>
-                    <a:pt x="54879" y="0"/>
-                  </a:moveTo>
-                  <a:cubicBezTo>
-                    <a:pt x="51704" y="323850"/>
-                    <a:pt x="0" y="733425"/>
-                    <a:pt x="365668" y="904875"/>
-                  </a:cubicBezTo>
-                  <a:cubicBezTo>
-                    <a:pt x="608329" y="968375"/>
-                    <a:pt x="579210" y="917575"/>
-                    <a:pt x="831575" y="1019175"/>
-                  </a:cubicBezTo>
-                  <a:cubicBezTo>
-                    <a:pt x="1136012" y="1266825"/>
-                    <a:pt x="1013366" y="1590675"/>
-                    <a:pt x="1016904" y="1905000"/>
-                  </a:cubicBezTo>
-                </a:path>
-              </a:pathLst>
-            </a:custGeom>
-            <a:ln>
-              <a:solidFill>
-                <a:schemeClr val="tx1"/>
-              </a:solidFill>
-            </a:ln>
-          </p:spPr>
-          <p:style>
-            <a:lnRef idx="1">
-              <a:schemeClr val="accent1"/>
-            </a:lnRef>
-            <a:fillRef idx="0">
-              <a:schemeClr val="accent1"/>
-            </a:fillRef>
-            <a:effectRef idx="0">
-              <a:schemeClr val="accent1"/>
-            </a:effectRef>
-            <a:fontRef idx="minor">
+            </a:solidFill>
+            <a:tailEnd type="arrow"/>
+          </a:ln>
+        </p:spPr>
+        <p:style>
+          <a:lnRef idx="1">
+            <a:schemeClr val="accent1"/>
+          </a:lnRef>
+          <a:fillRef idx="0">
+            <a:schemeClr val="accent1"/>
+          </a:fillRef>
+          <a:effectRef idx="0">
+            <a:schemeClr val="accent1"/>
+          </a:effectRef>
+          <a:fontRef idx="minor">
+            <a:schemeClr val="tx1"/>
+          </a:fontRef>
+        </p:style>
+      </p:cxnSp>
+      <p:sp>
+        <p:nvSpPr>
+          <p:cNvPr id="64" name="Freeform 63"/>
+          <p:cNvSpPr/>
+          <p:nvPr/>
+        </p:nvSpPr>
+        <p:spPr>
+          <a:xfrm>
+            <a:off x="914400" y="499672"/>
+            <a:ext cx="3577653" cy="3097967"/>
+          </a:xfrm>
+          <a:custGeom>
+            <a:avLst/>
+            <a:gdLst>
+              <a:gd name="connsiteX0" fmla="*/ 0 w 3577653"/>
+              <a:gd name="connsiteY0" fmla="*/ 3097967 h 3097967"/>
+              <a:gd name="connsiteX1" fmla="*/ 1491521 w 3577653"/>
+              <a:gd name="connsiteY1" fmla="*/ 534649 h 3097967"/>
+              <a:gd name="connsiteX2" fmla="*/ 2870616 w 3577653"/>
+              <a:gd name="connsiteY2" fmla="*/ 69954 h 3097967"/>
+              <a:gd name="connsiteX3" fmla="*/ 3545174 w 3577653"/>
+              <a:gd name="connsiteY3" fmla="*/ 954374 h 3097967"/>
+              <a:gd name="connsiteX4" fmla="*/ 3065489 w 3577653"/>
+              <a:gd name="connsiteY4" fmla="*/ 1044315 h 3097967"/>
+            </a:gdLst>
+            <a:ahLst/>
+            <a:cxnLst>
+              <a:cxn ang="0">
+                <a:pos x="connsiteX0" y="connsiteY0"/>
+              </a:cxn>
+              <a:cxn ang="0">
+                <a:pos x="connsiteX1" y="connsiteY1"/>
+              </a:cxn>
+              <a:cxn ang="0">
+                <a:pos x="connsiteX2" y="connsiteY2"/>
+              </a:cxn>
+              <a:cxn ang="0">
+                <a:pos x="connsiteX3" y="connsiteY3"/>
+              </a:cxn>
+              <a:cxn ang="0">
+                <a:pos x="connsiteX4" y="connsiteY4"/>
+              </a:cxn>
+            </a:cxnLst>
+            <a:rect l="l" t="t" r="r" b="b"/>
+            <a:pathLst>
+              <a:path w="3577653" h="3097967">
+                <a:moveTo>
+                  <a:pt x="0" y="3097967"/>
+                </a:moveTo>
+                <a:cubicBezTo>
+                  <a:pt x="506542" y="2068642"/>
+                  <a:pt x="1013085" y="1039318"/>
+                  <a:pt x="1491521" y="534649"/>
+                </a:cubicBezTo>
+                <a:cubicBezTo>
+                  <a:pt x="1969957" y="29980"/>
+                  <a:pt x="2528341" y="0"/>
+                  <a:pt x="2870616" y="69954"/>
+                </a:cubicBezTo>
+                <a:cubicBezTo>
+                  <a:pt x="3212891" y="139908"/>
+                  <a:pt x="3512695" y="791981"/>
+                  <a:pt x="3545174" y="954374"/>
+                </a:cubicBezTo>
+                <a:cubicBezTo>
+                  <a:pt x="3577653" y="1116767"/>
+                  <a:pt x="3321571" y="1080541"/>
+                  <a:pt x="3065489" y="1044315"/>
+                </a:cubicBezTo>
+              </a:path>
+            </a:pathLst>
+          </a:custGeom>
+          <a:ln>
+            <a:solidFill>
               <a:schemeClr val="tx1"/>
-            </a:fontRef>
-          </p:style>
-          <p:txBody>
-            <a:bodyPr rtlCol="0" anchor="ctr"/>
-            <a:lstStyle/>
-            <a:p>
-              <a:pPr algn="ctr"/>
-              <a:endParaRPr lang="en-US"/>
-            </a:p>
-          </p:txBody>
-        </p:sp>
-      </p:grpSp>
+            </a:solidFill>
+          </a:ln>
+        </p:spPr>
+        <p:style>
+          <a:lnRef idx="1">
+            <a:schemeClr val="accent1"/>
+          </a:lnRef>
+          <a:fillRef idx="0">
+            <a:schemeClr val="accent1"/>
+          </a:fillRef>
+          <a:effectRef idx="0">
+            <a:schemeClr val="accent1"/>
+          </a:effectRef>
+          <a:fontRef idx="minor">
+            <a:schemeClr val="tx1"/>
+          </a:fontRef>
+        </p:style>
+        <p:txBody>
+          <a:bodyPr rtlCol="0" anchor="ctr"/>
+          <a:lstStyle/>
+          <a:p>
+            <a:pPr algn="ctr"/>
+            <a:endParaRPr lang="en-US"/>
+          </a:p>
+        </p:txBody>
+      </p:sp>
+      <p:sp>
+        <p:nvSpPr>
+          <p:cNvPr id="66" name="Freeform 65"/>
+          <p:cNvSpPr/>
+          <p:nvPr/>
+        </p:nvSpPr>
+        <p:spPr>
+          <a:xfrm>
+            <a:off x="3095469" y="1806315"/>
+            <a:ext cx="1337872" cy="1926236"/>
+          </a:xfrm>
+          <a:custGeom>
+            <a:avLst/>
+            <a:gdLst>
+              <a:gd name="connsiteX0" fmla="*/ 0 w 1337872"/>
+              <a:gd name="connsiteY0" fmla="*/ 0 h 1926236"/>
+              <a:gd name="connsiteX1" fmla="*/ 1184223 w 1337872"/>
+              <a:gd name="connsiteY1" fmla="*/ 1424065 h 1926236"/>
+              <a:gd name="connsiteX2" fmla="*/ 921895 w 1337872"/>
+              <a:gd name="connsiteY2" fmla="*/ 1926236 h 1926236"/>
+            </a:gdLst>
+            <a:ahLst/>
+            <a:cxnLst>
+              <a:cxn ang="0">
+                <a:pos x="connsiteX0" y="connsiteY0"/>
+              </a:cxn>
+              <a:cxn ang="0">
+                <a:pos x="connsiteX1" y="connsiteY1"/>
+              </a:cxn>
+              <a:cxn ang="0">
+                <a:pos x="connsiteX2" y="connsiteY2"/>
+              </a:cxn>
+            </a:cxnLst>
+            <a:rect l="l" t="t" r="r" b="b"/>
+            <a:pathLst>
+              <a:path w="1337872" h="1926236">
+                <a:moveTo>
+                  <a:pt x="0" y="0"/>
+                </a:moveTo>
+                <a:cubicBezTo>
+                  <a:pt x="515287" y="551513"/>
+                  <a:pt x="1030574" y="1103026"/>
+                  <a:pt x="1184223" y="1424065"/>
+                </a:cubicBezTo>
+                <a:cubicBezTo>
+                  <a:pt x="1337872" y="1745104"/>
+                  <a:pt x="1129883" y="1835670"/>
+                  <a:pt x="921895" y="1926236"/>
+                </a:cubicBezTo>
+              </a:path>
+            </a:pathLst>
+          </a:custGeom>
+          <a:ln>
+            <a:solidFill>
+              <a:schemeClr val="tx1"/>
+            </a:solidFill>
+          </a:ln>
+        </p:spPr>
+        <p:style>
+          <a:lnRef idx="1">
+            <a:schemeClr val="accent1"/>
+          </a:lnRef>
+          <a:fillRef idx="0">
+            <a:schemeClr val="accent1"/>
+          </a:fillRef>
+          <a:effectRef idx="0">
+            <a:schemeClr val="accent1"/>
+          </a:effectRef>
+          <a:fontRef idx="minor">
+            <a:schemeClr val="tx1"/>
+          </a:fontRef>
+        </p:style>
+        <p:txBody>
+          <a:bodyPr rtlCol="0" anchor="ctr"/>
+          <a:lstStyle/>
+          <a:p>
+            <a:pPr algn="ctr"/>
+            <a:endParaRPr lang="en-US"/>
+          </a:p>
+        </p:txBody>
+      </p:sp>
+      <p:sp>
+        <p:nvSpPr>
+          <p:cNvPr id="68" name="Freeform 67"/>
+          <p:cNvSpPr/>
+          <p:nvPr/>
+        </p:nvSpPr>
+        <p:spPr>
+          <a:xfrm>
+            <a:off x="921895" y="3279099"/>
+            <a:ext cx="4864308" cy="1236688"/>
+          </a:xfrm>
+          <a:custGeom>
+            <a:avLst/>
+            <a:gdLst>
+              <a:gd name="connsiteX0" fmla="*/ 0 w 4864308"/>
+              <a:gd name="connsiteY0" fmla="*/ 318540 h 1236688"/>
+              <a:gd name="connsiteX1" fmla="*/ 3515194 w 4864308"/>
+              <a:gd name="connsiteY1" fmla="*/ 1210455 h 1236688"/>
+              <a:gd name="connsiteX2" fmla="*/ 4414603 w 4864308"/>
+              <a:gd name="connsiteY2" fmla="*/ 161144 h 1236688"/>
+              <a:gd name="connsiteX3" fmla="*/ 4864308 w 4864308"/>
+              <a:gd name="connsiteY3" fmla="*/ 243590 h 1236688"/>
+            </a:gdLst>
+            <a:ahLst/>
+            <a:cxnLst>
+              <a:cxn ang="0">
+                <a:pos x="connsiteX0" y="connsiteY0"/>
+              </a:cxn>
+              <a:cxn ang="0">
+                <a:pos x="connsiteX1" y="connsiteY1"/>
+              </a:cxn>
+              <a:cxn ang="0">
+                <a:pos x="connsiteX2" y="connsiteY2"/>
+              </a:cxn>
+              <a:cxn ang="0">
+                <a:pos x="connsiteX3" y="connsiteY3"/>
+              </a:cxn>
+            </a:cxnLst>
+            <a:rect l="l" t="t" r="r" b="b"/>
+            <a:pathLst>
+              <a:path w="4864308" h="1236688">
+                <a:moveTo>
+                  <a:pt x="0" y="318540"/>
+                </a:moveTo>
+                <a:cubicBezTo>
+                  <a:pt x="1389713" y="777614"/>
+                  <a:pt x="2779427" y="1236688"/>
+                  <a:pt x="3515194" y="1210455"/>
+                </a:cubicBezTo>
+                <a:cubicBezTo>
+                  <a:pt x="4250961" y="1184222"/>
+                  <a:pt x="4189751" y="322288"/>
+                  <a:pt x="4414603" y="161144"/>
+                </a:cubicBezTo>
+                <a:cubicBezTo>
+                  <a:pt x="4639455" y="0"/>
+                  <a:pt x="4751881" y="121795"/>
+                  <a:pt x="4864308" y="243590"/>
+                </a:cubicBezTo>
+              </a:path>
+            </a:pathLst>
+          </a:custGeom>
+          <a:ln>
+            <a:solidFill>
+              <a:schemeClr val="tx1"/>
+            </a:solidFill>
+          </a:ln>
+        </p:spPr>
+        <p:style>
+          <a:lnRef idx="1">
+            <a:schemeClr val="accent1"/>
+          </a:lnRef>
+          <a:fillRef idx="0">
+            <a:schemeClr val="accent1"/>
+          </a:fillRef>
+          <a:effectRef idx="0">
+            <a:schemeClr val="accent1"/>
+          </a:effectRef>
+          <a:fontRef idx="minor">
+            <a:schemeClr val="tx1"/>
+          </a:fontRef>
+        </p:style>
+        <p:txBody>
+          <a:bodyPr rtlCol="0" anchor="ctr"/>
+          <a:lstStyle/>
+          <a:p>
+            <a:pPr algn="ctr"/>
+            <a:endParaRPr lang="en-US"/>
+          </a:p>
+        </p:txBody>
+      </p:sp>
     </p:spTree>
   </p:cSld>
   <p:clrMapOvr>
@@ -21223,15 +20683,7 @@
                   <a:schemeClr val="accent4"/>
                 </a:solidFill>
               </a:rPr>
-              <a:t>{</a:t>
-            </a:r>
-            <a:r>
-              <a:rPr lang="en-US" sz="800" dirty="0" smtClean="0">
-                <a:solidFill>
-                  <a:schemeClr val="accent4"/>
-                </a:solidFill>
-              </a:rPr>
-              <a:t>a(13),b(13),</a:t>
+              <a:t>{a(13),b(13),</a:t>
             </a:r>
           </a:p>
           <a:p>
@@ -21376,34 +20828,18 @@
                   <a:schemeClr val="accent4"/>
                 </a:solidFill>
               </a:rPr>
-              <a:t>{</a:t>
-            </a:r>
+              <a:t>{a(13),b(13),</a:t>
+            </a:r>
+          </a:p>
+          <a:p>
+            <a:pPr algn="ctr"/>
             <a:r>
               <a:rPr lang="en-US" sz="800" dirty="0" smtClean="0">
                 <a:solidFill>
                   <a:schemeClr val="accent4"/>
                 </a:solidFill>
               </a:rPr>
-              <a:t>a(13),b(13),</a:t>
-            </a:r>
-          </a:p>
-          <a:p>
-            <a:pPr algn="ctr"/>
-            <a:r>
-              <a:rPr lang="en-US" sz="800" dirty="0" smtClean="0">
-                <a:solidFill>
-                  <a:schemeClr val="accent4"/>
-                </a:solidFill>
-              </a:rPr>
-              <a:t>c</a:t>
-            </a:r>
-            <a:r>
-              <a:rPr lang="en-US" sz="800" dirty="0" smtClean="0">
-                <a:solidFill>
-                  <a:schemeClr val="accent4"/>
-                </a:solidFill>
-              </a:rPr>
-              <a:t>all(13),ret(13)}r</a:t>
+              <a:t>call(13),ret(13)}r</a:t>
             </a:r>
             <a:endParaRPr lang="en-US" sz="800" dirty="0">
               <a:solidFill>
@@ -21801,15 +21237,7 @@
                   <a:schemeClr val="accent4"/>
                 </a:solidFill>
               </a:rPr>
-              <a:t>{</a:t>
-            </a:r>
-            <a:r>
-              <a:rPr lang="en-US" sz="800" dirty="0" smtClean="0">
-                <a:solidFill>
-                  <a:schemeClr val="accent4"/>
-                </a:solidFill>
-              </a:rPr>
-              <a:t>a(13),b(13),</a:t>
+              <a:t>{a(13),b(13),</a:t>
             </a:r>
           </a:p>
           <a:p>
@@ -22253,15 +21681,7 @@
                   <a:schemeClr val="accent4"/>
                 </a:solidFill>
               </a:rPr>
-              <a:t>{</a:t>
-            </a:r>
-            <a:r>
-              <a:rPr lang="en-US" sz="800" dirty="0" smtClean="0">
-                <a:solidFill>
-                  <a:schemeClr val="accent4"/>
-                </a:solidFill>
-              </a:rPr>
-              <a:t>a(13),b(13),</a:t>
+              <a:t>{a(13),b(13),</a:t>
             </a:r>
           </a:p>
           <a:p>
@@ -22428,15 +21848,7 @@
                   <a:schemeClr val="accent4"/>
                 </a:solidFill>
               </a:rPr>
-              <a:t>{</a:t>
-            </a:r>
-            <a:r>
-              <a:rPr lang="en-US" sz="800" dirty="0" smtClean="0">
-                <a:solidFill>
-                  <a:schemeClr val="accent4"/>
-                </a:solidFill>
-              </a:rPr>
-              <a:t>a(13),b(13),</a:t>
+              <a:t>{a(13),b(13),</a:t>
             </a:r>
           </a:p>
           <a:p>
@@ -22715,15 +22127,7 @@
                   <a:schemeClr val="accent4"/>
                 </a:solidFill>
               </a:rPr>
-              <a:t>{</a:t>
-            </a:r>
-            <a:r>
-              <a:rPr lang="en-US" sz="800" dirty="0" smtClean="0">
-                <a:solidFill>
-                  <a:schemeClr val="accent4"/>
-                </a:solidFill>
-              </a:rPr>
-              <a:t>a(13),b(13),</a:t>
+              <a:t>{a(13),b(13),</a:t>
             </a:r>
           </a:p>
           <a:p>
@@ -23027,34 +22431,18 @@
                   <a:schemeClr val="accent4"/>
                 </a:solidFill>
               </a:rPr>
-              <a:t>{</a:t>
-            </a:r>
+              <a:t>{a(13),b(13),</a:t>
+            </a:r>
+          </a:p>
+          <a:p>
+            <a:pPr algn="ctr"/>
             <a:r>
               <a:rPr lang="en-US" sz="800" dirty="0" smtClean="0">
                 <a:solidFill>
                   <a:schemeClr val="accent4"/>
                 </a:solidFill>
               </a:rPr>
-              <a:t>a(13),b(13),</a:t>
-            </a:r>
-          </a:p>
-          <a:p>
-            <a:pPr algn="ctr"/>
-            <a:r>
-              <a:rPr lang="en-US" sz="800" dirty="0" smtClean="0">
-                <a:solidFill>
-                  <a:schemeClr val="accent4"/>
-                </a:solidFill>
-              </a:rPr>
-              <a:t>c</a:t>
-            </a:r>
-            <a:r>
-              <a:rPr lang="en-US" sz="800" dirty="0" smtClean="0">
-                <a:solidFill>
-                  <a:schemeClr val="accent4"/>
-                </a:solidFill>
-              </a:rPr>
-              <a:t>all(13),ret(13)}r</a:t>
+              <a:t>call(13),ret(13)}r</a:t>
             </a:r>
             <a:endParaRPr lang="en-US" sz="800" dirty="0">
               <a:solidFill>
@@ -23212,34 +22600,18 @@
                   <a:schemeClr val="accent4"/>
                 </a:solidFill>
               </a:rPr>
-              <a:t>{</a:t>
-            </a:r>
+              <a:t>{a(13),b(13),</a:t>
+            </a:r>
+          </a:p>
+          <a:p>
+            <a:pPr algn="ctr"/>
             <a:r>
               <a:rPr lang="en-US" sz="800" dirty="0" smtClean="0">
                 <a:solidFill>
                   <a:schemeClr val="accent4"/>
                 </a:solidFill>
               </a:rPr>
-              <a:t>a(13),b(13),</a:t>
-            </a:r>
-          </a:p>
-          <a:p>
-            <a:pPr algn="ctr"/>
-            <a:r>
-              <a:rPr lang="en-US" sz="800" dirty="0" smtClean="0">
-                <a:solidFill>
-                  <a:schemeClr val="accent4"/>
-                </a:solidFill>
-              </a:rPr>
-              <a:t>c</a:t>
-            </a:r>
-            <a:r>
-              <a:rPr lang="en-US" sz="800" dirty="0" smtClean="0">
-                <a:solidFill>
-                  <a:schemeClr val="accent4"/>
-                </a:solidFill>
-              </a:rPr>
-              <a:t>all(13),ret(13)}r</a:t>
+              <a:t>call(13),ret(13)}r</a:t>
             </a:r>
             <a:endParaRPr lang="en-US" sz="800" dirty="0">
               <a:solidFill>
@@ -23427,34 +22799,18 @@
                   <a:schemeClr val="accent4"/>
                 </a:solidFill>
               </a:rPr>
-              <a:t>{</a:t>
-            </a:r>
+              <a:t>{a(13),b(13),</a:t>
+            </a:r>
+          </a:p>
+          <a:p>
+            <a:pPr algn="ctr"/>
             <a:r>
               <a:rPr lang="en-US" sz="800" dirty="0" smtClean="0">
                 <a:solidFill>
                   <a:schemeClr val="accent4"/>
                 </a:solidFill>
               </a:rPr>
-              <a:t>a(13),b(13),</a:t>
-            </a:r>
-          </a:p>
-          <a:p>
-            <a:pPr algn="ctr"/>
-            <a:r>
-              <a:rPr lang="en-US" sz="800" dirty="0" smtClean="0">
-                <a:solidFill>
-                  <a:schemeClr val="accent4"/>
-                </a:solidFill>
-              </a:rPr>
-              <a:t>c</a:t>
-            </a:r>
-            <a:r>
-              <a:rPr lang="en-US" sz="800" dirty="0" smtClean="0">
-                <a:solidFill>
-                  <a:schemeClr val="accent4"/>
-                </a:solidFill>
-              </a:rPr>
-              <a:t>all(13),ret(13)}r</a:t>
+              <a:t>call(13),ret(13)}r</a:t>
             </a:r>
             <a:endParaRPr lang="en-US" sz="800" dirty="0">
               <a:solidFill>
@@ -23588,34 +22944,18 @@
                   <a:schemeClr val="accent4"/>
                 </a:solidFill>
               </a:rPr>
-              <a:t>{</a:t>
-            </a:r>
+              <a:t>{a(13),b(13),</a:t>
+            </a:r>
+          </a:p>
+          <a:p>
+            <a:pPr algn="ctr"/>
             <a:r>
               <a:rPr lang="en-US" sz="800" dirty="0" smtClean="0">
                 <a:solidFill>
                   <a:schemeClr val="accent4"/>
                 </a:solidFill>
               </a:rPr>
-              <a:t>a(13),b(13),</a:t>
-            </a:r>
-          </a:p>
-          <a:p>
-            <a:pPr algn="ctr"/>
-            <a:r>
-              <a:rPr lang="en-US" sz="800" dirty="0" smtClean="0">
-                <a:solidFill>
-                  <a:schemeClr val="accent4"/>
-                </a:solidFill>
-              </a:rPr>
-              <a:t>c</a:t>
-            </a:r>
-            <a:r>
-              <a:rPr lang="en-US" sz="800" dirty="0" smtClean="0">
-                <a:solidFill>
-                  <a:schemeClr val="accent4"/>
-                </a:solidFill>
-              </a:rPr>
-              <a:t>all(13),ret(12)}r</a:t>
+              <a:t>call(13),ret(12)}r</a:t>
             </a:r>
             <a:endParaRPr lang="en-US" sz="800" dirty="0">
               <a:solidFill>
@@ -23749,34 +23089,18 @@
                   <a:schemeClr val="accent4"/>
                 </a:solidFill>
               </a:rPr>
-              <a:t>{</a:t>
-            </a:r>
+              <a:t>{a(13),b(13),</a:t>
+            </a:r>
+          </a:p>
+          <a:p>
+            <a:pPr algn="ctr"/>
             <a:r>
               <a:rPr lang="en-US" sz="800" dirty="0" smtClean="0">
                 <a:solidFill>
                   <a:schemeClr val="accent4"/>
                 </a:solidFill>
               </a:rPr>
-              <a:t>a(13),b(13),</a:t>
-            </a:r>
-          </a:p>
-          <a:p>
-            <a:pPr algn="ctr"/>
-            <a:r>
-              <a:rPr lang="en-US" sz="800" dirty="0" smtClean="0">
-                <a:solidFill>
-                  <a:schemeClr val="accent4"/>
-                </a:solidFill>
-              </a:rPr>
-              <a:t>c</a:t>
-            </a:r>
-            <a:r>
-              <a:rPr lang="en-US" sz="800" dirty="0" smtClean="0">
-                <a:solidFill>
-                  <a:schemeClr val="accent4"/>
-                </a:solidFill>
-              </a:rPr>
-              <a:t>all(13),ret(12)}r</a:t>
+              <a:t>call(13),ret(12)}r</a:t>
             </a:r>
             <a:endParaRPr lang="en-US" sz="800" dirty="0">
               <a:solidFill>
@@ -23856,34 +23180,18 @@
                   <a:schemeClr val="accent4"/>
                 </a:solidFill>
               </a:rPr>
-              <a:t>{</a:t>
-            </a:r>
+              <a:t>{a(13),b(13),</a:t>
+            </a:r>
+          </a:p>
+          <a:p>
+            <a:pPr algn="ctr"/>
             <a:r>
               <a:rPr lang="en-US" sz="800" dirty="0" smtClean="0">
                 <a:solidFill>
                   <a:schemeClr val="accent4"/>
                 </a:solidFill>
               </a:rPr>
-              <a:t>a(13),b(13),</a:t>
-            </a:r>
-          </a:p>
-          <a:p>
-            <a:pPr algn="ctr"/>
-            <a:r>
-              <a:rPr lang="en-US" sz="800" dirty="0" smtClean="0">
-                <a:solidFill>
-                  <a:schemeClr val="accent4"/>
-                </a:solidFill>
-              </a:rPr>
-              <a:t>c</a:t>
-            </a:r>
-            <a:r>
-              <a:rPr lang="en-US" sz="800" dirty="0" smtClean="0">
-                <a:solidFill>
-                  <a:schemeClr val="accent4"/>
-                </a:solidFill>
-              </a:rPr>
-              <a:t>all(13),ret(13)}r</a:t>
+              <a:t>call(13),ret(13)}r</a:t>
             </a:r>
             <a:endParaRPr lang="en-US" sz="800" dirty="0">
               <a:solidFill>
@@ -24071,15 +23379,7 @@
                   <a:schemeClr val="accent4"/>
                 </a:solidFill>
               </a:rPr>
-              <a:t>{</a:t>
-            </a:r>
-            <a:r>
-              <a:rPr lang="en-US" sz="800" dirty="0" smtClean="0">
-                <a:solidFill>
-                  <a:schemeClr val="accent4"/>
-                </a:solidFill>
-              </a:rPr>
-              <a:t>a(13),b(13),</a:t>
+              <a:t>{a(13),b(13),</a:t>
             </a:r>
           </a:p>
           <a:p>

</xml_diff>

<commit_message>
Changed fig 17 (determinized NWA) to number states instead of showing relation
git-svn-id: file:///p/wpis/people/students/kidd/svnwali/branches/burtona@767 dfa36f5b-b2fa-0310-9605-e5aca7e64462
</commit_message>
<xml_diff>
--- a/Doc/NWA_tex/Examples.pptx
+++ b/Doc/NWA_tex/Examples.pptx
@@ -215,7 +215,7 @@
             <a:fld id="{FFE90CD3-0D2C-4CB7-931F-D1FD92D430F5}" type="datetimeFigureOut">
               <a:rPr lang="en-US" smtClean="0"/>
               <a:pPr/>
-              <a:t>7/2/2010</a:t>
+              <a:t>7/8/2010</a:t>
             </a:fld>
             <a:endParaRPr lang="en-US"/>
           </a:p>
@@ -2721,7 +2721,7 @@
             <a:fld id="{50089AFF-3D09-4087-97CB-5A8328D4F8E9}" type="datetimeFigureOut">
               <a:rPr lang="en-US" smtClean="0"/>
               <a:pPr/>
-              <a:t>7/2/2010</a:t>
+              <a:t>7/8/2010</a:t>
             </a:fld>
             <a:endParaRPr lang="en-US"/>
           </a:p>
@@ -2888,7 +2888,7 @@
             <a:fld id="{50089AFF-3D09-4087-97CB-5A8328D4F8E9}" type="datetimeFigureOut">
               <a:rPr lang="en-US" smtClean="0"/>
               <a:pPr/>
-              <a:t>7/2/2010</a:t>
+              <a:t>7/8/2010</a:t>
             </a:fld>
             <a:endParaRPr lang="en-US"/>
           </a:p>
@@ -3065,7 +3065,7 @@
             <a:fld id="{50089AFF-3D09-4087-97CB-5A8328D4F8E9}" type="datetimeFigureOut">
               <a:rPr lang="en-US" smtClean="0"/>
               <a:pPr/>
-              <a:t>7/2/2010</a:t>
+              <a:t>7/8/2010</a:t>
             </a:fld>
             <a:endParaRPr lang="en-US"/>
           </a:p>
@@ -3232,7 +3232,7 @@
             <a:fld id="{50089AFF-3D09-4087-97CB-5A8328D4F8E9}" type="datetimeFigureOut">
               <a:rPr lang="en-US" smtClean="0"/>
               <a:pPr/>
-              <a:t>7/2/2010</a:t>
+              <a:t>7/8/2010</a:t>
             </a:fld>
             <a:endParaRPr lang="en-US"/>
           </a:p>
@@ -3475,7 +3475,7 @@
             <a:fld id="{50089AFF-3D09-4087-97CB-5A8328D4F8E9}" type="datetimeFigureOut">
               <a:rPr lang="en-US" smtClean="0"/>
               <a:pPr/>
-              <a:t>7/2/2010</a:t>
+              <a:t>7/8/2010</a:t>
             </a:fld>
             <a:endParaRPr lang="en-US"/>
           </a:p>
@@ -3760,7 +3760,7 @@
             <a:fld id="{50089AFF-3D09-4087-97CB-5A8328D4F8E9}" type="datetimeFigureOut">
               <a:rPr lang="en-US" smtClean="0"/>
               <a:pPr/>
-              <a:t>7/2/2010</a:t>
+              <a:t>7/8/2010</a:t>
             </a:fld>
             <a:endParaRPr lang="en-US"/>
           </a:p>
@@ -4179,7 +4179,7 @@
             <a:fld id="{50089AFF-3D09-4087-97CB-5A8328D4F8E9}" type="datetimeFigureOut">
               <a:rPr lang="en-US" smtClean="0"/>
               <a:pPr/>
-              <a:t>7/2/2010</a:t>
+              <a:t>7/8/2010</a:t>
             </a:fld>
             <a:endParaRPr lang="en-US"/>
           </a:p>
@@ -4294,7 +4294,7 @@
             <a:fld id="{50089AFF-3D09-4087-97CB-5A8328D4F8E9}" type="datetimeFigureOut">
               <a:rPr lang="en-US" smtClean="0"/>
               <a:pPr/>
-              <a:t>7/2/2010</a:t>
+              <a:t>7/8/2010</a:t>
             </a:fld>
             <a:endParaRPr lang="en-US"/>
           </a:p>
@@ -4386,7 +4386,7 @@
             <a:fld id="{50089AFF-3D09-4087-97CB-5A8328D4F8E9}" type="datetimeFigureOut">
               <a:rPr lang="en-US" smtClean="0"/>
               <a:pPr/>
-              <a:t>7/2/2010</a:t>
+              <a:t>7/8/2010</a:t>
             </a:fld>
             <a:endParaRPr lang="en-US"/>
           </a:p>
@@ -4660,7 +4660,7 @@
             <a:fld id="{50089AFF-3D09-4087-97CB-5A8328D4F8E9}" type="datetimeFigureOut">
               <a:rPr lang="en-US" smtClean="0"/>
               <a:pPr/>
-              <a:t>7/2/2010</a:t>
+              <a:t>7/8/2010</a:t>
             </a:fld>
             <a:endParaRPr lang="en-US"/>
           </a:p>
@@ -4910,7 +4910,7 @@
             <a:fld id="{50089AFF-3D09-4087-97CB-5A8328D4F8E9}" type="datetimeFigureOut">
               <a:rPr lang="en-US" smtClean="0"/>
               <a:pPr/>
-              <a:t>7/2/2010</a:t>
+              <a:t>7/8/2010</a:t>
             </a:fld>
             <a:endParaRPr lang="en-US"/>
           </a:p>
@@ -5120,7 +5120,7 @@
             <a:fld id="{50089AFF-3D09-4087-97CB-5A8328D4F8E9}" type="datetimeFigureOut">
               <a:rPr lang="en-US" smtClean="0"/>
               <a:pPr/>
-              <a:t>7/2/2010</a:t>
+              <a:t>7/8/2010</a:t>
             </a:fld>
             <a:endParaRPr lang="en-US"/>
           </a:p>
@@ -18538,120 +18538,10 @@
             <a:p>
               <a:pPr algn="ctr"/>
               <a:r>
-                <a:rPr lang="en-US" sz="400" dirty="0" smtClean="0"/>
-                <a:t>{(</a:t>
-              </a:r>
-              <a:r>
-                <a:rPr lang="en-US" sz="400" dirty="0" err="1" smtClean="0"/>
-                <a:t>Start,Start</a:t>
-              </a:r>
-              <a:r>
-                <a:rPr lang="en-US" sz="400" dirty="0" smtClean="0"/>
-                <a:t>),</a:t>
-              </a:r>
-            </a:p>
-            <a:p>
-              <a:pPr algn="ctr"/>
-              <a:r>
-                <a:rPr lang="en-US" sz="400" dirty="0" smtClean="0"/>
-                <a:t>(</a:t>
-              </a:r>
-              <a:r>
-                <a:rPr lang="en-US" sz="400" dirty="0" err="1" smtClean="0"/>
-                <a:t>Call,Call</a:t>
-              </a:r>
-              <a:r>
-                <a:rPr lang="en-US" sz="400" dirty="0" smtClean="0"/>
-                <a:t>),</a:t>
-              </a:r>
-            </a:p>
-            <a:p>
-              <a:pPr algn="ctr"/>
-              <a:r>
-                <a:rPr lang="en-US" sz="400" dirty="0" smtClean="0"/>
-                <a:t>(Entry1,Entry1),</a:t>
-              </a:r>
-            </a:p>
-            <a:p>
-              <a:pPr algn="ctr"/>
-              <a:r>
-                <a:rPr lang="en-US" sz="400" dirty="0" smtClean="0"/>
-                <a:t>(Entryy2,Entry2),</a:t>
-              </a:r>
-            </a:p>
-            <a:p>
-              <a:pPr algn="ctr"/>
-              <a:r>
-                <a:rPr lang="en-US" sz="400" dirty="0" smtClean="0"/>
-                <a:t>(State1,State1),</a:t>
-              </a:r>
-            </a:p>
-            <a:p>
-              <a:pPr algn="ctr"/>
-              <a:r>
-                <a:rPr lang="en-US" sz="400" dirty="0" smtClean="0"/>
-                <a:t>(State2,State2),</a:t>
-              </a:r>
-            </a:p>
-            <a:p>
-              <a:pPr algn="ctr"/>
-              <a:r>
-                <a:rPr lang="en-US" sz="400" dirty="0" smtClean="0"/>
-                <a:t>(Exit1,Exit1),</a:t>
-              </a:r>
-            </a:p>
-            <a:p>
-              <a:pPr algn="ctr"/>
-              <a:r>
-                <a:rPr lang="en-US" sz="400" dirty="0" smtClean="0"/>
-                <a:t>(Exit2,Exit2),</a:t>
-              </a:r>
-            </a:p>
-            <a:p>
-              <a:pPr algn="ctr"/>
-              <a:r>
-                <a:rPr lang="en-US" sz="400" dirty="0" smtClean="0"/>
-                <a:t>(</a:t>
-              </a:r>
-              <a:r>
-                <a:rPr lang="en-US" sz="400" dirty="0" err="1" smtClean="0"/>
-                <a:t>Return,Return</a:t>
-              </a:r>
-              <a:r>
-                <a:rPr lang="en-US" sz="400" dirty="0" smtClean="0"/>
-                <a:t>),</a:t>
-              </a:r>
-            </a:p>
-            <a:p>
-              <a:pPr algn="ctr"/>
-              <a:r>
-                <a:rPr lang="en-US" sz="400" dirty="0" smtClean="0"/>
-                <a:t>(</a:t>
-              </a:r>
-              <a:r>
-                <a:rPr lang="en-US" sz="400" dirty="0" err="1" smtClean="0"/>
-                <a:t>Fishish,Finish</a:t>
-              </a:r>
-              <a:r>
-                <a:rPr lang="en-US" sz="400" dirty="0" smtClean="0"/>
-                <a:t>),</a:t>
-              </a:r>
-            </a:p>
-            <a:p>
-              <a:pPr algn="ctr"/>
-              <a:r>
-                <a:rPr lang="en-US" sz="400" dirty="0" smtClean="0"/>
-                <a:t>(</a:t>
-              </a:r>
-              <a:r>
-                <a:rPr lang="en-US" sz="400" dirty="0" err="1" smtClean="0"/>
-                <a:t>Stuck,Stuck</a:t>
-              </a:r>
-              <a:r>
-                <a:rPr lang="en-US" sz="400" dirty="0" smtClean="0"/>
-                <a:t>)}</a:t>
-              </a:r>
-              <a:endParaRPr lang="en-US" sz="400" dirty="0"/>
+                <a:rPr lang="en-US" sz="1100" dirty="0" smtClean="0"/>
+                <a:t>State 3</a:t>
+              </a:r>
+              <a:endParaRPr lang="en-US" sz="1100" dirty="0"/>
             </a:p>
           </p:txBody>
         </p:sp>
@@ -18691,120 +18581,10 @@
             <a:p>
               <a:pPr algn="ctr"/>
               <a:r>
-                <a:rPr lang="en-US" sz="400" dirty="0" smtClean="0"/>
-                <a:t>{(</a:t>
-              </a:r>
-              <a:r>
-                <a:rPr lang="en-US" sz="400" dirty="0" err="1" smtClean="0"/>
-                <a:t>Start,Call</a:t>
-              </a:r>
-              <a:r>
-                <a:rPr lang="en-US" sz="400" dirty="0" smtClean="0"/>
-                <a:t>),</a:t>
-              </a:r>
-            </a:p>
-            <a:p>
-              <a:pPr algn="ctr"/>
-              <a:r>
-                <a:rPr lang="en-US" sz="400" dirty="0" smtClean="0"/>
-                <a:t>(</a:t>
-              </a:r>
-              <a:r>
-                <a:rPr lang="en-US" sz="400" dirty="0" err="1" smtClean="0"/>
-                <a:t>Call,Stuck</a:t>
-              </a:r>
-              <a:r>
-                <a:rPr lang="en-US" sz="400" dirty="0" smtClean="0"/>
-                <a:t>),</a:t>
-              </a:r>
-            </a:p>
-            <a:p>
-              <a:pPr algn="ctr"/>
-              <a:r>
-                <a:rPr lang="en-US" sz="400" dirty="0" smtClean="0"/>
-                <a:t>(Entry1,Stuck),</a:t>
-              </a:r>
-            </a:p>
-            <a:p>
-              <a:pPr algn="ctr"/>
-              <a:r>
-                <a:rPr lang="en-US" sz="400" dirty="0" smtClean="0"/>
-                <a:t>(Entry2,State2),</a:t>
-              </a:r>
-            </a:p>
-            <a:p>
-              <a:pPr algn="ctr"/>
-              <a:r>
-                <a:rPr lang="en-US" sz="400" dirty="0" smtClean="0"/>
-                <a:t>(State1,Stuck),</a:t>
-              </a:r>
-            </a:p>
-            <a:p>
-              <a:pPr algn="ctr"/>
-              <a:r>
-                <a:rPr lang="en-US" sz="400" dirty="0" smtClean="0"/>
-                <a:t>(State2,Exit2),</a:t>
-              </a:r>
-            </a:p>
-            <a:p>
-              <a:pPr algn="ctr"/>
-              <a:r>
-                <a:rPr lang="en-US" sz="400" dirty="0" smtClean="0"/>
-                <a:t>(Exit1,Stuck),</a:t>
-              </a:r>
-            </a:p>
-            <a:p>
-              <a:pPr algn="ctr"/>
-              <a:r>
-                <a:rPr lang="en-US" sz="400" dirty="0" smtClean="0"/>
-                <a:t>(Exit2,Stuck),</a:t>
-              </a:r>
-            </a:p>
-            <a:p>
-              <a:pPr algn="ctr"/>
-              <a:r>
-                <a:rPr lang="en-US" sz="400" dirty="0" smtClean="0"/>
-                <a:t>(</a:t>
-              </a:r>
-              <a:r>
-                <a:rPr lang="en-US" sz="400" dirty="0" err="1" smtClean="0"/>
-                <a:t>Return,Finish</a:t>
-              </a:r>
-              <a:r>
-                <a:rPr lang="en-US" sz="400" dirty="0" smtClean="0"/>
-                <a:t>),</a:t>
-              </a:r>
-            </a:p>
-            <a:p>
-              <a:pPr algn="ctr"/>
-              <a:r>
-                <a:rPr lang="en-US" sz="400" dirty="0" smtClean="0"/>
-                <a:t>(</a:t>
-              </a:r>
-              <a:r>
-                <a:rPr lang="en-US" sz="400" dirty="0" err="1" smtClean="0"/>
-                <a:t>Fishish,Stuck</a:t>
-              </a:r>
-              <a:r>
-                <a:rPr lang="en-US" sz="400" dirty="0" smtClean="0"/>
-                <a:t>),</a:t>
-              </a:r>
-            </a:p>
-            <a:p>
-              <a:pPr algn="ctr"/>
-              <a:r>
-                <a:rPr lang="en-US" sz="400" dirty="0" smtClean="0"/>
-                <a:t>(</a:t>
-              </a:r>
-              <a:r>
-                <a:rPr lang="en-US" sz="400" dirty="0" err="1" smtClean="0"/>
-                <a:t>Stuck,Stuck</a:t>
-              </a:r>
-              <a:r>
-                <a:rPr lang="en-US" sz="400" dirty="0" smtClean="0"/>
-                <a:t>)}</a:t>
-              </a:r>
-              <a:endParaRPr lang="en-US" sz="400" dirty="0"/>
+                <a:rPr lang="en-US" sz="1100" dirty="0" smtClean="0"/>
+                <a:t>State 2</a:t>
+              </a:r>
+              <a:endParaRPr lang="en-US" sz="1100" dirty="0"/>
             </a:p>
           </p:txBody>
         </p:sp>
@@ -18844,134 +18624,10 @@
             <a:p>
               <a:pPr algn="ctr"/>
               <a:r>
-                <a:rPr lang="en-US" sz="400" dirty="0" smtClean="0"/>
-                <a:t>{(</a:t>
-              </a:r>
-              <a:r>
-                <a:rPr lang="en-US" sz="400" dirty="0" err="1" smtClean="0"/>
-                <a:t>Start,Stuck</a:t>
-              </a:r>
-              <a:r>
-                <a:rPr lang="en-US" sz="400" dirty="0" smtClean="0"/>
-                <a:t>),</a:t>
-              </a:r>
-            </a:p>
-            <a:p>
-              <a:pPr algn="ctr"/>
-              <a:r>
-                <a:rPr lang="en-US" sz="400" dirty="0" smtClean="0"/>
-                <a:t>(Call,Entry1),</a:t>
-              </a:r>
-            </a:p>
-            <a:p>
-              <a:pPr algn="ctr"/>
-              <a:r>
-                <a:rPr lang="en-US" sz="400" dirty="0" smtClean="0"/>
-                <a:t>(Call,Entry2),</a:t>
-              </a:r>
-            </a:p>
-            <a:p>
-              <a:pPr algn="ctr"/>
-              <a:r>
-                <a:rPr lang="en-US" sz="400" dirty="0" smtClean="0"/>
-                <a:t>(</a:t>
-              </a:r>
-              <a:r>
-                <a:rPr lang="en-US" sz="400" dirty="0" err="1" smtClean="0"/>
-                <a:t>Call,Stuck</a:t>
-              </a:r>
-              <a:r>
-                <a:rPr lang="en-US" sz="400" dirty="0" smtClean="0"/>
-                <a:t>),</a:t>
-              </a:r>
-            </a:p>
-            <a:p>
-              <a:pPr algn="ctr"/>
-              <a:r>
-                <a:rPr lang="en-US" sz="400" dirty="0" smtClean="0"/>
-                <a:t>(Entry1,Stuck),</a:t>
-              </a:r>
-            </a:p>
-            <a:p>
-              <a:pPr algn="ctr"/>
-              <a:r>
-                <a:rPr lang="en-US" sz="400" dirty="0" smtClean="0"/>
-                <a:t>(Entryy2,Stuck),</a:t>
-              </a:r>
-            </a:p>
-            <a:p>
-              <a:pPr algn="ctr"/>
-              <a:r>
-                <a:rPr lang="en-US" sz="400" dirty="0" smtClean="0"/>
-                <a:t>(State1,Stuck),</a:t>
-              </a:r>
-            </a:p>
-            <a:p>
-              <a:pPr algn="ctr"/>
-              <a:r>
-                <a:rPr lang="en-US" sz="400" dirty="0" smtClean="0"/>
-                <a:t>(State2,Stuck),</a:t>
-              </a:r>
-            </a:p>
-            <a:p>
-              <a:pPr algn="ctr"/>
-              <a:r>
-                <a:rPr lang="en-US" sz="400" dirty="0" smtClean="0"/>
-                <a:t>(Exit1,Stuck),</a:t>
-              </a:r>
-            </a:p>
-            <a:p>
-              <a:pPr algn="ctr"/>
-              <a:r>
-                <a:rPr lang="en-US" sz="400" dirty="0" smtClean="0"/>
-                <a:t>(Exit2,Stuck),</a:t>
-              </a:r>
-            </a:p>
-            <a:p>
-              <a:pPr algn="ctr"/>
-              <a:r>
-                <a:rPr lang="en-US" sz="400" dirty="0" smtClean="0"/>
-                <a:t>(</a:t>
-              </a:r>
-              <a:r>
-                <a:rPr lang="en-US" sz="400" dirty="0" err="1" smtClean="0"/>
-                <a:t>Return,Stuck</a:t>
-              </a:r>
-              <a:r>
-                <a:rPr lang="en-US" sz="400" dirty="0" smtClean="0"/>
-                <a:t>),</a:t>
-              </a:r>
-            </a:p>
-            <a:p>
-              <a:pPr algn="ctr"/>
-              <a:r>
-                <a:rPr lang="en-US" sz="400" dirty="0" smtClean="0"/>
-                <a:t>(</a:t>
-              </a:r>
-              <a:r>
-                <a:rPr lang="en-US" sz="400" dirty="0" err="1" smtClean="0"/>
-                <a:t>Fishish,Stuck</a:t>
-              </a:r>
-              <a:r>
-                <a:rPr lang="en-US" sz="400" dirty="0" smtClean="0"/>
-                <a:t>),</a:t>
-              </a:r>
-            </a:p>
-            <a:p>
-              <a:pPr algn="ctr"/>
-              <a:r>
-                <a:rPr lang="en-US" sz="400" dirty="0" smtClean="0"/>
-                <a:t>(</a:t>
-              </a:r>
-              <a:r>
-                <a:rPr lang="en-US" sz="400" dirty="0" err="1" smtClean="0"/>
-                <a:t>Stuck,Stuck</a:t>
-              </a:r>
-              <a:r>
-                <a:rPr lang="en-US" sz="400" dirty="0" smtClean="0"/>
-                <a:t>)}</a:t>
-              </a:r>
-              <a:endParaRPr lang="en-US" sz="400" dirty="0"/>
+                <a:rPr lang="en-US" sz="1100" dirty="0" smtClean="0"/>
+                <a:t>State 6</a:t>
+              </a:r>
+              <a:endParaRPr lang="en-US" sz="1100" dirty="0"/>
             </a:p>
           </p:txBody>
         </p:sp>
@@ -19011,123 +18667,10 @@
             <a:p>
               <a:pPr algn="ctr"/>
               <a:r>
-                <a:rPr lang="en-US" sz="400" dirty="0" smtClean="0"/>
-                <a:t>{({(</a:t>
-              </a:r>
-              <a:r>
-                <a:rPr lang="en-US" sz="400" dirty="0" err="1" smtClean="0"/>
-                <a:t>Start,Stuck</a:t>
-              </a:r>
-              <a:r>
-                <a:rPr lang="en-US" sz="400" dirty="0" smtClean="0"/>
-                <a:t>),</a:t>
-              </a:r>
-            </a:p>
-            <a:p>
-              <a:pPr algn="ctr"/>
-              <a:r>
-                <a:rPr lang="en-US" sz="400" dirty="0" smtClean="0"/>
-                <a:t>(</a:t>
-              </a:r>
-              <a:r>
-                <a:rPr lang="en-US" sz="400" dirty="0" err="1" smtClean="0"/>
-                <a:t>Call,Stuck</a:t>
-              </a:r>
-              <a:r>
-                <a:rPr lang="en-US" sz="400" dirty="0" smtClean="0"/>
-                <a:t>),</a:t>
-              </a:r>
-            </a:p>
-            <a:p>
-              <a:pPr algn="ctr"/>
-              <a:r>
-                <a:rPr lang="en-US" sz="400" dirty="0" smtClean="0"/>
-                <a:t>(Entry1,Stuck),</a:t>
-              </a:r>
-            </a:p>
-            <a:p>
-              <a:pPr algn="ctr"/>
-              <a:r>
-                <a:rPr lang="en-US" sz="400" dirty="0" smtClean="0"/>
-                <a:t>(Entryy2,Stuck),</a:t>
-              </a:r>
-            </a:p>
-            <a:p>
-              <a:pPr algn="ctr"/>
-              <a:r>
-                <a:rPr lang="en-US" sz="400" dirty="0" smtClean="0"/>
-                <a:t>(State1,Stuck),</a:t>
-              </a:r>
-            </a:p>
-            <a:p>
-              <a:pPr algn="ctr"/>
-              <a:r>
-                <a:rPr lang="en-US" sz="400" dirty="0" smtClean="0"/>
-                <a:t>(State2,Stuck),</a:t>
-              </a:r>
-            </a:p>
-            <a:p>
-              <a:pPr algn="ctr"/>
-              <a:r>
-                <a:rPr lang="en-US" sz="400" dirty="0" smtClean="0"/>
-                <a:t>(Exit1,Stuck),</a:t>
-              </a:r>
-            </a:p>
-            <a:p>
-              <a:pPr algn="ctr"/>
-              <a:r>
-                <a:rPr lang="en-US" sz="400" dirty="0" smtClean="0"/>
-                <a:t>(Exit2,Stuck),</a:t>
-              </a:r>
-            </a:p>
-            <a:p>
-              <a:pPr algn="ctr"/>
-              <a:r>
-                <a:rPr lang="en-US" sz="400" dirty="0" smtClean="0"/>
-                <a:t>(</a:t>
-              </a:r>
-              <a:r>
-                <a:rPr lang="en-US" sz="400" dirty="0" err="1" smtClean="0"/>
-                <a:t>Return,Stuck</a:t>
-              </a:r>
-              <a:r>
-                <a:rPr lang="en-US" sz="400" dirty="0" smtClean="0"/>
-                <a:t>),</a:t>
-              </a:r>
-            </a:p>
-            <a:p>
-              <a:pPr algn="ctr"/>
-              <a:r>
-                <a:rPr lang="en-US" sz="400" dirty="0" smtClean="0"/>
-                <a:t>(</a:t>
-              </a:r>
-              <a:r>
-                <a:rPr lang="en-US" sz="400" dirty="0" err="1" smtClean="0"/>
-                <a:t>Fishish,Stuck</a:t>
-              </a:r>
-              <a:r>
-                <a:rPr lang="en-US" sz="400" dirty="0" smtClean="0"/>
-                <a:t>),</a:t>
-              </a:r>
-            </a:p>
-            <a:p>
-              <a:pPr algn="ctr"/>
-              <a:r>
-                <a:rPr lang="en-US" sz="400" dirty="0" smtClean="0"/>
-                <a:t>(</a:t>
-              </a:r>
-              <a:r>
-                <a:rPr lang="en-US" sz="400" dirty="0" err="1" smtClean="0"/>
-                <a:t>Stuck,Stuck</a:t>
-              </a:r>
-              <a:r>
-                <a:rPr lang="en-US" sz="400" dirty="0" smtClean="0"/>
-                <a:t>)}</a:t>
-              </a:r>
-            </a:p>
-            <a:p>
-              <a:pPr algn="ctr"/>
-              <a:endParaRPr lang="en-US" sz="400" dirty="0"/>
+                <a:rPr lang="en-US" sz="1100" dirty="0" smtClean="0"/>
+                <a:t>State 9</a:t>
+              </a:r>
+              <a:endParaRPr lang="en-US" sz="1100" dirty="0"/>
             </a:p>
           </p:txBody>
         </p:sp>
@@ -19176,258 +18719,14 @@
             <a:p>
               <a:pPr algn="ctr"/>
               <a:r>
-                <a:rPr lang="en-US" sz="400" dirty="0" smtClean="0">
+                <a:rPr lang="en-US" sz="1000" dirty="0" smtClean="0">
                   <a:solidFill>
                     <a:schemeClr val="tx1"/>
                   </a:solidFill>
                 </a:rPr>
-                <a:t>{(</a:t>
-              </a:r>
-              <a:r>
-                <a:rPr lang="en-US" sz="400" dirty="0" err="1" smtClean="0">
-                  <a:solidFill>
-                    <a:schemeClr val="tx1"/>
-                  </a:solidFill>
-                </a:rPr>
-                <a:t>Start,Finish</a:t>
-              </a:r>
-              <a:r>
-                <a:rPr lang="en-US" sz="400" dirty="0" smtClean="0">
-                  <a:solidFill>
-                    <a:schemeClr val="tx1"/>
-                  </a:solidFill>
-                </a:rPr>
-                <a:t>),</a:t>
-              </a:r>
-            </a:p>
-            <a:p>
-              <a:pPr algn="ctr"/>
-              <a:r>
-                <a:rPr lang="en-US" sz="400" dirty="0" smtClean="0">
-                  <a:solidFill>
-                    <a:schemeClr val="tx1"/>
-                  </a:solidFill>
-                </a:rPr>
-                <a:t>(</a:t>
-              </a:r>
-              <a:r>
-                <a:rPr lang="en-US" sz="400" dirty="0" err="1" smtClean="0">
-                  <a:solidFill>
-                    <a:schemeClr val="tx1"/>
-                  </a:solidFill>
-                </a:rPr>
-                <a:t>Call,Stuck</a:t>
-              </a:r>
-              <a:r>
-                <a:rPr lang="en-US" sz="400" dirty="0" smtClean="0">
-                  <a:solidFill>
-                    <a:schemeClr val="tx1"/>
-                  </a:solidFill>
-                </a:rPr>
-                <a:t>),</a:t>
-              </a:r>
-            </a:p>
-            <a:p>
-              <a:pPr algn="ctr"/>
-              <a:r>
-                <a:rPr lang="en-US" sz="400" dirty="0" smtClean="0">
-                  <a:solidFill>
-                    <a:schemeClr val="tx1"/>
-                  </a:solidFill>
-                </a:rPr>
-                <a:t>(</a:t>
-              </a:r>
-              <a:r>
-                <a:rPr lang="en-US" sz="400" dirty="0" err="1" smtClean="0">
-                  <a:solidFill>
-                    <a:schemeClr val="tx1"/>
-                  </a:solidFill>
-                </a:rPr>
-                <a:t>Call,Stuck</a:t>
-              </a:r>
-              <a:r>
-                <a:rPr lang="en-US" sz="400" dirty="0" smtClean="0">
-                  <a:solidFill>
-                    <a:schemeClr val="tx1"/>
-                  </a:solidFill>
-                </a:rPr>
-                <a:t>),</a:t>
-              </a:r>
-            </a:p>
-            <a:p>
-              <a:pPr algn="ctr"/>
-              <a:r>
-                <a:rPr lang="en-US" sz="400" dirty="0" smtClean="0">
-                  <a:solidFill>
-                    <a:schemeClr val="tx1"/>
-                  </a:solidFill>
-                </a:rPr>
-                <a:t>(</a:t>
-              </a:r>
-              <a:r>
-                <a:rPr lang="en-US" sz="400" dirty="0" err="1" smtClean="0">
-                  <a:solidFill>
-                    <a:schemeClr val="tx1"/>
-                  </a:solidFill>
-                </a:rPr>
-                <a:t>Call,Stuck</a:t>
-              </a:r>
-              <a:r>
-                <a:rPr lang="en-US" sz="400" dirty="0" smtClean="0">
-                  <a:solidFill>
-                    <a:schemeClr val="tx1"/>
-                  </a:solidFill>
-                </a:rPr>
-                <a:t>),</a:t>
-              </a:r>
-            </a:p>
-            <a:p>
-              <a:pPr algn="ctr"/>
-              <a:r>
-                <a:rPr lang="en-US" sz="400" dirty="0" smtClean="0">
-                  <a:solidFill>
-                    <a:schemeClr val="tx1"/>
-                  </a:solidFill>
-                </a:rPr>
-                <a:t>(Entry1,Stuck),</a:t>
-              </a:r>
-            </a:p>
-            <a:p>
-              <a:pPr algn="ctr"/>
-              <a:r>
-                <a:rPr lang="en-US" sz="400" dirty="0" smtClean="0">
-                  <a:solidFill>
-                    <a:schemeClr val="tx1"/>
-                  </a:solidFill>
-                </a:rPr>
-                <a:t>(Entryy2,Stuck),</a:t>
-              </a:r>
-            </a:p>
-            <a:p>
-              <a:pPr algn="ctr"/>
-              <a:r>
-                <a:rPr lang="en-US" sz="400" dirty="0" smtClean="0">
-                  <a:solidFill>
-                    <a:schemeClr val="tx1"/>
-                  </a:solidFill>
-                </a:rPr>
-                <a:t>(State1,Stuck),</a:t>
-              </a:r>
-            </a:p>
-            <a:p>
-              <a:pPr algn="ctr"/>
-              <a:r>
-                <a:rPr lang="en-US" sz="400" dirty="0" smtClean="0">
-                  <a:solidFill>
-                    <a:schemeClr val="tx1"/>
-                  </a:solidFill>
-                </a:rPr>
-                <a:t>(State2,Stuck),</a:t>
-              </a:r>
-            </a:p>
-            <a:p>
-              <a:pPr algn="ctr"/>
-              <a:r>
-                <a:rPr lang="en-US" sz="400" dirty="0" smtClean="0">
-                  <a:solidFill>
-                    <a:schemeClr val="tx1"/>
-                  </a:solidFill>
-                </a:rPr>
-                <a:t>(Exit1,Stuck),</a:t>
-              </a:r>
-            </a:p>
-            <a:p>
-              <a:pPr algn="ctr"/>
-              <a:r>
-                <a:rPr lang="en-US" sz="400" dirty="0" smtClean="0">
-                  <a:solidFill>
-                    <a:schemeClr val="tx1"/>
-                  </a:solidFill>
-                </a:rPr>
-                <a:t>(Exit2,Stuck),</a:t>
-              </a:r>
-            </a:p>
-            <a:p>
-              <a:pPr algn="ctr"/>
-              <a:r>
-                <a:rPr lang="en-US" sz="400" dirty="0" smtClean="0">
-                  <a:solidFill>
-                    <a:schemeClr val="tx1"/>
-                  </a:solidFill>
-                </a:rPr>
-                <a:t>(</a:t>
-              </a:r>
-              <a:r>
-                <a:rPr lang="en-US" sz="400" dirty="0" err="1" smtClean="0">
-                  <a:solidFill>
-                    <a:schemeClr val="tx1"/>
-                  </a:solidFill>
-                </a:rPr>
-                <a:t>Return,Stuck</a:t>
-              </a:r>
-              <a:r>
-                <a:rPr lang="en-US" sz="400" dirty="0" smtClean="0">
-                  <a:solidFill>
-                    <a:schemeClr val="tx1"/>
-                  </a:solidFill>
-                </a:rPr>
-                <a:t>),</a:t>
-              </a:r>
-            </a:p>
-            <a:p>
-              <a:pPr algn="ctr"/>
-              <a:r>
-                <a:rPr lang="en-US" sz="400" dirty="0" smtClean="0">
-                  <a:solidFill>
-                    <a:schemeClr val="tx1"/>
-                  </a:solidFill>
-                </a:rPr>
-                <a:t>(</a:t>
-              </a:r>
-              <a:r>
-                <a:rPr lang="en-US" sz="400" dirty="0" err="1" smtClean="0">
-                  <a:solidFill>
-                    <a:schemeClr val="tx1"/>
-                  </a:solidFill>
-                </a:rPr>
-                <a:t>Fishish,Stuck</a:t>
-              </a:r>
-              <a:r>
-                <a:rPr lang="en-US" sz="400" dirty="0" smtClean="0">
-                  <a:solidFill>
-                    <a:schemeClr val="tx1"/>
-                  </a:solidFill>
-                </a:rPr>
-                <a:t>),</a:t>
-              </a:r>
-            </a:p>
-            <a:p>
-              <a:pPr algn="ctr"/>
-              <a:r>
-                <a:rPr lang="en-US" sz="400" dirty="0" smtClean="0">
-                  <a:solidFill>
-                    <a:schemeClr val="tx1"/>
-                  </a:solidFill>
-                </a:rPr>
-                <a:t>(</a:t>
-              </a:r>
-              <a:r>
-                <a:rPr lang="en-US" sz="400" dirty="0" err="1" smtClean="0">
-                  <a:solidFill>
-                    <a:schemeClr val="tx1"/>
-                  </a:solidFill>
-                </a:rPr>
-                <a:t>Stuck,Stuck</a:t>
-              </a:r>
-              <a:r>
-                <a:rPr lang="en-US" sz="400" dirty="0" smtClean="0">
-                  <a:solidFill>
-                    <a:schemeClr val="tx1"/>
-                  </a:solidFill>
-                </a:rPr>
-                <a:t>)}</a:t>
-              </a:r>
-              <a:endParaRPr lang="en-US" sz="400" dirty="0">
+                <a:t>State 12</a:t>
+              </a:r>
+              <a:endParaRPr lang="en-US" sz="1000" dirty="0">
                 <a:solidFill>
                   <a:schemeClr val="tx1"/>
                 </a:solidFill>
@@ -19471,150 +18770,10 @@
             <a:p>
               <a:pPr algn="ctr"/>
               <a:r>
-                <a:rPr lang="en-US" sz="400" dirty="0" smtClean="0"/>
-                <a:t>{(</a:t>
-              </a:r>
-              <a:r>
-                <a:rPr lang="en-US" sz="400" dirty="0" err="1" smtClean="0"/>
-                <a:t>Start,Return</a:t>
-              </a:r>
-              <a:r>
-                <a:rPr lang="en-US" sz="400" dirty="0" smtClean="0"/>
-                <a:t>),</a:t>
-              </a:r>
-            </a:p>
-            <a:p>
-              <a:pPr algn="ctr"/>
-              <a:r>
-                <a:rPr lang="en-US" sz="400" dirty="0" smtClean="0"/>
-                <a:t>(</a:t>
-              </a:r>
-              <a:r>
-                <a:rPr lang="en-US" sz="400" dirty="0" err="1" smtClean="0"/>
-                <a:t>Call,Stuck</a:t>
-              </a:r>
-              <a:r>
-                <a:rPr lang="en-US" sz="400" dirty="0" smtClean="0"/>
-                <a:t>),</a:t>
-              </a:r>
-            </a:p>
-            <a:p>
-              <a:pPr algn="ctr"/>
-              <a:r>
-                <a:rPr lang="en-US" sz="400" dirty="0" smtClean="0"/>
-                <a:t>(</a:t>
-              </a:r>
-              <a:r>
-                <a:rPr lang="en-US" sz="400" dirty="0" err="1" smtClean="0"/>
-                <a:t>Call,Stuck</a:t>
-              </a:r>
-              <a:r>
-                <a:rPr lang="en-US" sz="400" dirty="0" smtClean="0"/>
-                <a:t>),</a:t>
-              </a:r>
-            </a:p>
-            <a:p>
-              <a:pPr algn="ctr"/>
-              <a:r>
-                <a:rPr lang="en-US" sz="400" dirty="0" smtClean="0"/>
-                <a:t>(</a:t>
-              </a:r>
-              <a:r>
-                <a:rPr lang="en-US" sz="400" dirty="0" err="1" smtClean="0"/>
-                <a:t>Call,Stuck</a:t>
-              </a:r>
-              <a:r>
-                <a:rPr lang="en-US" sz="400" dirty="0" smtClean="0"/>
-                <a:t>),</a:t>
-              </a:r>
-            </a:p>
-            <a:p>
-              <a:pPr algn="ctr"/>
-              <a:r>
-                <a:rPr lang="en-US" sz="400" dirty="0" smtClean="0"/>
-                <a:t>(Entry1,Stuck),</a:t>
-              </a:r>
-            </a:p>
-            <a:p>
-              <a:pPr algn="ctr"/>
-              <a:r>
-                <a:rPr lang="en-US" sz="400" dirty="0" smtClean="0"/>
-                <a:t>(Entryy2,Stuck),</a:t>
-              </a:r>
-            </a:p>
-            <a:p>
-              <a:pPr algn="ctr"/>
-              <a:r>
-                <a:rPr lang="en-US" sz="400" dirty="0" smtClean="0"/>
-                <a:t>(State1,Stuck),</a:t>
-              </a:r>
-            </a:p>
-            <a:p>
-              <a:pPr algn="ctr"/>
-              <a:r>
-                <a:rPr lang="en-US" sz="400" dirty="0" smtClean="0"/>
-                <a:t>(State2,Stuck),</a:t>
-              </a:r>
-            </a:p>
-            <a:p>
-              <a:pPr algn="ctr"/>
-              <a:r>
-                <a:rPr lang="en-US" sz="400" dirty="0" smtClean="0"/>
-                <a:t>(Exit1,Stuck),</a:t>
-              </a:r>
-            </a:p>
-            <a:p>
-              <a:pPr algn="ctr"/>
-              <a:r>
-                <a:rPr lang="en-US" sz="400" dirty="0" smtClean="0"/>
-                <a:t>(Exit2,Stuck),</a:t>
-              </a:r>
-            </a:p>
-            <a:p>
-              <a:pPr algn="ctr"/>
-              <a:r>
-                <a:rPr lang="en-US" sz="400" dirty="0" smtClean="0"/>
-                <a:t>(</a:t>
-              </a:r>
-              <a:r>
-                <a:rPr lang="en-US" sz="400" dirty="0" err="1" smtClean="0"/>
-                <a:t>Return,Stuck</a:t>
-              </a:r>
-              <a:r>
-                <a:rPr lang="en-US" sz="400" dirty="0" smtClean="0"/>
-                <a:t>),</a:t>
-              </a:r>
-            </a:p>
-            <a:p>
-              <a:pPr algn="ctr"/>
-              <a:r>
-                <a:rPr lang="en-US" sz="400" dirty="0" smtClean="0"/>
-                <a:t>(</a:t>
-              </a:r>
-              <a:r>
-                <a:rPr lang="en-US" sz="400" dirty="0" err="1" smtClean="0"/>
-                <a:t>Fishish,Stuck</a:t>
-              </a:r>
-              <a:r>
-                <a:rPr lang="en-US" sz="400" dirty="0" smtClean="0"/>
-                <a:t>),</a:t>
-              </a:r>
-            </a:p>
-            <a:p>
-              <a:pPr algn="ctr"/>
-              <a:r>
-                <a:rPr lang="en-US" sz="400" dirty="0" smtClean="0"/>
-                <a:t>(</a:t>
-              </a:r>
-              <a:r>
-                <a:rPr lang="en-US" sz="400" dirty="0" err="1" smtClean="0"/>
-                <a:t>Stuck,Stuck</a:t>
-              </a:r>
-              <a:r>
-                <a:rPr lang="en-US" sz="400" dirty="0" smtClean="0"/>
-                <a:t>)}</a:t>
-              </a:r>
-              <a:endParaRPr lang="en-US" sz="400" dirty="0"/>
+                <a:rPr lang="en-US" sz="900" dirty="0" smtClean="0"/>
+                <a:t>State 13</a:t>
+              </a:r>
+              <a:endParaRPr lang="en-US" sz="900" dirty="0"/>
             </a:p>
           </p:txBody>
         </p:sp>
@@ -19654,142 +18813,10 @@
             <a:p>
               <a:pPr algn="ctr"/>
               <a:r>
-                <a:rPr lang="en-US" sz="400" dirty="0" smtClean="0"/>
-                <a:t>{(</a:t>
-              </a:r>
-              <a:r>
-                <a:rPr lang="en-US" sz="400" dirty="0" err="1" smtClean="0"/>
-                <a:t>Start,Stuck</a:t>
-              </a:r>
-              <a:r>
-                <a:rPr lang="en-US" sz="400" dirty="0" smtClean="0"/>
-                <a:t>),</a:t>
-              </a:r>
-            </a:p>
-            <a:p>
-              <a:pPr algn="ctr"/>
-              <a:r>
-                <a:rPr lang="en-US" sz="400" dirty="0" smtClean="0"/>
-                <a:t>(Call,State1),</a:t>
-              </a:r>
-            </a:p>
-            <a:p>
-              <a:pPr algn="ctr"/>
-              <a:r>
-                <a:rPr lang="en-US" sz="400" dirty="0" smtClean="0"/>
-                <a:t>(</a:t>
-              </a:r>
-              <a:r>
-                <a:rPr lang="en-US" sz="400" dirty="0" err="1" smtClean="0"/>
-                <a:t>Call,Stuck</a:t>
-              </a:r>
-              <a:r>
-                <a:rPr lang="en-US" sz="400" dirty="0" smtClean="0"/>
-                <a:t>),</a:t>
-              </a:r>
-            </a:p>
-            <a:p>
-              <a:pPr algn="ctr"/>
-              <a:r>
-                <a:rPr lang="en-US" sz="400" dirty="0" smtClean="0"/>
-                <a:t>(</a:t>
-              </a:r>
-              <a:r>
-                <a:rPr lang="en-US" sz="400" dirty="0" err="1" smtClean="0"/>
-                <a:t>Call,Stuck</a:t>
-              </a:r>
-              <a:r>
-                <a:rPr lang="en-US" sz="400" dirty="0" smtClean="0"/>
-                <a:t>),</a:t>
-              </a:r>
-            </a:p>
-            <a:p>
-              <a:pPr algn="ctr"/>
-              <a:r>
-                <a:rPr lang="en-US" sz="400" dirty="0" smtClean="0"/>
-                <a:t>(Entry1,Stuck),</a:t>
-              </a:r>
-            </a:p>
-            <a:p>
-              <a:pPr algn="ctr"/>
-              <a:r>
-                <a:rPr lang="en-US" sz="400" dirty="0" smtClean="0"/>
-                <a:t>(Entryy2,Stuck),</a:t>
-              </a:r>
-            </a:p>
-            <a:p>
-              <a:pPr algn="ctr"/>
-              <a:r>
-                <a:rPr lang="en-US" sz="400" dirty="0" smtClean="0"/>
-                <a:t>(State1,Stuck),</a:t>
-              </a:r>
-            </a:p>
-            <a:p>
-              <a:pPr algn="ctr"/>
-              <a:r>
-                <a:rPr lang="en-US" sz="400" dirty="0" smtClean="0"/>
-                <a:t>(State2,Stuck),</a:t>
-              </a:r>
-            </a:p>
-            <a:p>
-              <a:pPr algn="ctr"/>
-              <a:r>
-                <a:rPr lang="en-US" sz="400" dirty="0" smtClean="0"/>
-                <a:t>(Exit1,Stuck),</a:t>
-              </a:r>
-            </a:p>
-            <a:p>
-              <a:pPr algn="ctr"/>
-              <a:r>
-                <a:rPr lang="en-US" sz="400" dirty="0" smtClean="0"/>
-                <a:t>(Exit2,Stuck),</a:t>
-              </a:r>
-            </a:p>
-            <a:p>
-              <a:pPr algn="ctr"/>
-              <a:r>
-                <a:rPr lang="en-US" sz="400" dirty="0" smtClean="0"/>
-                <a:t>(</a:t>
-              </a:r>
-              <a:r>
-                <a:rPr lang="en-US" sz="400" dirty="0" err="1" smtClean="0"/>
-                <a:t>Return,Stuck</a:t>
-              </a:r>
-              <a:r>
-                <a:rPr lang="en-US" sz="400" dirty="0" smtClean="0"/>
-                <a:t>),</a:t>
-              </a:r>
-            </a:p>
-            <a:p>
-              <a:pPr algn="ctr"/>
-              <a:r>
-                <a:rPr lang="en-US" sz="400" dirty="0" smtClean="0"/>
-                <a:t>(</a:t>
-              </a:r>
-              <a:r>
-                <a:rPr lang="en-US" sz="400" dirty="0" err="1" smtClean="0"/>
-                <a:t>Fishish,Stuck</a:t>
-              </a:r>
-              <a:r>
-                <a:rPr lang="en-US" sz="400" dirty="0" smtClean="0"/>
-                <a:t>),</a:t>
-              </a:r>
-            </a:p>
-            <a:p>
-              <a:pPr algn="ctr"/>
-              <a:r>
-                <a:rPr lang="en-US" sz="400" dirty="0" smtClean="0"/>
-                <a:t>(</a:t>
-              </a:r>
-              <a:r>
-                <a:rPr lang="en-US" sz="400" dirty="0" err="1" smtClean="0"/>
-                <a:t>Stuck,Stuck</a:t>
-              </a:r>
-              <a:r>
-                <a:rPr lang="en-US" sz="400" dirty="0" smtClean="0"/>
-                <a:t>)}</a:t>
-              </a:r>
-              <a:endParaRPr lang="en-US" sz="400" dirty="0"/>
+                <a:rPr lang="en-US" sz="1100" dirty="0" smtClean="0"/>
+                <a:t>State 8</a:t>
+              </a:r>
+              <a:endParaRPr lang="en-US" sz="1100" dirty="0"/>
             </a:p>
           </p:txBody>
         </p:sp>
@@ -19829,142 +18856,10 @@
             <a:p>
               <a:pPr algn="ctr"/>
               <a:r>
-                <a:rPr lang="en-US" sz="400" dirty="0" smtClean="0"/>
-                <a:t>{({(</a:t>
-              </a:r>
-              <a:r>
-                <a:rPr lang="en-US" sz="400" dirty="0" err="1" smtClean="0"/>
-                <a:t>Start,Stuck</a:t>
-              </a:r>
-              <a:r>
-                <a:rPr lang="en-US" sz="400" dirty="0" smtClean="0"/>
-                <a:t>),</a:t>
-              </a:r>
-            </a:p>
-            <a:p>
-              <a:pPr algn="ctr"/>
-              <a:r>
-                <a:rPr lang="en-US" sz="400" dirty="0" smtClean="0"/>
-                <a:t>(Call,Exit1),</a:t>
-              </a:r>
-            </a:p>
-            <a:p>
-              <a:pPr algn="ctr"/>
-              <a:r>
-                <a:rPr lang="en-US" sz="400" dirty="0" smtClean="0"/>
-                <a:t>(</a:t>
-              </a:r>
-              <a:r>
-                <a:rPr lang="en-US" sz="400" dirty="0" err="1" smtClean="0"/>
-                <a:t>Call,Stuck</a:t>
-              </a:r>
-              <a:r>
-                <a:rPr lang="en-US" sz="400" dirty="0" smtClean="0"/>
-                <a:t>),</a:t>
-              </a:r>
-            </a:p>
-            <a:p>
-              <a:pPr algn="ctr"/>
-              <a:r>
-                <a:rPr lang="en-US" sz="400" dirty="0" smtClean="0"/>
-                <a:t>(</a:t>
-              </a:r>
-              <a:r>
-                <a:rPr lang="en-US" sz="400" dirty="0" err="1" smtClean="0"/>
-                <a:t>Call,Stuck</a:t>
-              </a:r>
-              <a:r>
-                <a:rPr lang="en-US" sz="400" dirty="0" smtClean="0"/>
-                <a:t>),</a:t>
-              </a:r>
-            </a:p>
-            <a:p>
-              <a:pPr algn="ctr"/>
-              <a:r>
-                <a:rPr lang="en-US" sz="400" dirty="0" smtClean="0"/>
-                <a:t>(Entry1,Stuck),</a:t>
-              </a:r>
-            </a:p>
-            <a:p>
-              <a:pPr algn="ctr"/>
-              <a:r>
-                <a:rPr lang="en-US" sz="400" dirty="0" smtClean="0"/>
-                <a:t>(Entryy2,Stuck),</a:t>
-              </a:r>
-            </a:p>
-            <a:p>
-              <a:pPr algn="ctr"/>
-              <a:r>
-                <a:rPr lang="en-US" sz="400" dirty="0" smtClean="0"/>
-                <a:t>(State1,Stuck),</a:t>
-              </a:r>
-            </a:p>
-            <a:p>
-              <a:pPr algn="ctr"/>
-              <a:r>
-                <a:rPr lang="en-US" sz="400" dirty="0" smtClean="0"/>
-                <a:t>(State2,Stuck),</a:t>
-              </a:r>
-            </a:p>
-            <a:p>
-              <a:pPr algn="ctr"/>
-              <a:r>
-                <a:rPr lang="en-US" sz="400" dirty="0" smtClean="0"/>
-                <a:t>(Exit1,Stuck),</a:t>
-              </a:r>
-            </a:p>
-            <a:p>
-              <a:pPr algn="ctr"/>
-              <a:r>
-                <a:rPr lang="en-US" sz="400" dirty="0" smtClean="0"/>
-                <a:t>(Exit2,Stuck),</a:t>
-              </a:r>
-            </a:p>
-            <a:p>
-              <a:pPr algn="ctr"/>
-              <a:r>
-                <a:rPr lang="en-US" sz="400" dirty="0" smtClean="0"/>
-                <a:t>(</a:t>
-              </a:r>
-              <a:r>
-                <a:rPr lang="en-US" sz="400" dirty="0" err="1" smtClean="0"/>
-                <a:t>Return,Stuck</a:t>
-              </a:r>
-              <a:r>
-                <a:rPr lang="en-US" sz="400" dirty="0" smtClean="0"/>
-                <a:t>),</a:t>
-              </a:r>
-            </a:p>
-            <a:p>
-              <a:pPr algn="ctr"/>
-              <a:r>
-                <a:rPr lang="en-US" sz="400" dirty="0" smtClean="0"/>
-                <a:t>(</a:t>
-              </a:r>
-              <a:r>
-                <a:rPr lang="en-US" sz="400" dirty="0" err="1" smtClean="0"/>
-                <a:t>Fishish,Stuck</a:t>
-              </a:r>
-              <a:r>
-                <a:rPr lang="en-US" sz="400" dirty="0" smtClean="0"/>
-                <a:t>),</a:t>
-              </a:r>
-            </a:p>
-            <a:p>
-              <a:pPr algn="ctr"/>
-              <a:r>
-                <a:rPr lang="en-US" sz="400" dirty="0" smtClean="0"/>
-                <a:t>(</a:t>
-              </a:r>
-              <a:r>
-                <a:rPr lang="en-US" sz="400" dirty="0" err="1" smtClean="0"/>
-                <a:t>Stuck,Stuck</a:t>
-              </a:r>
-              <a:r>
-                <a:rPr lang="en-US" sz="400" dirty="0" smtClean="0"/>
-                <a:t>)}</a:t>
-              </a:r>
-              <a:endParaRPr lang="en-US" sz="400" dirty="0"/>
+                <a:rPr lang="en-US" sz="900" dirty="0" smtClean="0"/>
+                <a:t>State 10</a:t>
+              </a:r>
+              <a:endParaRPr lang="en-US" sz="1050" dirty="0"/>
             </a:p>
           </p:txBody>
         </p:sp>
@@ -20004,142 +18899,10 @@
             <a:p>
               <a:pPr algn="ctr"/>
               <a:r>
-                <a:rPr lang="en-US" sz="400" dirty="0" smtClean="0"/>
-                <a:t>{(</a:t>
-              </a:r>
-              <a:r>
-                <a:rPr lang="en-US" sz="400" dirty="0" err="1" smtClean="0"/>
-                <a:t>Start,Stuck</a:t>
-              </a:r>
-              <a:r>
-                <a:rPr lang="en-US" sz="400" dirty="0" smtClean="0"/>
-                <a:t>),</a:t>
-              </a:r>
-            </a:p>
-            <a:p>
-              <a:pPr algn="ctr"/>
-              <a:r>
-                <a:rPr lang="en-US" sz="400" dirty="0" smtClean="0"/>
-                <a:t>(</a:t>
-              </a:r>
-              <a:r>
-                <a:rPr lang="en-US" sz="400" dirty="0" err="1" smtClean="0"/>
-                <a:t>Call,Stuck</a:t>
-              </a:r>
-              <a:r>
-                <a:rPr lang="en-US" sz="400" dirty="0" smtClean="0"/>
-                <a:t>),</a:t>
-              </a:r>
-            </a:p>
-            <a:p>
-              <a:pPr algn="ctr"/>
-              <a:r>
-                <a:rPr lang="en-US" sz="400" dirty="0" smtClean="0"/>
-                <a:t>(Call,State2),</a:t>
-              </a:r>
-            </a:p>
-            <a:p>
-              <a:pPr algn="ctr"/>
-              <a:r>
-                <a:rPr lang="en-US" sz="400" dirty="0" smtClean="0"/>
-                <a:t>(</a:t>
-              </a:r>
-              <a:r>
-                <a:rPr lang="en-US" sz="400" dirty="0" err="1" smtClean="0"/>
-                <a:t>Call,Stuck</a:t>
-              </a:r>
-              <a:r>
-                <a:rPr lang="en-US" sz="400" dirty="0" smtClean="0"/>
-                <a:t>),</a:t>
-              </a:r>
-            </a:p>
-            <a:p>
-              <a:pPr algn="ctr"/>
-              <a:r>
-                <a:rPr lang="en-US" sz="400" dirty="0" smtClean="0"/>
-                <a:t>(Entry1,Stuck),</a:t>
-              </a:r>
-            </a:p>
-            <a:p>
-              <a:pPr algn="ctr"/>
-              <a:r>
-                <a:rPr lang="en-US" sz="400" dirty="0" smtClean="0"/>
-                <a:t>(Entryy2,Stuck),</a:t>
-              </a:r>
-            </a:p>
-            <a:p>
-              <a:pPr algn="ctr"/>
-              <a:r>
-                <a:rPr lang="en-US" sz="400" dirty="0" smtClean="0"/>
-                <a:t>(State1,Stuck),</a:t>
-              </a:r>
-            </a:p>
-            <a:p>
-              <a:pPr algn="ctr"/>
-              <a:r>
-                <a:rPr lang="en-US" sz="400" dirty="0" smtClean="0"/>
-                <a:t>(State2,Stuck),</a:t>
-              </a:r>
-            </a:p>
-            <a:p>
-              <a:pPr algn="ctr"/>
-              <a:r>
-                <a:rPr lang="en-US" sz="400" dirty="0" smtClean="0"/>
-                <a:t>(Exit1,Stuck),</a:t>
-              </a:r>
-            </a:p>
-            <a:p>
-              <a:pPr algn="ctr"/>
-              <a:r>
-                <a:rPr lang="en-US" sz="400" dirty="0" smtClean="0"/>
-                <a:t>(Exit2,Stuck),</a:t>
-              </a:r>
-            </a:p>
-            <a:p>
-              <a:pPr algn="ctr"/>
-              <a:r>
-                <a:rPr lang="en-US" sz="400" dirty="0" smtClean="0"/>
-                <a:t>(</a:t>
-              </a:r>
-              <a:r>
-                <a:rPr lang="en-US" sz="400" dirty="0" err="1" smtClean="0"/>
-                <a:t>Return,Stuck</a:t>
-              </a:r>
-              <a:r>
-                <a:rPr lang="en-US" sz="400" dirty="0" smtClean="0"/>
-                <a:t>),</a:t>
-              </a:r>
-            </a:p>
-            <a:p>
-              <a:pPr algn="ctr"/>
-              <a:r>
-                <a:rPr lang="en-US" sz="400" dirty="0" smtClean="0"/>
-                <a:t>(</a:t>
-              </a:r>
-              <a:r>
-                <a:rPr lang="en-US" sz="400" dirty="0" err="1" smtClean="0"/>
-                <a:t>Fishish,Stuck</a:t>
-              </a:r>
-              <a:r>
-                <a:rPr lang="en-US" sz="400" dirty="0" smtClean="0"/>
-                <a:t>),</a:t>
-              </a:r>
-            </a:p>
-            <a:p>
-              <a:pPr algn="ctr"/>
-              <a:r>
-                <a:rPr lang="en-US" sz="400" dirty="0" smtClean="0"/>
-                <a:t>(</a:t>
-              </a:r>
-              <a:r>
-                <a:rPr lang="en-US" sz="400" dirty="0" err="1" smtClean="0"/>
-                <a:t>Stuck,Stuck</a:t>
-              </a:r>
-              <a:r>
-                <a:rPr lang="en-US" sz="400" dirty="0" smtClean="0"/>
-                <a:t>)}</a:t>
-              </a:r>
-              <a:endParaRPr lang="en-US" sz="400" dirty="0"/>
+                <a:rPr lang="en-US" sz="1100" dirty="0" smtClean="0"/>
+                <a:t>State 7</a:t>
+              </a:r>
+              <a:endParaRPr lang="en-US" sz="1100" dirty="0"/>
             </a:p>
           </p:txBody>
         </p:sp>
@@ -20179,149 +18942,10 @@
             <a:p>
               <a:pPr algn="ctr"/>
               <a:r>
-                <a:rPr lang="en-US" sz="400" dirty="0" smtClean="0"/>
-                <a:t>{(</a:t>
-              </a:r>
-              <a:r>
-                <a:rPr lang="en-US" sz="400" dirty="0" err="1" smtClean="0"/>
-                <a:t>Start,Stuck</a:t>
-              </a:r>
-              <a:r>
-                <a:rPr lang="en-US" sz="400" dirty="0" smtClean="0"/>
-                <a:t>),</a:t>
-              </a:r>
-            </a:p>
-            <a:p>
-              <a:pPr algn="ctr"/>
-              <a:r>
-                <a:rPr lang="en-US" sz="400" dirty="0" smtClean="0"/>
-                <a:t>(</a:t>
-              </a:r>
-              <a:r>
-                <a:rPr lang="en-US" sz="400" dirty="0" err="1" smtClean="0"/>
-                <a:t>Call,Stuck</a:t>
-              </a:r>
-              <a:r>
-                <a:rPr lang="en-US" sz="400" dirty="0" smtClean="0"/>
-                <a:t>),</a:t>
-              </a:r>
-            </a:p>
-            <a:p>
-              <a:pPr algn="ctr"/>
-              <a:r>
-                <a:rPr lang="en-US" sz="400" dirty="0" smtClean="0"/>
-                <a:t>(Call,Exit2),</a:t>
-              </a:r>
-            </a:p>
-            <a:p>
-              <a:pPr algn="ctr"/>
-              <a:r>
-                <a:rPr lang="en-US" sz="400" dirty="0" smtClean="0"/>
-                <a:t>(</a:t>
-              </a:r>
-              <a:r>
-                <a:rPr lang="en-US" sz="400" dirty="0" err="1" smtClean="0"/>
-                <a:t>Call,Stuck</a:t>
-              </a:r>
-              <a:r>
-                <a:rPr lang="en-US" sz="400" dirty="0" smtClean="0"/>
-                <a:t>),</a:t>
-              </a:r>
-            </a:p>
-            <a:p>
-              <a:pPr algn="ctr"/>
-              <a:r>
-                <a:rPr lang="en-US" sz="400" dirty="0" smtClean="0"/>
-                <a:t>(Entry1,Stuck),</a:t>
-              </a:r>
-            </a:p>
-            <a:p>
-              <a:pPr algn="ctr"/>
-              <a:r>
-                <a:rPr lang="en-US" sz="400" dirty="0" smtClean="0"/>
-                <a:t>(Entryy2,Stuck),</a:t>
-              </a:r>
-            </a:p>
-            <a:p>
-              <a:pPr algn="ctr"/>
-              <a:r>
-                <a:rPr lang="en-US" sz="400" dirty="0" smtClean="0"/>
-                <a:t>(State1,Stuck),</a:t>
-              </a:r>
-            </a:p>
-            <a:p>
-              <a:pPr algn="ctr"/>
-              <a:r>
-                <a:rPr lang="en-US" sz="400" dirty="0" smtClean="0"/>
-                <a:t>(State2,Stuck),</a:t>
-              </a:r>
-            </a:p>
-            <a:p>
-              <a:pPr algn="ctr"/>
-              <a:r>
-                <a:rPr lang="en-US" sz="400" dirty="0" smtClean="0"/>
-                <a:t>(Exit1,Stuck),</a:t>
-              </a:r>
-            </a:p>
-            <a:p>
-              <a:pPr algn="ctr"/>
-              <a:r>
-                <a:rPr lang="en-US" sz="400" dirty="0" smtClean="0"/>
-                <a:t>(Exit2,Stuck),</a:t>
-              </a:r>
-            </a:p>
-            <a:p>
-              <a:pPr algn="ctr"/>
-              <a:r>
-                <a:rPr lang="en-US" sz="400" dirty="0" smtClean="0"/>
-                <a:t>(</a:t>
-              </a:r>
-              <a:r>
-                <a:rPr lang="en-US" sz="400" dirty="0" err="1" smtClean="0"/>
-                <a:t>Return,Stuck</a:t>
-              </a:r>
-              <a:r>
-                <a:rPr lang="en-US" sz="400" dirty="0" smtClean="0"/>
-                <a:t>),</a:t>
-              </a:r>
-            </a:p>
-            <a:p>
-              <a:pPr algn="ctr"/>
-              <a:r>
-                <a:rPr lang="en-US" sz="400" dirty="0" smtClean="0"/>
-                <a:t>(</a:t>
-              </a:r>
-              <a:r>
-                <a:rPr lang="en-US" sz="400" dirty="0" err="1" smtClean="0"/>
-                <a:t>Fishish,Stuck</a:t>
-              </a:r>
-              <a:r>
-                <a:rPr lang="en-US" sz="400" dirty="0" smtClean="0"/>
-                <a:t>),</a:t>
-              </a:r>
-            </a:p>
-            <a:p>
-              <a:pPr algn="ctr"/>
-              <a:r>
-                <a:rPr lang="en-US" sz="400" dirty="0" smtClean="0"/>
-                <a:t>(</a:t>
-              </a:r>
-              <a:r>
-                <a:rPr lang="en-US" sz="400" dirty="0" err="1" smtClean="0"/>
-                <a:t>Stuck,Stuck</a:t>
-              </a:r>
-              <a:r>
-                <a:rPr lang="en-US" sz="400" dirty="0" smtClean="0"/>
-                <a:t>)}</a:t>
-              </a:r>
-            </a:p>
-            <a:p>
-              <a:pPr algn="ctr"/>
-              <a:r>
-                <a:rPr lang="en-US" sz="400" dirty="0" smtClean="0"/>
-                <a:t>)}</a:t>
-              </a:r>
-              <a:endParaRPr lang="en-US" sz="400" dirty="0"/>
+                <a:rPr lang="en-US" sz="900" dirty="0" smtClean="0"/>
+                <a:t>State 11</a:t>
+              </a:r>
+              <a:endParaRPr lang="en-US" sz="900" dirty="0"/>
             </a:p>
           </p:txBody>
         </p:sp>
@@ -20361,120 +18985,10 @@
             <a:p>
               <a:pPr algn="ctr"/>
               <a:r>
-                <a:rPr lang="en-US" sz="400" dirty="0" smtClean="0"/>
-                <a:t>{(</a:t>
-              </a:r>
-              <a:r>
-                <a:rPr lang="en-US" sz="400" dirty="0" err="1" smtClean="0"/>
-                <a:t>Start,Stuck</a:t>
-              </a:r>
-              <a:r>
-                <a:rPr lang="en-US" sz="400" dirty="0" smtClean="0"/>
-                <a:t>),</a:t>
-              </a:r>
-            </a:p>
-            <a:p>
-              <a:pPr algn="ctr"/>
-              <a:r>
-                <a:rPr lang="en-US" sz="400" dirty="0" smtClean="0"/>
-                <a:t>(</a:t>
-              </a:r>
-              <a:r>
-                <a:rPr lang="en-US" sz="400" dirty="0" err="1" smtClean="0"/>
-                <a:t>Call,Stuck</a:t>
-              </a:r>
-              <a:r>
-                <a:rPr lang="en-US" sz="400" dirty="0" smtClean="0"/>
-                <a:t>),</a:t>
-              </a:r>
-            </a:p>
-            <a:p>
-              <a:pPr algn="ctr"/>
-              <a:r>
-                <a:rPr lang="en-US" sz="400" dirty="0" smtClean="0"/>
-                <a:t>(Entry1,State1),</a:t>
-              </a:r>
-            </a:p>
-            <a:p>
-              <a:pPr algn="ctr"/>
-              <a:r>
-                <a:rPr lang="en-US" sz="400" dirty="0" smtClean="0"/>
-                <a:t>(Entryy2,Stuck),</a:t>
-              </a:r>
-            </a:p>
-            <a:p>
-              <a:pPr algn="ctr"/>
-              <a:r>
-                <a:rPr lang="en-US" sz="400" dirty="0" smtClean="0"/>
-                <a:t>(State1,Exit1),</a:t>
-              </a:r>
-            </a:p>
-            <a:p>
-              <a:pPr algn="ctr"/>
-              <a:r>
-                <a:rPr lang="en-US" sz="400" dirty="0" smtClean="0"/>
-                <a:t>(State2,Stuck),</a:t>
-              </a:r>
-            </a:p>
-            <a:p>
-              <a:pPr algn="ctr"/>
-              <a:r>
-                <a:rPr lang="en-US" sz="400" dirty="0" smtClean="0"/>
-                <a:t>(Exit1,Stuck),</a:t>
-              </a:r>
-            </a:p>
-            <a:p>
-              <a:pPr algn="ctr"/>
-              <a:r>
-                <a:rPr lang="en-US" sz="400" dirty="0" smtClean="0"/>
-                <a:t>(Exit2,Stuck),</a:t>
-              </a:r>
-            </a:p>
-            <a:p>
-              <a:pPr algn="ctr"/>
-              <a:r>
-                <a:rPr lang="en-US" sz="400" dirty="0" smtClean="0"/>
-                <a:t>(</a:t>
-              </a:r>
-              <a:r>
-                <a:rPr lang="en-US" sz="400" dirty="0" err="1" smtClean="0"/>
-                <a:t>Return,Stuck</a:t>
-              </a:r>
-              <a:r>
-                <a:rPr lang="en-US" sz="400" dirty="0" smtClean="0"/>
-                <a:t>),</a:t>
-              </a:r>
-            </a:p>
-            <a:p>
-              <a:pPr algn="ctr"/>
-              <a:r>
-                <a:rPr lang="en-US" sz="400" dirty="0" smtClean="0"/>
-                <a:t>(</a:t>
-              </a:r>
-              <a:r>
-                <a:rPr lang="en-US" sz="400" dirty="0" err="1" smtClean="0"/>
-                <a:t>Finish,Stuck</a:t>
-              </a:r>
-              <a:r>
-                <a:rPr lang="en-US" sz="400" dirty="0" smtClean="0"/>
-                <a:t>),</a:t>
-              </a:r>
-            </a:p>
-            <a:p>
-              <a:pPr algn="ctr"/>
-              <a:r>
-                <a:rPr lang="en-US" sz="400" dirty="0" smtClean="0"/>
-                <a:t>(</a:t>
-              </a:r>
-              <a:r>
-                <a:rPr lang="en-US" sz="400" dirty="0" err="1" smtClean="0"/>
-                <a:t>Stuck,Stuck</a:t>
-              </a:r>
-              <a:r>
-                <a:rPr lang="en-US" sz="400" dirty="0" smtClean="0"/>
-                <a:t>)}</a:t>
-              </a:r>
-              <a:endParaRPr lang="en-US" sz="400" dirty="0"/>
+                <a:rPr lang="en-US" sz="1100" dirty="0" smtClean="0"/>
+                <a:t>State 4</a:t>
+              </a:r>
+              <a:endParaRPr lang="en-US" sz="1100" dirty="0"/>
             </a:p>
           </p:txBody>
         </p:sp>
@@ -20980,120 +19494,10 @@
             <a:p>
               <a:pPr algn="ctr"/>
               <a:r>
-                <a:rPr lang="en-US" sz="400" dirty="0" smtClean="0"/>
-                <a:t>{(</a:t>
-              </a:r>
-              <a:r>
-                <a:rPr lang="en-US" sz="400" dirty="0" err="1" smtClean="0"/>
-                <a:t>Start,Stuck</a:t>
-              </a:r>
-              <a:r>
-                <a:rPr lang="en-US" sz="400" dirty="0" smtClean="0"/>
-                <a:t>),</a:t>
-              </a:r>
-            </a:p>
-            <a:p>
-              <a:pPr algn="ctr"/>
-              <a:r>
-                <a:rPr lang="en-US" sz="400" dirty="0" smtClean="0"/>
-                <a:t>(</a:t>
-              </a:r>
-              <a:r>
-                <a:rPr lang="en-US" sz="400" dirty="0" err="1" smtClean="0"/>
-                <a:t>Call,Stuck</a:t>
-              </a:r>
-              <a:r>
-                <a:rPr lang="en-US" sz="400" dirty="0" smtClean="0"/>
-                <a:t>),</a:t>
-              </a:r>
-            </a:p>
-            <a:p>
-              <a:pPr algn="ctr"/>
-              <a:r>
-                <a:rPr lang="en-US" sz="400" dirty="0" smtClean="0"/>
-                <a:t>(Entry1,Stuck),</a:t>
-              </a:r>
-            </a:p>
-            <a:p>
-              <a:pPr algn="ctr"/>
-              <a:r>
-                <a:rPr lang="en-US" sz="400" dirty="0" smtClean="0"/>
-                <a:t>(Entry2,Exit2),</a:t>
-              </a:r>
-            </a:p>
-            <a:p>
-              <a:pPr algn="ctr"/>
-              <a:r>
-                <a:rPr lang="en-US" sz="400" dirty="0" smtClean="0"/>
-                <a:t>(State1,Stuck),</a:t>
-              </a:r>
-            </a:p>
-            <a:p>
-              <a:pPr algn="ctr"/>
-              <a:r>
-                <a:rPr lang="en-US" sz="400" dirty="0" smtClean="0"/>
-                <a:t>(State2,Stuck),</a:t>
-              </a:r>
-            </a:p>
-            <a:p>
-              <a:pPr algn="ctr"/>
-              <a:r>
-                <a:rPr lang="en-US" sz="400" dirty="0" smtClean="0"/>
-                <a:t>(Exit1,Stuck),</a:t>
-              </a:r>
-            </a:p>
-            <a:p>
-              <a:pPr algn="ctr"/>
-              <a:r>
-                <a:rPr lang="en-US" sz="400" dirty="0" smtClean="0"/>
-                <a:t>(Exit2,Stuck),</a:t>
-              </a:r>
-            </a:p>
-            <a:p>
-              <a:pPr algn="ctr"/>
-              <a:r>
-                <a:rPr lang="en-US" sz="400" dirty="0" smtClean="0"/>
-                <a:t>(</a:t>
-              </a:r>
-              <a:r>
-                <a:rPr lang="en-US" sz="400" dirty="0" err="1" smtClean="0"/>
-                <a:t>Return,Stuck</a:t>
-              </a:r>
-              <a:r>
-                <a:rPr lang="en-US" sz="400" dirty="0" smtClean="0"/>
-                <a:t>),</a:t>
-              </a:r>
-            </a:p>
-            <a:p>
-              <a:pPr algn="ctr"/>
-              <a:r>
-                <a:rPr lang="en-US" sz="400" dirty="0" smtClean="0"/>
-                <a:t>(</a:t>
-              </a:r>
-              <a:r>
-                <a:rPr lang="en-US" sz="400" dirty="0" err="1" smtClean="0"/>
-                <a:t>Fishish,Stuck</a:t>
-              </a:r>
-              <a:r>
-                <a:rPr lang="en-US" sz="400" dirty="0" smtClean="0"/>
-                <a:t>),</a:t>
-              </a:r>
-            </a:p>
-            <a:p>
-              <a:pPr algn="ctr"/>
-              <a:r>
-                <a:rPr lang="en-US" sz="400" dirty="0" smtClean="0"/>
-                <a:t>(</a:t>
-              </a:r>
-              <a:r>
-                <a:rPr lang="en-US" sz="400" dirty="0" err="1" smtClean="0"/>
-                <a:t>Stuck,Stuck</a:t>
-              </a:r>
-              <a:r>
-                <a:rPr lang="en-US" sz="400" dirty="0" smtClean="0"/>
-                <a:t>)}</a:t>
-              </a:r>
-              <a:endParaRPr lang="en-US" sz="400" dirty="0"/>
+                <a:rPr lang="en-US" sz="1100" dirty="0" smtClean="0"/>
+                <a:t>State 1</a:t>
+              </a:r>
+              <a:endParaRPr lang="en-US" sz="1100" dirty="0"/>
             </a:p>
           </p:txBody>
         </p:sp>
@@ -21358,120 +19762,10 @@
             <a:p>
               <a:pPr algn="ctr"/>
               <a:r>
-                <a:rPr lang="en-US" sz="400" dirty="0" smtClean="0"/>
-                <a:t>{(</a:t>
-              </a:r>
-              <a:r>
-                <a:rPr lang="en-US" sz="400" dirty="0" err="1" smtClean="0"/>
-                <a:t>Start,Stuck</a:t>
-              </a:r>
-              <a:r>
-                <a:rPr lang="en-US" sz="400" dirty="0" smtClean="0"/>
-                <a:t>),</a:t>
-              </a:r>
-            </a:p>
-            <a:p>
-              <a:pPr algn="ctr"/>
-              <a:r>
-                <a:rPr lang="en-US" sz="400" dirty="0" smtClean="0"/>
-                <a:t>(</a:t>
-              </a:r>
-              <a:r>
-                <a:rPr lang="en-US" sz="400" dirty="0" err="1" smtClean="0"/>
-                <a:t>Call,Stuck</a:t>
-              </a:r>
-              <a:r>
-                <a:rPr lang="en-US" sz="400" dirty="0" smtClean="0"/>
-                <a:t>),</a:t>
-              </a:r>
-            </a:p>
-            <a:p>
-              <a:pPr algn="ctr"/>
-              <a:r>
-                <a:rPr lang="en-US" sz="400" dirty="0" smtClean="0"/>
-                <a:t>(Entry1,Exit1),</a:t>
-              </a:r>
-            </a:p>
-            <a:p>
-              <a:pPr algn="ctr"/>
-              <a:r>
-                <a:rPr lang="en-US" sz="400" dirty="0" smtClean="0"/>
-                <a:t>(Entryy2,Stuck),</a:t>
-              </a:r>
-            </a:p>
-            <a:p>
-              <a:pPr algn="ctr"/>
-              <a:r>
-                <a:rPr lang="en-US" sz="400" dirty="0" smtClean="0"/>
-                <a:t>(State1,Stuck),</a:t>
-              </a:r>
-            </a:p>
-            <a:p>
-              <a:pPr algn="ctr"/>
-              <a:r>
-                <a:rPr lang="en-US" sz="400" dirty="0" smtClean="0"/>
-                <a:t>(State2,Stuck),</a:t>
-              </a:r>
-            </a:p>
-            <a:p>
-              <a:pPr algn="ctr"/>
-              <a:r>
-                <a:rPr lang="en-US" sz="400" dirty="0" smtClean="0"/>
-                <a:t>(Exit1,Stuck),</a:t>
-              </a:r>
-            </a:p>
-            <a:p>
-              <a:pPr algn="ctr"/>
-              <a:r>
-                <a:rPr lang="en-US" sz="400" dirty="0" smtClean="0"/>
-                <a:t>(Exit2,Stuck),</a:t>
-              </a:r>
-            </a:p>
-            <a:p>
-              <a:pPr algn="ctr"/>
-              <a:r>
-                <a:rPr lang="en-US" sz="400" dirty="0" smtClean="0"/>
-                <a:t>(</a:t>
-              </a:r>
-              <a:r>
-                <a:rPr lang="en-US" sz="400" dirty="0" err="1" smtClean="0"/>
-                <a:t>Return,Stuck</a:t>
-              </a:r>
-              <a:r>
-                <a:rPr lang="en-US" sz="400" dirty="0" smtClean="0"/>
-                <a:t>),</a:t>
-              </a:r>
-            </a:p>
-            <a:p>
-              <a:pPr algn="ctr"/>
-              <a:r>
-                <a:rPr lang="en-US" sz="400" dirty="0" smtClean="0"/>
-                <a:t>(</a:t>
-              </a:r>
-              <a:r>
-                <a:rPr lang="en-US" sz="400" dirty="0" err="1" smtClean="0"/>
-                <a:t>Finish,Stuck</a:t>
-              </a:r>
-              <a:r>
-                <a:rPr lang="en-US" sz="400" dirty="0" smtClean="0"/>
-                <a:t>),</a:t>
-              </a:r>
-            </a:p>
-            <a:p>
-              <a:pPr algn="ctr"/>
-              <a:r>
-                <a:rPr lang="en-US" sz="400" dirty="0" smtClean="0"/>
-                <a:t>(</a:t>
-              </a:r>
-              <a:r>
-                <a:rPr lang="en-US" sz="400" dirty="0" err="1" smtClean="0"/>
-                <a:t>Stuck,Stuck</a:t>
-              </a:r>
-              <a:r>
-                <a:rPr lang="en-US" sz="400" dirty="0" smtClean="0"/>
-                <a:t>)}</a:t>
-              </a:r>
-              <a:endParaRPr lang="en-US" sz="400" dirty="0"/>
+                <a:rPr lang="en-US" sz="1100" dirty="0" smtClean="0"/>
+                <a:t>State 5</a:t>
+              </a:r>
+              <a:endParaRPr lang="en-US" sz="1100" dirty="0"/>
             </a:p>
           </p:txBody>
         </p:sp>

</xml_diff>